<commit_message>
00:85 Instancing and Culling (KKH)
</commit_message>
<xml_diff>
--- a/Common/Chapter16 InstancingAndCulling.pptx
+++ b/Common/Chapter16 InstancingAndCulling.pptx
@@ -5,10 +5,10 @@
     <p:sldMasterId id="2147483648" r:id="rId1"/>
   </p:sldMasterIdLst>
   <p:notesMasterIdLst>
-    <p:notesMasterId r:id="rId15"/>
+    <p:notesMasterId r:id="rId11"/>
   </p:notesMasterIdLst>
   <p:handoutMasterIdLst>
-    <p:handoutMasterId r:id="rId16"/>
+    <p:handoutMasterId r:id="rId12"/>
   </p:handoutMasterIdLst>
   <p:sldIdLst>
     <p:sldId id="261" r:id="rId2"/>
@@ -16,14 +16,10 @@
     <p:sldId id="281" r:id="rId4"/>
     <p:sldId id="290" r:id="rId5"/>
     <p:sldId id="291" r:id="rId6"/>
-    <p:sldId id="282" r:id="rId7"/>
-    <p:sldId id="283" r:id="rId8"/>
-    <p:sldId id="284" r:id="rId9"/>
-    <p:sldId id="285" r:id="rId10"/>
-    <p:sldId id="266" r:id="rId11"/>
-    <p:sldId id="287" r:id="rId12"/>
-    <p:sldId id="288" r:id="rId13"/>
-    <p:sldId id="289" r:id="rId14"/>
+    <p:sldId id="292" r:id="rId7"/>
+    <p:sldId id="293" r:id="rId8"/>
+    <p:sldId id="294" r:id="rId9"/>
+    <p:sldId id="295" r:id="rId10"/>
   </p:sldIdLst>
   <p:sldSz cx="12192000" cy="6858000"/>
   <p:notesSz cx="6858000" cy="9144000"/>
@@ -234,7 +230,7 @@
                 <a:latin typeface="맑은 고딕" panose="020B0503020000020004" pitchFamily="50" charset="-127"/>
                 <a:ea typeface="맑은 고딕" panose="020B0503020000020004" pitchFamily="50" charset="-127"/>
               </a:rPr>
-              <a:t>2019년 7월 11일</a:t>
+              <a:t>2019년 7월 12일</a:t>
             </a:fld>
             <a:endParaRPr lang="ko-KR" altLang="en-US" dirty="0">
               <a:latin typeface="맑은 고딕" panose="020B0503020000020004" pitchFamily="50" charset="-127"/>
@@ -420,7 +416,7 @@
             <a:fld id="{BE16EC8A-0758-4FA9-BF4D-3119057076D1}" type="datetime4">
               <a:rPr lang="ko-KR" altLang="en-US" smtClean="0"/>
               <a:pPr/>
-              <a:t>2019년 7월 11일</a:t>
+              <a:t>2019년 7월 12일</a:t>
             </a:fld>
             <a:endParaRPr lang="ko-KR" altLang="en-US" dirty="0"/>
           </a:p>
@@ -793,878 +789,6 @@
 </p:notes>
 </file>
 
-<file path=ppt/notesSlides/notesSlide10.xml><?xml version="1.0" encoding="utf-8"?>
-<p:notes xmlns:a="http://schemas.openxmlformats.org/drawingml/2006/main" xmlns:r="http://schemas.openxmlformats.org/officeDocument/2006/relationships" xmlns:p="http://schemas.openxmlformats.org/presentationml/2006/main">
-  <p:cSld>
-    <p:spTree>
-      <p:nvGrpSpPr>
-        <p:cNvPr id="1" name=""/>
-        <p:cNvGrpSpPr/>
-        <p:nvPr/>
-      </p:nvGrpSpPr>
-      <p:grpSpPr>
-        <a:xfrm>
-          <a:off x="0" y="0"/>
-          <a:ext cx="0" cy="0"/>
-          <a:chOff x="0" y="0"/>
-          <a:chExt cx="0" cy="0"/>
-        </a:xfrm>
-      </p:grpSpPr>
-      <p:sp>
-        <p:nvSpPr>
-          <p:cNvPr id="2" name="슬라이드 이미지 개체 틀 1"/>
-          <p:cNvSpPr>
-            <a:spLocks noGrp="1" noRot="1" noChangeAspect="1"/>
-          </p:cNvSpPr>
-          <p:nvPr>
-            <p:ph type="sldImg"/>
-          </p:nvPr>
-        </p:nvSpPr>
-        <p:spPr/>
-      </p:sp>
-      <p:sp>
-        <p:nvSpPr>
-          <p:cNvPr id="3" name="슬라이드 노트 개체 틀 2"/>
-          <p:cNvSpPr>
-            <a:spLocks noGrp="1"/>
-          </p:cNvSpPr>
-          <p:nvPr>
-            <p:ph type="body" idx="1"/>
-          </p:nvPr>
-        </p:nvSpPr>
-        <p:spPr/>
-        <p:txBody>
-          <a:bodyPr/>
-          <a:lstStyle/>
-          <a:p>
-            <a:r>
-              <a:rPr lang="ko-KR" altLang="en-US">
-                <a:latin typeface="맑은 고딕" panose="020B0503020000020004" pitchFamily="50" charset="-127"/>
-                <a:ea typeface="맑은 고딕" panose="020B0503020000020004" pitchFamily="50" charset="-127"/>
-              </a:rPr>
-              <a:t>조명 사용시 정점 색상을 직접 지정하지 않는다</a:t>
-            </a:r>
-            <a:r>
-              <a:rPr lang="en-US" altLang="ko-KR">
-                <a:latin typeface="맑은 고딕" panose="020B0503020000020004" pitchFamily="50" charset="-127"/>
-                <a:ea typeface="맑은 고딕" panose="020B0503020000020004" pitchFamily="50" charset="-127"/>
-              </a:rPr>
-              <a:t>.</a:t>
-            </a:r>
-          </a:p>
-          <a:p>
-            <a:r>
-              <a:rPr lang="ko-KR" altLang="en-US">
-                <a:latin typeface="맑은 고딕" panose="020B0503020000020004" pitchFamily="50" charset="-127"/>
-                <a:ea typeface="맑은 고딕" panose="020B0503020000020004" pitchFamily="50" charset="-127"/>
-              </a:rPr>
-              <a:t>표면의 재질들과 표면에 비출 빛들을 지정하고 조명 방정식을 적용해서 정점 색상이 결정되게함</a:t>
-            </a:r>
-            <a:r>
-              <a:rPr lang="en-US" altLang="ko-KR">
-                <a:latin typeface="맑은 고딕" panose="020B0503020000020004" pitchFamily="50" charset="-127"/>
-                <a:ea typeface="맑은 고딕" panose="020B0503020000020004" pitchFamily="50" charset="-127"/>
-              </a:rPr>
-              <a:t>.</a:t>
-            </a:r>
-          </a:p>
-          <a:p>
-            <a:r>
-              <a:rPr lang="ko-KR" altLang="en-US">
-                <a:latin typeface="맑은 고딕" panose="020B0503020000020004" pitchFamily="50" charset="-127"/>
-                <a:ea typeface="맑은 고딕" panose="020B0503020000020004" pitchFamily="50" charset="-127"/>
-              </a:rPr>
-              <a:t>결론 적으로 물체의 색이 훨씬 더 사실적으로 나타남</a:t>
-            </a:r>
-            <a:r>
-              <a:rPr lang="en-US" altLang="ko-KR">
-                <a:latin typeface="맑은 고딕" panose="020B0503020000020004" pitchFamily="50" charset="-127"/>
-                <a:ea typeface="맑은 고딕" panose="020B0503020000020004" pitchFamily="50" charset="-127"/>
-              </a:rPr>
-              <a:t>.</a:t>
-            </a:r>
-          </a:p>
-          <a:p>
-            <a:endParaRPr lang="en-US" altLang="ko-KR">
-              <a:latin typeface="맑은 고딕" panose="020B0503020000020004" pitchFamily="50" charset="-127"/>
-              <a:ea typeface="맑은 고딕" panose="020B0503020000020004" pitchFamily="50" charset="-127"/>
-            </a:endParaRPr>
-          </a:p>
-          <a:p>
-            <a:r>
-              <a:rPr lang="ko-KR" altLang="en-US">
-                <a:latin typeface="맑은 고딕" panose="020B0503020000020004" pitchFamily="50" charset="-127"/>
-                <a:ea typeface="맑은 고딕" panose="020B0503020000020004" pitchFamily="50" charset="-127"/>
-              </a:rPr>
-              <a:t>재질의 속성 예 </a:t>
-            </a:r>
-            <a:r>
-              <a:rPr lang="en-US" altLang="ko-KR">
-                <a:latin typeface="맑은 고딕" panose="020B0503020000020004" pitchFamily="50" charset="-127"/>
-                <a:ea typeface="맑은 고딕" panose="020B0503020000020004" pitchFamily="50" charset="-127"/>
-              </a:rPr>
-              <a:t>: </a:t>
-            </a:r>
-            <a:r>
-              <a:rPr lang="ko-KR" altLang="en-US">
-                <a:latin typeface="맑은 고딕" panose="020B0503020000020004" pitchFamily="50" charset="-127"/>
-                <a:ea typeface="맑은 고딕" panose="020B0503020000020004" pitchFamily="50" charset="-127"/>
-              </a:rPr>
-              <a:t>표면이 반사</a:t>
-            </a:r>
-            <a:r>
-              <a:rPr lang="en-US" altLang="ko-KR">
-                <a:latin typeface="맑은 고딕" panose="020B0503020000020004" pitchFamily="50" charset="-127"/>
-                <a:ea typeface="맑은 고딕" panose="020B0503020000020004" pitchFamily="50" charset="-127"/>
-              </a:rPr>
-              <a:t>, </a:t>
-            </a:r>
-            <a:r>
-              <a:rPr lang="ko-KR" altLang="en-US">
-                <a:latin typeface="맑은 고딕" panose="020B0503020000020004" pitchFamily="50" charset="-127"/>
-                <a:ea typeface="맑은 고딕" panose="020B0503020000020004" pitchFamily="50" charset="-127"/>
-              </a:rPr>
-              <a:t>흡수하는 빛의 색상</a:t>
-            </a:r>
-            <a:r>
-              <a:rPr lang="en-US" altLang="ko-KR">
-                <a:latin typeface="맑은 고딕" panose="020B0503020000020004" pitchFamily="50" charset="-127"/>
-                <a:ea typeface="맑은 고딕" panose="020B0503020000020004" pitchFamily="50" charset="-127"/>
-              </a:rPr>
-              <a:t>, </a:t>
-            </a:r>
-            <a:r>
-              <a:rPr lang="ko-KR" altLang="en-US">
-                <a:latin typeface="맑은 고딕" panose="020B0503020000020004" pitchFamily="50" charset="-127"/>
-                <a:ea typeface="맑은 고딕" panose="020B0503020000020004" pitchFamily="50" charset="-127"/>
-              </a:rPr>
-              <a:t>표면 아래 재질의 굴절률</a:t>
-            </a:r>
-            <a:r>
-              <a:rPr lang="en-US" altLang="ko-KR">
-                <a:latin typeface="맑은 고딕" panose="020B0503020000020004" pitchFamily="50" charset="-127"/>
-                <a:ea typeface="맑은 고딕" panose="020B0503020000020004" pitchFamily="50" charset="-127"/>
-              </a:rPr>
-              <a:t>, </a:t>
-            </a:r>
-            <a:r>
-              <a:rPr lang="ko-KR" altLang="en-US">
-                <a:latin typeface="맑은 고딕" panose="020B0503020000020004" pitchFamily="50" charset="-127"/>
-                <a:ea typeface="맑은 고딕" panose="020B0503020000020004" pitchFamily="50" charset="-127"/>
-              </a:rPr>
-              <a:t>투명도 등</a:t>
-            </a:r>
-            <a:r>
-              <a:rPr lang="en-US" altLang="ko-KR">
-                <a:latin typeface="맑은 고딕" panose="020B0503020000020004" pitchFamily="50" charset="-127"/>
-                <a:ea typeface="맑은 고딕" panose="020B0503020000020004" pitchFamily="50" charset="-127"/>
-              </a:rPr>
-              <a:t>..</a:t>
-            </a:r>
-            <a:endParaRPr lang="ko-KR" altLang="en-US" dirty="0">
-              <a:latin typeface="맑은 고딕" panose="020B0503020000020004" pitchFamily="50" charset="-127"/>
-              <a:ea typeface="맑은 고딕" panose="020B0503020000020004" pitchFamily="50" charset="-127"/>
-            </a:endParaRPr>
-          </a:p>
-        </p:txBody>
-      </p:sp>
-      <p:sp>
-        <p:nvSpPr>
-          <p:cNvPr id="4" name="슬라이드 번호 개체 틀 3"/>
-          <p:cNvSpPr>
-            <a:spLocks noGrp="1"/>
-          </p:cNvSpPr>
-          <p:nvPr>
-            <p:ph type="sldNum" sz="quarter" idx="10"/>
-          </p:nvPr>
-        </p:nvSpPr>
-        <p:spPr/>
-        <p:txBody>
-          <a:bodyPr/>
-          <a:lstStyle/>
-          <a:p>
-            <a:pPr rtl="0"/>
-            <a:fld id="{82869989-EB00-4EE7-BCB5-25BDC5BB29F8}" type="slidenum">
-              <a:rPr lang="en-US" altLang="ko-KR" smtClean="0">
-                <a:latin typeface="맑은 고딕" panose="020B0503020000020004" pitchFamily="50" charset="-127"/>
-                <a:ea typeface="맑은 고딕" panose="020B0503020000020004" pitchFamily="50" charset="-127"/>
-              </a:rPr>
-              <a:t>10</a:t>
-            </a:fld>
-            <a:endParaRPr lang="ko-KR" altLang="en-US" dirty="0">
-              <a:latin typeface="맑은 고딕" panose="020B0503020000020004" pitchFamily="50" charset="-127"/>
-              <a:ea typeface="맑은 고딕" panose="020B0503020000020004" pitchFamily="50" charset="-127"/>
-            </a:endParaRPr>
-          </a:p>
-        </p:txBody>
-      </p:sp>
-    </p:spTree>
-    <p:extLst>
-      <p:ext uri="{BB962C8B-B14F-4D97-AF65-F5344CB8AC3E}">
-        <p14:creationId xmlns:p14="http://schemas.microsoft.com/office/powerpoint/2010/main" val="1214785384"/>
-      </p:ext>
-    </p:extLst>
-  </p:cSld>
-  <p:clrMapOvr>
-    <a:masterClrMapping/>
-  </p:clrMapOvr>
-</p:notes>
-</file>
-
-<file path=ppt/notesSlides/notesSlide11.xml><?xml version="1.0" encoding="utf-8"?>
-<p:notes xmlns:a="http://schemas.openxmlformats.org/drawingml/2006/main" xmlns:r="http://schemas.openxmlformats.org/officeDocument/2006/relationships" xmlns:p="http://schemas.openxmlformats.org/presentationml/2006/main">
-  <p:cSld>
-    <p:spTree>
-      <p:nvGrpSpPr>
-        <p:cNvPr id="1" name=""/>
-        <p:cNvGrpSpPr/>
-        <p:nvPr/>
-      </p:nvGrpSpPr>
-      <p:grpSpPr>
-        <a:xfrm>
-          <a:off x="0" y="0"/>
-          <a:ext cx="0" cy="0"/>
-          <a:chOff x="0" y="0"/>
-          <a:chExt cx="0" cy="0"/>
-        </a:xfrm>
-      </p:grpSpPr>
-      <p:sp>
-        <p:nvSpPr>
-          <p:cNvPr id="2" name="슬라이드 이미지 개체 틀 1"/>
-          <p:cNvSpPr>
-            <a:spLocks noGrp="1" noRot="1" noChangeAspect="1"/>
-          </p:cNvSpPr>
-          <p:nvPr>
-            <p:ph type="sldImg"/>
-          </p:nvPr>
-        </p:nvSpPr>
-        <p:spPr/>
-      </p:sp>
-      <p:sp>
-        <p:nvSpPr>
-          <p:cNvPr id="3" name="슬라이드 노트 개체 틀 2"/>
-          <p:cNvSpPr>
-            <a:spLocks noGrp="1"/>
-          </p:cNvSpPr>
-          <p:nvPr>
-            <p:ph type="body" idx="1"/>
-          </p:nvPr>
-        </p:nvSpPr>
-        <p:spPr/>
-        <p:txBody>
-          <a:bodyPr/>
-          <a:lstStyle/>
-          <a:p>
-            <a:r>
-              <a:rPr lang="ko-KR" altLang="en-US">
-                <a:latin typeface="맑은 고딕" panose="020B0503020000020004" pitchFamily="50" charset="-127"/>
-                <a:ea typeface="맑은 고딕" panose="020B0503020000020004" pitchFamily="50" charset="-127"/>
-              </a:rPr>
-              <a:t>조명 사용시 정점 색상을 직접 지정하지 않는다</a:t>
-            </a:r>
-            <a:r>
-              <a:rPr lang="en-US" altLang="ko-KR">
-                <a:latin typeface="맑은 고딕" panose="020B0503020000020004" pitchFamily="50" charset="-127"/>
-                <a:ea typeface="맑은 고딕" panose="020B0503020000020004" pitchFamily="50" charset="-127"/>
-              </a:rPr>
-              <a:t>.</a:t>
-            </a:r>
-          </a:p>
-          <a:p>
-            <a:r>
-              <a:rPr lang="ko-KR" altLang="en-US">
-                <a:latin typeface="맑은 고딕" panose="020B0503020000020004" pitchFamily="50" charset="-127"/>
-                <a:ea typeface="맑은 고딕" panose="020B0503020000020004" pitchFamily="50" charset="-127"/>
-              </a:rPr>
-              <a:t>표면의 재질들과 표면에 비출 빛들을 지정하고 조명 방정식을 적용해서 정점 색상이 결정되게함</a:t>
-            </a:r>
-            <a:r>
-              <a:rPr lang="en-US" altLang="ko-KR">
-                <a:latin typeface="맑은 고딕" panose="020B0503020000020004" pitchFamily="50" charset="-127"/>
-                <a:ea typeface="맑은 고딕" panose="020B0503020000020004" pitchFamily="50" charset="-127"/>
-              </a:rPr>
-              <a:t>.</a:t>
-            </a:r>
-          </a:p>
-          <a:p>
-            <a:r>
-              <a:rPr lang="ko-KR" altLang="en-US">
-                <a:latin typeface="맑은 고딕" panose="020B0503020000020004" pitchFamily="50" charset="-127"/>
-                <a:ea typeface="맑은 고딕" panose="020B0503020000020004" pitchFamily="50" charset="-127"/>
-              </a:rPr>
-              <a:t>결론 적으로 물체의 색이 훨씬 더 사실적으로 나타남</a:t>
-            </a:r>
-            <a:r>
-              <a:rPr lang="en-US" altLang="ko-KR">
-                <a:latin typeface="맑은 고딕" panose="020B0503020000020004" pitchFamily="50" charset="-127"/>
-                <a:ea typeface="맑은 고딕" panose="020B0503020000020004" pitchFamily="50" charset="-127"/>
-              </a:rPr>
-              <a:t>.</a:t>
-            </a:r>
-          </a:p>
-          <a:p>
-            <a:endParaRPr lang="en-US" altLang="ko-KR">
-              <a:latin typeface="맑은 고딕" panose="020B0503020000020004" pitchFamily="50" charset="-127"/>
-              <a:ea typeface="맑은 고딕" panose="020B0503020000020004" pitchFamily="50" charset="-127"/>
-            </a:endParaRPr>
-          </a:p>
-          <a:p>
-            <a:r>
-              <a:rPr lang="ko-KR" altLang="en-US">
-                <a:latin typeface="맑은 고딕" panose="020B0503020000020004" pitchFamily="50" charset="-127"/>
-                <a:ea typeface="맑은 고딕" panose="020B0503020000020004" pitchFamily="50" charset="-127"/>
-              </a:rPr>
-              <a:t>재질의 속성 예 </a:t>
-            </a:r>
-            <a:r>
-              <a:rPr lang="en-US" altLang="ko-KR">
-                <a:latin typeface="맑은 고딕" panose="020B0503020000020004" pitchFamily="50" charset="-127"/>
-                <a:ea typeface="맑은 고딕" panose="020B0503020000020004" pitchFamily="50" charset="-127"/>
-              </a:rPr>
-              <a:t>: </a:t>
-            </a:r>
-            <a:r>
-              <a:rPr lang="ko-KR" altLang="en-US">
-                <a:latin typeface="맑은 고딕" panose="020B0503020000020004" pitchFamily="50" charset="-127"/>
-                <a:ea typeface="맑은 고딕" panose="020B0503020000020004" pitchFamily="50" charset="-127"/>
-              </a:rPr>
-              <a:t>표면이 반사</a:t>
-            </a:r>
-            <a:r>
-              <a:rPr lang="en-US" altLang="ko-KR">
-                <a:latin typeface="맑은 고딕" panose="020B0503020000020004" pitchFamily="50" charset="-127"/>
-                <a:ea typeface="맑은 고딕" panose="020B0503020000020004" pitchFamily="50" charset="-127"/>
-              </a:rPr>
-              <a:t>, </a:t>
-            </a:r>
-            <a:r>
-              <a:rPr lang="ko-KR" altLang="en-US">
-                <a:latin typeface="맑은 고딕" panose="020B0503020000020004" pitchFamily="50" charset="-127"/>
-                <a:ea typeface="맑은 고딕" panose="020B0503020000020004" pitchFamily="50" charset="-127"/>
-              </a:rPr>
-              <a:t>흡수하는 빛의 색상</a:t>
-            </a:r>
-            <a:r>
-              <a:rPr lang="en-US" altLang="ko-KR">
-                <a:latin typeface="맑은 고딕" panose="020B0503020000020004" pitchFamily="50" charset="-127"/>
-                <a:ea typeface="맑은 고딕" panose="020B0503020000020004" pitchFamily="50" charset="-127"/>
-              </a:rPr>
-              <a:t>, </a:t>
-            </a:r>
-            <a:r>
-              <a:rPr lang="ko-KR" altLang="en-US">
-                <a:latin typeface="맑은 고딕" panose="020B0503020000020004" pitchFamily="50" charset="-127"/>
-                <a:ea typeface="맑은 고딕" panose="020B0503020000020004" pitchFamily="50" charset="-127"/>
-              </a:rPr>
-              <a:t>표면 아래 재질의 굴절률</a:t>
-            </a:r>
-            <a:r>
-              <a:rPr lang="en-US" altLang="ko-KR">
-                <a:latin typeface="맑은 고딕" panose="020B0503020000020004" pitchFamily="50" charset="-127"/>
-                <a:ea typeface="맑은 고딕" panose="020B0503020000020004" pitchFamily="50" charset="-127"/>
-              </a:rPr>
-              <a:t>, </a:t>
-            </a:r>
-            <a:r>
-              <a:rPr lang="ko-KR" altLang="en-US">
-                <a:latin typeface="맑은 고딕" panose="020B0503020000020004" pitchFamily="50" charset="-127"/>
-                <a:ea typeface="맑은 고딕" panose="020B0503020000020004" pitchFamily="50" charset="-127"/>
-              </a:rPr>
-              <a:t>투명도 등</a:t>
-            </a:r>
-            <a:r>
-              <a:rPr lang="en-US" altLang="ko-KR">
-                <a:latin typeface="맑은 고딕" panose="020B0503020000020004" pitchFamily="50" charset="-127"/>
-                <a:ea typeface="맑은 고딕" panose="020B0503020000020004" pitchFamily="50" charset="-127"/>
-              </a:rPr>
-              <a:t>..</a:t>
-            </a:r>
-            <a:endParaRPr lang="ko-KR" altLang="en-US" dirty="0">
-              <a:latin typeface="맑은 고딕" panose="020B0503020000020004" pitchFamily="50" charset="-127"/>
-              <a:ea typeface="맑은 고딕" panose="020B0503020000020004" pitchFamily="50" charset="-127"/>
-            </a:endParaRPr>
-          </a:p>
-        </p:txBody>
-      </p:sp>
-      <p:sp>
-        <p:nvSpPr>
-          <p:cNvPr id="4" name="슬라이드 번호 개체 틀 3"/>
-          <p:cNvSpPr>
-            <a:spLocks noGrp="1"/>
-          </p:cNvSpPr>
-          <p:nvPr>
-            <p:ph type="sldNum" sz="quarter" idx="10"/>
-          </p:nvPr>
-        </p:nvSpPr>
-        <p:spPr/>
-        <p:txBody>
-          <a:bodyPr/>
-          <a:lstStyle/>
-          <a:p>
-            <a:pPr rtl="0"/>
-            <a:fld id="{82869989-EB00-4EE7-BCB5-25BDC5BB29F8}" type="slidenum">
-              <a:rPr lang="en-US" altLang="ko-KR" smtClean="0">
-                <a:latin typeface="맑은 고딕" panose="020B0503020000020004" pitchFamily="50" charset="-127"/>
-                <a:ea typeface="맑은 고딕" panose="020B0503020000020004" pitchFamily="50" charset="-127"/>
-              </a:rPr>
-              <a:t>11</a:t>
-            </a:fld>
-            <a:endParaRPr lang="ko-KR" altLang="en-US" dirty="0">
-              <a:latin typeface="맑은 고딕" panose="020B0503020000020004" pitchFamily="50" charset="-127"/>
-              <a:ea typeface="맑은 고딕" panose="020B0503020000020004" pitchFamily="50" charset="-127"/>
-            </a:endParaRPr>
-          </a:p>
-        </p:txBody>
-      </p:sp>
-    </p:spTree>
-    <p:extLst>
-      <p:ext uri="{BB962C8B-B14F-4D97-AF65-F5344CB8AC3E}">
-        <p14:creationId xmlns:p14="http://schemas.microsoft.com/office/powerpoint/2010/main" val="15889459"/>
-      </p:ext>
-    </p:extLst>
-  </p:cSld>
-  <p:clrMapOvr>
-    <a:masterClrMapping/>
-  </p:clrMapOvr>
-</p:notes>
-</file>
-
-<file path=ppt/notesSlides/notesSlide12.xml><?xml version="1.0" encoding="utf-8"?>
-<p:notes xmlns:a="http://schemas.openxmlformats.org/drawingml/2006/main" xmlns:r="http://schemas.openxmlformats.org/officeDocument/2006/relationships" xmlns:p="http://schemas.openxmlformats.org/presentationml/2006/main">
-  <p:cSld>
-    <p:spTree>
-      <p:nvGrpSpPr>
-        <p:cNvPr id="1" name=""/>
-        <p:cNvGrpSpPr/>
-        <p:nvPr/>
-      </p:nvGrpSpPr>
-      <p:grpSpPr>
-        <a:xfrm>
-          <a:off x="0" y="0"/>
-          <a:ext cx="0" cy="0"/>
-          <a:chOff x="0" y="0"/>
-          <a:chExt cx="0" cy="0"/>
-        </a:xfrm>
-      </p:grpSpPr>
-      <p:sp>
-        <p:nvSpPr>
-          <p:cNvPr id="2" name="슬라이드 이미지 개체 틀 1"/>
-          <p:cNvSpPr>
-            <a:spLocks noGrp="1" noRot="1" noChangeAspect="1"/>
-          </p:cNvSpPr>
-          <p:nvPr>
-            <p:ph type="sldImg"/>
-          </p:nvPr>
-        </p:nvSpPr>
-        <p:spPr/>
-      </p:sp>
-      <p:sp>
-        <p:nvSpPr>
-          <p:cNvPr id="3" name="슬라이드 노트 개체 틀 2"/>
-          <p:cNvSpPr>
-            <a:spLocks noGrp="1"/>
-          </p:cNvSpPr>
-          <p:nvPr>
-            <p:ph type="body" idx="1"/>
-          </p:nvPr>
-        </p:nvSpPr>
-        <p:spPr/>
-        <p:txBody>
-          <a:bodyPr/>
-          <a:lstStyle/>
-          <a:p>
-            <a:r>
-              <a:rPr lang="ko-KR" altLang="en-US">
-                <a:latin typeface="맑은 고딕" panose="020B0503020000020004" pitchFamily="50" charset="-127"/>
-                <a:ea typeface="맑은 고딕" panose="020B0503020000020004" pitchFamily="50" charset="-127"/>
-              </a:rPr>
-              <a:t>조명 사용시 정점 색상을 직접 지정하지 않는다</a:t>
-            </a:r>
-            <a:r>
-              <a:rPr lang="en-US" altLang="ko-KR">
-                <a:latin typeface="맑은 고딕" panose="020B0503020000020004" pitchFamily="50" charset="-127"/>
-                <a:ea typeface="맑은 고딕" panose="020B0503020000020004" pitchFamily="50" charset="-127"/>
-              </a:rPr>
-              <a:t>.</a:t>
-            </a:r>
-          </a:p>
-          <a:p>
-            <a:r>
-              <a:rPr lang="ko-KR" altLang="en-US">
-                <a:latin typeface="맑은 고딕" panose="020B0503020000020004" pitchFamily="50" charset="-127"/>
-                <a:ea typeface="맑은 고딕" panose="020B0503020000020004" pitchFamily="50" charset="-127"/>
-              </a:rPr>
-              <a:t>표면의 재질들과 표면에 비출 빛들을 지정하고 조명 방정식을 적용해서 정점 색상이 결정되게함</a:t>
-            </a:r>
-            <a:r>
-              <a:rPr lang="en-US" altLang="ko-KR">
-                <a:latin typeface="맑은 고딕" panose="020B0503020000020004" pitchFamily="50" charset="-127"/>
-                <a:ea typeface="맑은 고딕" panose="020B0503020000020004" pitchFamily="50" charset="-127"/>
-              </a:rPr>
-              <a:t>.</a:t>
-            </a:r>
-          </a:p>
-          <a:p>
-            <a:r>
-              <a:rPr lang="ko-KR" altLang="en-US">
-                <a:latin typeface="맑은 고딕" panose="020B0503020000020004" pitchFamily="50" charset="-127"/>
-                <a:ea typeface="맑은 고딕" panose="020B0503020000020004" pitchFamily="50" charset="-127"/>
-              </a:rPr>
-              <a:t>결론 적으로 물체의 색이 훨씬 더 사실적으로 나타남</a:t>
-            </a:r>
-            <a:r>
-              <a:rPr lang="en-US" altLang="ko-KR">
-                <a:latin typeface="맑은 고딕" panose="020B0503020000020004" pitchFamily="50" charset="-127"/>
-                <a:ea typeface="맑은 고딕" panose="020B0503020000020004" pitchFamily="50" charset="-127"/>
-              </a:rPr>
-              <a:t>.</a:t>
-            </a:r>
-          </a:p>
-          <a:p>
-            <a:endParaRPr lang="en-US" altLang="ko-KR">
-              <a:latin typeface="맑은 고딕" panose="020B0503020000020004" pitchFamily="50" charset="-127"/>
-              <a:ea typeface="맑은 고딕" panose="020B0503020000020004" pitchFamily="50" charset="-127"/>
-            </a:endParaRPr>
-          </a:p>
-          <a:p>
-            <a:r>
-              <a:rPr lang="ko-KR" altLang="en-US">
-                <a:latin typeface="맑은 고딕" panose="020B0503020000020004" pitchFamily="50" charset="-127"/>
-                <a:ea typeface="맑은 고딕" panose="020B0503020000020004" pitchFamily="50" charset="-127"/>
-              </a:rPr>
-              <a:t>재질의 속성 예 </a:t>
-            </a:r>
-            <a:r>
-              <a:rPr lang="en-US" altLang="ko-KR">
-                <a:latin typeface="맑은 고딕" panose="020B0503020000020004" pitchFamily="50" charset="-127"/>
-                <a:ea typeface="맑은 고딕" panose="020B0503020000020004" pitchFamily="50" charset="-127"/>
-              </a:rPr>
-              <a:t>: </a:t>
-            </a:r>
-            <a:r>
-              <a:rPr lang="ko-KR" altLang="en-US">
-                <a:latin typeface="맑은 고딕" panose="020B0503020000020004" pitchFamily="50" charset="-127"/>
-                <a:ea typeface="맑은 고딕" panose="020B0503020000020004" pitchFamily="50" charset="-127"/>
-              </a:rPr>
-              <a:t>표면이 반사</a:t>
-            </a:r>
-            <a:r>
-              <a:rPr lang="en-US" altLang="ko-KR">
-                <a:latin typeface="맑은 고딕" panose="020B0503020000020004" pitchFamily="50" charset="-127"/>
-                <a:ea typeface="맑은 고딕" panose="020B0503020000020004" pitchFamily="50" charset="-127"/>
-              </a:rPr>
-              <a:t>, </a:t>
-            </a:r>
-            <a:r>
-              <a:rPr lang="ko-KR" altLang="en-US">
-                <a:latin typeface="맑은 고딕" panose="020B0503020000020004" pitchFamily="50" charset="-127"/>
-                <a:ea typeface="맑은 고딕" panose="020B0503020000020004" pitchFamily="50" charset="-127"/>
-              </a:rPr>
-              <a:t>흡수하는 빛의 색상</a:t>
-            </a:r>
-            <a:r>
-              <a:rPr lang="en-US" altLang="ko-KR">
-                <a:latin typeface="맑은 고딕" panose="020B0503020000020004" pitchFamily="50" charset="-127"/>
-                <a:ea typeface="맑은 고딕" panose="020B0503020000020004" pitchFamily="50" charset="-127"/>
-              </a:rPr>
-              <a:t>, </a:t>
-            </a:r>
-            <a:r>
-              <a:rPr lang="ko-KR" altLang="en-US">
-                <a:latin typeface="맑은 고딕" panose="020B0503020000020004" pitchFamily="50" charset="-127"/>
-                <a:ea typeface="맑은 고딕" panose="020B0503020000020004" pitchFamily="50" charset="-127"/>
-              </a:rPr>
-              <a:t>표면 아래 재질의 굴절률</a:t>
-            </a:r>
-            <a:r>
-              <a:rPr lang="en-US" altLang="ko-KR">
-                <a:latin typeface="맑은 고딕" panose="020B0503020000020004" pitchFamily="50" charset="-127"/>
-                <a:ea typeface="맑은 고딕" panose="020B0503020000020004" pitchFamily="50" charset="-127"/>
-              </a:rPr>
-              <a:t>, </a:t>
-            </a:r>
-            <a:r>
-              <a:rPr lang="ko-KR" altLang="en-US">
-                <a:latin typeface="맑은 고딕" panose="020B0503020000020004" pitchFamily="50" charset="-127"/>
-                <a:ea typeface="맑은 고딕" panose="020B0503020000020004" pitchFamily="50" charset="-127"/>
-              </a:rPr>
-              <a:t>투명도 등</a:t>
-            </a:r>
-            <a:r>
-              <a:rPr lang="en-US" altLang="ko-KR">
-                <a:latin typeface="맑은 고딕" panose="020B0503020000020004" pitchFamily="50" charset="-127"/>
-                <a:ea typeface="맑은 고딕" panose="020B0503020000020004" pitchFamily="50" charset="-127"/>
-              </a:rPr>
-              <a:t>..</a:t>
-            </a:r>
-            <a:endParaRPr lang="ko-KR" altLang="en-US" dirty="0">
-              <a:latin typeface="맑은 고딕" panose="020B0503020000020004" pitchFamily="50" charset="-127"/>
-              <a:ea typeface="맑은 고딕" panose="020B0503020000020004" pitchFamily="50" charset="-127"/>
-            </a:endParaRPr>
-          </a:p>
-        </p:txBody>
-      </p:sp>
-      <p:sp>
-        <p:nvSpPr>
-          <p:cNvPr id="4" name="슬라이드 번호 개체 틀 3"/>
-          <p:cNvSpPr>
-            <a:spLocks noGrp="1"/>
-          </p:cNvSpPr>
-          <p:nvPr>
-            <p:ph type="sldNum" sz="quarter" idx="10"/>
-          </p:nvPr>
-        </p:nvSpPr>
-        <p:spPr/>
-        <p:txBody>
-          <a:bodyPr/>
-          <a:lstStyle/>
-          <a:p>
-            <a:pPr rtl="0"/>
-            <a:fld id="{82869989-EB00-4EE7-BCB5-25BDC5BB29F8}" type="slidenum">
-              <a:rPr lang="en-US" altLang="ko-KR" smtClean="0">
-                <a:latin typeface="맑은 고딕" panose="020B0503020000020004" pitchFamily="50" charset="-127"/>
-                <a:ea typeface="맑은 고딕" panose="020B0503020000020004" pitchFamily="50" charset="-127"/>
-              </a:rPr>
-              <a:t>12</a:t>
-            </a:fld>
-            <a:endParaRPr lang="ko-KR" altLang="en-US" dirty="0">
-              <a:latin typeface="맑은 고딕" panose="020B0503020000020004" pitchFamily="50" charset="-127"/>
-              <a:ea typeface="맑은 고딕" panose="020B0503020000020004" pitchFamily="50" charset="-127"/>
-            </a:endParaRPr>
-          </a:p>
-        </p:txBody>
-      </p:sp>
-    </p:spTree>
-    <p:extLst>
-      <p:ext uri="{BB962C8B-B14F-4D97-AF65-F5344CB8AC3E}">
-        <p14:creationId xmlns:p14="http://schemas.microsoft.com/office/powerpoint/2010/main" val="3243089836"/>
-      </p:ext>
-    </p:extLst>
-  </p:cSld>
-  <p:clrMapOvr>
-    <a:masterClrMapping/>
-  </p:clrMapOvr>
-</p:notes>
-</file>
-
-<file path=ppt/notesSlides/notesSlide13.xml><?xml version="1.0" encoding="utf-8"?>
-<p:notes xmlns:a="http://schemas.openxmlformats.org/drawingml/2006/main" xmlns:r="http://schemas.openxmlformats.org/officeDocument/2006/relationships" xmlns:p="http://schemas.openxmlformats.org/presentationml/2006/main">
-  <p:cSld>
-    <p:spTree>
-      <p:nvGrpSpPr>
-        <p:cNvPr id="1" name=""/>
-        <p:cNvGrpSpPr/>
-        <p:nvPr/>
-      </p:nvGrpSpPr>
-      <p:grpSpPr>
-        <a:xfrm>
-          <a:off x="0" y="0"/>
-          <a:ext cx="0" cy="0"/>
-          <a:chOff x="0" y="0"/>
-          <a:chExt cx="0" cy="0"/>
-        </a:xfrm>
-      </p:grpSpPr>
-      <p:sp>
-        <p:nvSpPr>
-          <p:cNvPr id="2" name="슬라이드 이미지 개체 틀 1"/>
-          <p:cNvSpPr>
-            <a:spLocks noGrp="1" noRot="1" noChangeAspect="1"/>
-          </p:cNvSpPr>
-          <p:nvPr>
-            <p:ph type="sldImg"/>
-          </p:nvPr>
-        </p:nvSpPr>
-        <p:spPr/>
-      </p:sp>
-      <p:sp>
-        <p:nvSpPr>
-          <p:cNvPr id="3" name="슬라이드 노트 개체 틀 2"/>
-          <p:cNvSpPr>
-            <a:spLocks noGrp="1"/>
-          </p:cNvSpPr>
-          <p:nvPr>
-            <p:ph type="body" idx="1"/>
-          </p:nvPr>
-        </p:nvSpPr>
-        <p:spPr/>
-        <p:txBody>
-          <a:bodyPr/>
-          <a:lstStyle/>
-          <a:p>
-            <a:r>
-              <a:rPr lang="ko-KR" altLang="en-US">
-                <a:latin typeface="맑은 고딕" panose="020B0503020000020004" pitchFamily="50" charset="-127"/>
-                <a:ea typeface="맑은 고딕" panose="020B0503020000020004" pitchFamily="50" charset="-127"/>
-              </a:rPr>
-              <a:t>조명 사용시 정점 색상을 직접 지정하지 않는다</a:t>
-            </a:r>
-            <a:r>
-              <a:rPr lang="en-US" altLang="ko-KR">
-                <a:latin typeface="맑은 고딕" panose="020B0503020000020004" pitchFamily="50" charset="-127"/>
-                <a:ea typeface="맑은 고딕" panose="020B0503020000020004" pitchFamily="50" charset="-127"/>
-              </a:rPr>
-              <a:t>.</a:t>
-            </a:r>
-          </a:p>
-          <a:p>
-            <a:r>
-              <a:rPr lang="ko-KR" altLang="en-US">
-                <a:latin typeface="맑은 고딕" panose="020B0503020000020004" pitchFamily="50" charset="-127"/>
-                <a:ea typeface="맑은 고딕" panose="020B0503020000020004" pitchFamily="50" charset="-127"/>
-              </a:rPr>
-              <a:t>표면의 재질들과 표면에 비출 빛들을 지정하고 조명 방정식을 적용해서 정점 색상이 결정되게함</a:t>
-            </a:r>
-            <a:r>
-              <a:rPr lang="en-US" altLang="ko-KR">
-                <a:latin typeface="맑은 고딕" panose="020B0503020000020004" pitchFamily="50" charset="-127"/>
-                <a:ea typeface="맑은 고딕" panose="020B0503020000020004" pitchFamily="50" charset="-127"/>
-              </a:rPr>
-              <a:t>.</a:t>
-            </a:r>
-          </a:p>
-          <a:p>
-            <a:r>
-              <a:rPr lang="ko-KR" altLang="en-US">
-                <a:latin typeface="맑은 고딕" panose="020B0503020000020004" pitchFamily="50" charset="-127"/>
-                <a:ea typeface="맑은 고딕" panose="020B0503020000020004" pitchFamily="50" charset="-127"/>
-              </a:rPr>
-              <a:t>결론 적으로 물체의 색이 훨씬 더 사실적으로 나타남</a:t>
-            </a:r>
-            <a:r>
-              <a:rPr lang="en-US" altLang="ko-KR">
-                <a:latin typeface="맑은 고딕" panose="020B0503020000020004" pitchFamily="50" charset="-127"/>
-                <a:ea typeface="맑은 고딕" panose="020B0503020000020004" pitchFamily="50" charset="-127"/>
-              </a:rPr>
-              <a:t>.</a:t>
-            </a:r>
-          </a:p>
-          <a:p>
-            <a:endParaRPr lang="en-US" altLang="ko-KR">
-              <a:latin typeface="맑은 고딕" panose="020B0503020000020004" pitchFamily="50" charset="-127"/>
-              <a:ea typeface="맑은 고딕" panose="020B0503020000020004" pitchFamily="50" charset="-127"/>
-            </a:endParaRPr>
-          </a:p>
-          <a:p>
-            <a:r>
-              <a:rPr lang="ko-KR" altLang="en-US">
-                <a:latin typeface="맑은 고딕" panose="020B0503020000020004" pitchFamily="50" charset="-127"/>
-                <a:ea typeface="맑은 고딕" panose="020B0503020000020004" pitchFamily="50" charset="-127"/>
-              </a:rPr>
-              <a:t>재질의 속성 예 </a:t>
-            </a:r>
-            <a:r>
-              <a:rPr lang="en-US" altLang="ko-KR">
-                <a:latin typeface="맑은 고딕" panose="020B0503020000020004" pitchFamily="50" charset="-127"/>
-                <a:ea typeface="맑은 고딕" panose="020B0503020000020004" pitchFamily="50" charset="-127"/>
-              </a:rPr>
-              <a:t>: </a:t>
-            </a:r>
-            <a:r>
-              <a:rPr lang="ko-KR" altLang="en-US">
-                <a:latin typeface="맑은 고딕" panose="020B0503020000020004" pitchFamily="50" charset="-127"/>
-                <a:ea typeface="맑은 고딕" panose="020B0503020000020004" pitchFamily="50" charset="-127"/>
-              </a:rPr>
-              <a:t>표면이 반사</a:t>
-            </a:r>
-            <a:r>
-              <a:rPr lang="en-US" altLang="ko-KR">
-                <a:latin typeface="맑은 고딕" panose="020B0503020000020004" pitchFamily="50" charset="-127"/>
-                <a:ea typeface="맑은 고딕" panose="020B0503020000020004" pitchFamily="50" charset="-127"/>
-              </a:rPr>
-              <a:t>, </a:t>
-            </a:r>
-            <a:r>
-              <a:rPr lang="ko-KR" altLang="en-US">
-                <a:latin typeface="맑은 고딕" panose="020B0503020000020004" pitchFamily="50" charset="-127"/>
-                <a:ea typeface="맑은 고딕" panose="020B0503020000020004" pitchFamily="50" charset="-127"/>
-              </a:rPr>
-              <a:t>흡수하는 빛의 색상</a:t>
-            </a:r>
-            <a:r>
-              <a:rPr lang="en-US" altLang="ko-KR">
-                <a:latin typeface="맑은 고딕" panose="020B0503020000020004" pitchFamily="50" charset="-127"/>
-                <a:ea typeface="맑은 고딕" panose="020B0503020000020004" pitchFamily="50" charset="-127"/>
-              </a:rPr>
-              <a:t>, </a:t>
-            </a:r>
-            <a:r>
-              <a:rPr lang="ko-KR" altLang="en-US">
-                <a:latin typeface="맑은 고딕" panose="020B0503020000020004" pitchFamily="50" charset="-127"/>
-                <a:ea typeface="맑은 고딕" panose="020B0503020000020004" pitchFamily="50" charset="-127"/>
-              </a:rPr>
-              <a:t>표면 아래 재질의 굴절률</a:t>
-            </a:r>
-            <a:r>
-              <a:rPr lang="en-US" altLang="ko-KR">
-                <a:latin typeface="맑은 고딕" panose="020B0503020000020004" pitchFamily="50" charset="-127"/>
-                <a:ea typeface="맑은 고딕" panose="020B0503020000020004" pitchFamily="50" charset="-127"/>
-              </a:rPr>
-              <a:t>, </a:t>
-            </a:r>
-            <a:r>
-              <a:rPr lang="ko-KR" altLang="en-US">
-                <a:latin typeface="맑은 고딕" panose="020B0503020000020004" pitchFamily="50" charset="-127"/>
-                <a:ea typeface="맑은 고딕" panose="020B0503020000020004" pitchFamily="50" charset="-127"/>
-              </a:rPr>
-              <a:t>투명도 등</a:t>
-            </a:r>
-            <a:r>
-              <a:rPr lang="en-US" altLang="ko-KR">
-                <a:latin typeface="맑은 고딕" panose="020B0503020000020004" pitchFamily="50" charset="-127"/>
-                <a:ea typeface="맑은 고딕" panose="020B0503020000020004" pitchFamily="50" charset="-127"/>
-              </a:rPr>
-              <a:t>..</a:t>
-            </a:r>
-            <a:endParaRPr lang="ko-KR" altLang="en-US" dirty="0">
-              <a:latin typeface="맑은 고딕" panose="020B0503020000020004" pitchFamily="50" charset="-127"/>
-              <a:ea typeface="맑은 고딕" panose="020B0503020000020004" pitchFamily="50" charset="-127"/>
-            </a:endParaRPr>
-          </a:p>
-        </p:txBody>
-      </p:sp>
-      <p:sp>
-        <p:nvSpPr>
-          <p:cNvPr id="4" name="슬라이드 번호 개체 틀 3"/>
-          <p:cNvSpPr>
-            <a:spLocks noGrp="1"/>
-          </p:cNvSpPr>
-          <p:nvPr>
-            <p:ph type="sldNum" sz="quarter" idx="10"/>
-          </p:nvPr>
-        </p:nvSpPr>
-        <p:spPr/>
-        <p:txBody>
-          <a:bodyPr/>
-          <a:lstStyle/>
-          <a:p>
-            <a:pPr rtl="0"/>
-            <a:fld id="{82869989-EB00-4EE7-BCB5-25BDC5BB29F8}" type="slidenum">
-              <a:rPr lang="en-US" altLang="ko-KR" smtClean="0">
-                <a:latin typeface="맑은 고딕" panose="020B0503020000020004" pitchFamily="50" charset="-127"/>
-                <a:ea typeface="맑은 고딕" panose="020B0503020000020004" pitchFamily="50" charset="-127"/>
-              </a:rPr>
-              <a:t>13</a:t>
-            </a:fld>
-            <a:endParaRPr lang="ko-KR" altLang="en-US" dirty="0">
-              <a:latin typeface="맑은 고딕" panose="020B0503020000020004" pitchFamily="50" charset="-127"/>
-              <a:ea typeface="맑은 고딕" panose="020B0503020000020004" pitchFamily="50" charset="-127"/>
-            </a:endParaRPr>
-          </a:p>
-        </p:txBody>
-      </p:sp>
-    </p:spTree>
-    <p:extLst>
-      <p:ext uri="{BB962C8B-B14F-4D97-AF65-F5344CB8AC3E}">
-        <p14:creationId xmlns:p14="http://schemas.microsoft.com/office/powerpoint/2010/main" val="440198084"/>
-      </p:ext>
-    </p:extLst>
-  </p:cSld>
-  <p:clrMapOvr>
-    <a:masterClrMapping/>
-  </p:clrMapOvr>
-</p:notes>
-</file>
-
 <file path=ppt/notesSlides/notesSlide2.xml><?xml version="1.0" encoding="utf-8"?>
 <p:notes xmlns:a="http://schemas.openxmlformats.org/drawingml/2006/main" xmlns:r="http://schemas.openxmlformats.org/officeDocument/2006/relationships" xmlns:p="http://schemas.openxmlformats.org/presentationml/2006/main">
   <p:cSld>
@@ -2622,7 +1746,7 @@
     </p:spTree>
     <p:extLst>
       <p:ext uri="{BB962C8B-B14F-4D97-AF65-F5344CB8AC3E}">
-        <p14:creationId xmlns:p14="http://schemas.microsoft.com/office/powerpoint/2010/main" val="3078253949"/>
+        <p14:creationId xmlns:p14="http://schemas.microsoft.com/office/powerpoint/2010/main" val="2611428791"/>
       </p:ext>
     </p:extLst>
   </p:cSld>
@@ -2840,7 +1964,7 @@
     </p:spTree>
     <p:extLst>
       <p:ext uri="{BB962C8B-B14F-4D97-AF65-F5344CB8AC3E}">
-        <p14:creationId xmlns:p14="http://schemas.microsoft.com/office/powerpoint/2010/main" val="2955381849"/>
+        <p14:creationId xmlns:p14="http://schemas.microsoft.com/office/powerpoint/2010/main" val="2421936322"/>
       </p:ext>
     </p:extLst>
   </p:cSld>
@@ -3058,7 +2182,7 @@
     </p:spTree>
     <p:extLst>
       <p:ext uri="{BB962C8B-B14F-4D97-AF65-F5344CB8AC3E}">
-        <p14:creationId xmlns:p14="http://schemas.microsoft.com/office/powerpoint/2010/main" val="481700580"/>
+        <p14:creationId xmlns:p14="http://schemas.microsoft.com/office/powerpoint/2010/main" val="511797310"/>
       </p:ext>
     </p:extLst>
   </p:cSld>
@@ -3276,7 +2400,7 @@
     </p:spTree>
     <p:extLst>
       <p:ext uri="{BB962C8B-B14F-4D97-AF65-F5344CB8AC3E}">
-        <p14:creationId xmlns:p14="http://schemas.microsoft.com/office/powerpoint/2010/main" val="1301681016"/>
+        <p14:creationId xmlns:p14="http://schemas.microsoft.com/office/powerpoint/2010/main" val="428388404"/>
       </p:ext>
     </p:extLst>
   </p:cSld>
@@ -5490,7 +4614,7 @@
           <a:p>
             <a:fld id="{2A5B65E4-62A8-4988-B07B-5D6D443B14ED}" type="datetime4">
               <a:rPr lang="ko-KR" altLang="en-US" smtClean="0"/>
-              <a:t>2019년 7월 11일</a:t>
+              <a:t>2019년 7월 12일</a:t>
             </a:fld>
             <a:endParaRPr lang="ko-KR" altLang="en-US" dirty="0"/>
           </a:p>
@@ -5746,7 +4870,7 @@
           <a:p>
             <a:fld id="{58EB6286-0DE7-4336-9826-977AD102FCF2}" type="datetime4">
               <a:rPr lang="ko-KR" altLang="en-US" noProof="0" smtClean="0"/>
-              <a:t>2019년 7월 11일</a:t>
+              <a:t>2019년 7월 12일</a:t>
             </a:fld>
             <a:endParaRPr lang="ko-KR" altLang="en-US" noProof="0" dirty="0"/>
           </a:p>
@@ -5942,7 +5066,7 @@
             <a:pPr rtl="0"/>
             <a:fld id="{6A5419DA-7218-42E5-A443-F000500111E1}" type="datetime4">
               <a:rPr lang="ko-KR" altLang="en-US" noProof="0" smtClean="0"/>
-              <a:t>2019년 7월 11일</a:t>
+              <a:t>2019년 7월 12일</a:t>
             </a:fld>
             <a:endParaRPr lang="ko-KR" altLang="en-US" noProof="0" dirty="0"/>
           </a:p>
@@ -8343,7 +7467,7 @@
           <a:p>
             <a:fld id="{E498C52F-1DF1-4226-BAB6-C1E2EE4C9D62}" type="datetime4">
               <a:rPr lang="ko-KR" altLang="en-US" noProof="0" smtClean="0"/>
-              <a:t>2019년 7월 11일</a:t>
+              <a:t>2019년 7월 12일</a:t>
             </a:fld>
             <a:endParaRPr lang="ko-KR" altLang="en-US" noProof="0" dirty="0"/>
           </a:p>
@@ -8862,7 +7986,7 @@
           <a:p>
             <a:fld id="{7B1E1FFC-F755-4558-8D3C-A157D1A01A8A}" type="datetime4">
               <a:rPr lang="ko-KR" altLang="en-US" noProof="0" smtClean="0"/>
-              <a:t>2019년 7월 11일</a:t>
+              <a:t>2019년 7월 12일</a:t>
             </a:fld>
             <a:endParaRPr lang="ko-KR" altLang="en-US" noProof="0" dirty="0"/>
           </a:p>
@@ -9006,7 +8130,7 @@
             <a:pPr rtl="0"/>
             <a:fld id="{DA2A33C0-A4A8-4C90-B6DA-35B8CF58C816}" type="datetime4">
               <a:rPr lang="ko-KR" altLang="en-US" noProof="0" smtClean="0"/>
-              <a:t>2019년 7월 11일</a:t>
+              <a:t>2019년 7월 12일</a:t>
             </a:fld>
             <a:endParaRPr lang="ko-KR" altLang="en-US" noProof="0" dirty="0"/>
           </a:p>
@@ -10954,7 +10078,7 @@
           <a:p>
             <a:fld id="{53CB1B8F-A14A-4BE4-A9B9-3B263F04145C}" type="datetime4">
               <a:rPr lang="ko-KR" altLang="en-US" noProof="0" smtClean="0"/>
-              <a:t>2019년 7월 11일</a:t>
+              <a:t>2019년 7월 12일</a:t>
             </a:fld>
             <a:endParaRPr lang="ko-KR" altLang="en-US" noProof="0" dirty="0"/>
           </a:p>
@@ -13251,7 +12375,7 @@
           <a:p>
             <a:fld id="{5B9196A3-957C-4113-A568-B6ED9AEA3D01}" type="datetime4">
               <a:rPr lang="ko-KR" altLang="en-US" noProof="0" smtClean="0"/>
-              <a:t>2019년 7월 11일</a:t>
+              <a:t>2019년 7월 12일</a:t>
             </a:fld>
             <a:endParaRPr lang="ko-KR" altLang="en-US" noProof="0" dirty="0"/>
           </a:p>
@@ -17568,7 +16692,7 @@
           <a:p>
             <a:fld id="{28BEB146-D335-4DA5-9826-58595BCDBE2E}" type="datetime4">
               <a:rPr lang="ko-KR" altLang="en-US" noProof="0" smtClean="0"/>
-              <a:t>2019년 7월 11일</a:t>
+              <a:t>2019년 7월 12일</a:t>
             </a:fld>
             <a:endParaRPr lang="ko-KR" altLang="en-US" noProof="0" dirty="0"/>
           </a:p>
@@ -18120,1880 +17244,6 @@
 </p:sld>
 </file>
 
-<file path=ppt/slides/slide10.xml><?xml version="1.0" encoding="utf-8"?>
-<p:sld xmlns:a="http://schemas.openxmlformats.org/drawingml/2006/main" xmlns:r="http://schemas.openxmlformats.org/officeDocument/2006/relationships" xmlns:p="http://schemas.openxmlformats.org/presentationml/2006/main">
-  <p:cSld>
-    <p:spTree>
-      <p:nvGrpSpPr>
-        <p:cNvPr id="1" name=""/>
-        <p:cNvGrpSpPr/>
-        <p:nvPr/>
-      </p:nvGrpSpPr>
-      <p:grpSpPr>
-        <a:xfrm>
-          <a:off x="0" y="0"/>
-          <a:ext cx="0" cy="0"/>
-          <a:chOff x="0" y="0"/>
-          <a:chExt cx="0" cy="0"/>
-        </a:xfrm>
-      </p:grpSpPr>
-      <p:sp>
-        <p:nvSpPr>
-          <p:cNvPr id="26" name="TextBox 25"/>
-          <p:cNvSpPr txBox="1"/>
-          <p:nvPr/>
-        </p:nvSpPr>
-        <p:spPr>
-          <a:xfrm>
-            <a:off x="381869" y="1096372"/>
-            <a:ext cx="8084322" cy="4478149"/>
-          </a:xfrm>
-          <a:prstGeom prst="rect">
-            <a:avLst/>
-          </a:prstGeom>
-          <a:noFill/>
-          <a:ln>
-            <a:noFill/>
-          </a:ln>
-        </p:spPr>
-        <p:txBody>
-          <a:bodyPr wrap="square" rtlCol="0">
-            <a:spAutoFit/>
-          </a:bodyPr>
-          <a:lstStyle/>
-          <a:p>
-            <a:r>
-              <a:rPr lang="en-US" altLang="ko-KR" sz="1500" b="1" dirty="0"/>
-              <a:t>struct </a:t>
-            </a:r>
-            <a:r>
-              <a:rPr lang="en-US" altLang="ko-KR" sz="1500" b="1" dirty="0" err="1"/>
-              <a:t>HullOut</a:t>
-            </a:r>
-            <a:r>
-              <a:rPr lang="en-US" altLang="ko-KR" sz="1500" b="1" dirty="0"/>
-              <a:t>{</a:t>
-            </a:r>
-          </a:p>
-          <a:p>
-            <a:r>
-              <a:rPr lang="en-US" altLang="ko-KR" sz="1500" b="1" dirty="0"/>
-              <a:t>	float3 </a:t>
-            </a:r>
-            <a:r>
-              <a:rPr lang="en-US" altLang="ko-KR" sz="1500" b="1" dirty="0" err="1"/>
-              <a:t>PosL</a:t>
-            </a:r>
-            <a:r>
-              <a:rPr lang="en-US" altLang="ko-KR" sz="1500" b="1" dirty="0"/>
-              <a:t> : POSITION;</a:t>
-            </a:r>
-          </a:p>
-          <a:p>
-            <a:r>
-              <a:rPr lang="en-US" altLang="ko-KR" sz="1500" b="1" dirty="0"/>
-              <a:t>};</a:t>
-            </a:r>
-          </a:p>
-          <a:p>
-            <a:endParaRPr lang="en-US" altLang="ko-KR" sz="1500" b="1" dirty="0"/>
-          </a:p>
-          <a:p>
-            <a:r>
-              <a:rPr lang="en-US" altLang="ko-KR" sz="1500" b="1" dirty="0"/>
-              <a:t>[domain("quad")]</a:t>
-            </a:r>
-          </a:p>
-          <a:p>
-            <a:r>
-              <a:rPr lang="en-US" altLang="ko-KR" sz="1500" b="1" dirty="0"/>
-              <a:t>[partitioning("integer")]</a:t>
-            </a:r>
-          </a:p>
-          <a:p>
-            <a:r>
-              <a:rPr lang="en-US" altLang="ko-KR" sz="1500" b="1" dirty="0"/>
-              <a:t>[</a:t>
-            </a:r>
-            <a:r>
-              <a:rPr lang="en-US" altLang="ko-KR" sz="1500" b="1" dirty="0" err="1"/>
-              <a:t>outputtopology</a:t>
-            </a:r>
-            <a:r>
-              <a:rPr lang="en-US" altLang="ko-KR" sz="1500" b="1" dirty="0"/>
-              <a:t>("</a:t>
-            </a:r>
-            <a:r>
-              <a:rPr lang="en-US" altLang="ko-KR" sz="1500" b="1" dirty="0" err="1"/>
-              <a:t>triangle_cw</a:t>
-            </a:r>
-            <a:r>
-              <a:rPr lang="en-US" altLang="ko-KR" sz="1500" b="1" dirty="0"/>
-              <a:t>")]</a:t>
-            </a:r>
-          </a:p>
-          <a:p>
-            <a:r>
-              <a:rPr lang="en-US" altLang="ko-KR" sz="1500" b="1" dirty="0"/>
-              <a:t>[</a:t>
-            </a:r>
-            <a:r>
-              <a:rPr lang="en-US" altLang="ko-KR" sz="1500" b="1" dirty="0" err="1"/>
-              <a:t>outputcontrolpoints</a:t>
-            </a:r>
-            <a:r>
-              <a:rPr lang="en-US" altLang="ko-KR" sz="1500" b="1" dirty="0"/>
-              <a:t>(4)]</a:t>
-            </a:r>
-          </a:p>
-          <a:p>
-            <a:r>
-              <a:rPr lang="en-US" altLang="ko-KR" sz="1500" b="1" dirty="0"/>
-              <a:t>[</a:t>
-            </a:r>
-            <a:r>
-              <a:rPr lang="en-US" altLang="ko-KR" sz="1500" b="1" dirty="0" err="1"/>
-              <a:t>patchconstantfunc</a:t>
-            </a:r>
-            <a:r>
-              <a:rPr lang="en-US" altLang="ko-KR" sz="1500" b="1" dirty="0"/>
-              <a:t>("</a:t>
-            </a:r>
-            <a:r>
-              <a:rPr lang="en-US" altLang="ko-KR" sz="1500" b="1" dirty="0" err="1"/>
-              <a:t>ConstantHS</a:t>
-            </a:r>
-            <a:r>
-              <a:rPr lang="en-US" altLang="ko-KR" sz="1500" b="1" dirty="0"/>
-              <a:t>")]</a:t>
-            </a:r>
-          </a:p>
-          <a:p>
-            <a:r>
-              <a:rPr lang="en-US" altLang="ko-KR" sz="1500" b="1" dirty="0"/>
-              <a:t>[</a:t>
-            </a:r>
-            <a:r>
-              <a:rPr lang="en-US" altLang="ko-KR" sz="1500" b="1" dirty="0" err="1"/>
-              <a:t>maxtessfactor</a:t>
-            </a:r>
-            <a:r>
-              <a:rPr lang="en-US" altLang="ko-KR" sz="1500" b="1" dirty="0"/>
-              <a:t>(64.0f)]</a:t>
-            </a:r>
-          </a:p>
-          <a:p>
-            <a:r>
-              <a:rPr lang="en-US" altLang="ko-KR" sz="1500" b="1" dirty="0" err="1"/>
-              <a:t>HullOut</a:t>
-            </a:r>
-            <a:r>
-              <a:rPr lang="en-US" altLang="ko-KR" sz="1500" b="1" dirty="0"/>
-              <a:t> HS(</a:t>
-            </a:r>
-            <a:r>
-              <a:rPr lang="en-US" altLang="ko-KR" sz="1500" b="1" dirty="0" err="1"/>
-              <a:t>InputPatch</a:t>
-            </a:r>
-            <a:r>
-              <a:rPr lang="en-US" altLang="ko-KR" sz="1500" b="1" dirty="0"/>
-              <a:t>&lt;</a:t>
-            </a:r>
-            <a:r>
-              <a:rPr lang="en-US" altLang="ko-KR" sz="1500" b="1" dirty="0" err="1"/>
-              <a:t>VertexOut</a:t>
-            </a:r>
-            <a:r>
-              <a:rPr lang="en-US" altLang="ko-KR" sz="1500" b="1" dirty="0"/>
-              <a:t>, 4 &gt; p,</a:t>
-            </a:r>
-          </a:p>
-          <a:p>
-            <a:r>
-              <a:rPr lang="en-US" altLang="ko-KR" sz="1500" b="1" dirty="0"/>
-              <a:t>			</a:t>
-            </a:r>
-            <a:r>
-              <a:rPr lang="en-US" altLang="ko-KR" sz="1500" b="1" dirty="0" err="1"/>
-              <a:t>uint</a:t>
-            </a:r>
-            <a:r>
-              <a:rPr lang="en-US" altLang="ko-KR" sz="1500" b="1" dirty="0"/>
-              <a:t> </a:t>
-            </a:r>
-            <a:r>
-              <a:rPr lang="en-US" altLang="ko-KR" sz="1500" b="1" dirty="0" err="1"/>
-              <a:t>i</a:t>
-            </a:r>
-            <a:r>
-              <a:rPr lang="en-US" altLang="ko-KR" sz="1500" b="1" dirty="0"/>
-              <a:t> : </a:t>
-            </a:r>
-            <a:r>
-              <a:rPr lang="en-US" altLang="ko-KR" sz="1500" b="1" dirty="0" err="1"/>
-              <a:t>SV_OutputControlPointID</a:t>
-            </a:r>
-            <a:r>
-              <a:rPr lang="en-US" altLang="ko-KR" sz="1500" b="1" dirty="0"/>
-              <a:t>,</a:t>
-            </a:r>
-          </a:p>
-          <a:p>
-            <a:r>
-              <a:rPr lang="en-US" altLang="ko-KR" sz="1500" b="1" dirty="0"/>
-              <a:t>			</a:t>
-            </a:r>
-            <a:r>
-              <a:rPr lang="en-US" altLang="ko-KR" sz="1500" b="1" dirty="0" err="1"/>
-              <a:t>uint</a:t>
-            </a:r>
-            <a:r>
-              <a:rPr lang="en-US" altLang="ko-KR" sz="1500" b="1" dirty="0"/>
-              <a:t> </a:t>
-            </a:r>
-            <a:r>
-              <a:rPr lang="en-US" altLang="ko-KR" sz="1500" b="1" dirty="0" err="1"/>
-              <a:t>patchId</a:t>
-            </a:r>
-            <a:r>
-              <a:rPr lang="en-US" altLang="ko-KR" sz="1500" b="1" dirty="0"/>
-              <a:t> : </a:t>
-            </a:r>
-            <a:r>
-              <a:rPr lang="en-US" altLang="ko-KR" sz="1500" b="1" dirty="0" err="1"/>
-              <a:t>SV_PrimitiveID</a:t>
-            </a:r>
-            <a:r>
-              <a:rPr lang="en-US" altLang="ko-KR" sz="1500" b="1" dirty="0"/>
-              <a:t>){</a:t>
-            </a:r>
-          </a:p>
-          <a:p>
-            <a:r>
-              <a:rPr lang="en-US" altLang="ko-KR" sz="1500" b="1" dirty="0"/>
-              <a:t>	</a:t>
-            </a:r>
-            <a:r>
-              <a:rPr lang="en-US" altLang="ko-KR" sz="1500" b="1" dirty="0" err="1"/>
-              <a:t>HullOut</a:t>
-            </a:r>
-            <a:r>
-              <a:rPr lang="en-US" altLang="ko-KR" sz="1500" b="1" dirty="0"/>
-              <a:t> </a:t>
-            </a:r>
-            <a:r>
-              <a:rPr lang="en-US" altLang="ko-KR" sz="1500" b="1" dirty="0" err="1"/>
-              <a:t>hout</a:t>
-            </a:r>
-            <a:r>
-              <a:rPr lang="en-US" altLang="ko-KR" sz="1500" b="1" dirty="0"/>
-              <a:t>;</a:t>
-            </a:r>
-          </a:p>
-          <a:p>
-            <a:endParaRPr lang="en-US" altLang="ko-KR" sz="1500" b="1" dirty="0"/>
-          </a:p>
-          <a:p>
-            <a:r>
-              <a:rPr lang="en-US" altLang="ko-KR" sz="1500" b="1" dirty="0"/>
-              <a:t>	</a:t>
-            </a:r>
-            <a:r>
-              <a:rPr lang="en-US" altLang="ko-KR" sz="1500" b="1" dirty="0" err="1"/>
-              <a:t>hout.PosL</a:t>
-            </a:r>
-            <a:r>
-              <a:rPr lang="en-US" altLang="ko-KR" sz="1500" b="1" dirty="0"/>
-              <a:t> = p[</a:t>
-            </a:r>
-            <a:r>
-              <a:rPr lang="en-US" altLang="ko-KR" sz="1500" b="1" dirty="0" err="1"/>
-              <a:t>i</a:t>
-            </a:r>
-            <a:r>
-              <a:rPr lang="en-US" altLang="ko-KR" sz="1500" b="1" dirty="0"/>
-              <a:t>].</a:t>
-            </a:r>
-            <a:r>
-              <a:rPr lang="en-US" altLang="ko-KR" sz="1500" b="1" dirty="0" err="1"/>
-              <a:t>PosL</a:t>
-            </a:r>
-            <a:r>
-              <a:rPr lang="en-US" altLang="ko-KR" sz="1500" b="1" dirty="0"/>
-              <a:t>;</a:t>
-            </a:r>
-          </a:p>
-          <a:p>
-            <a:endParaRPr lang="en-US" altLang="ko-KR" sz="1500" b="1" dirty="0"/>
-          </a:p>
-          <a:p>
-            <a:r>
-              <a:rPr lang="en-US" altLang="ko-KR" sz="1500" b="1" dirty="0"/>
-              <a:t>	return </a:t>
-            </a:r>
-            <a:r>
-              <a:rPr lang="en-US" altLang="ko-KR" sz="1500" b="1" dirty="0" err="1"/>
-              <a:t>hout</a:t>
-            </a:r>
-            <a:r>
-              <a:rPr lang="en-US" altLang="ko-KR" sz="1500" b="1" dirty="0"/>
-              <a:t>;</a:t>
-            </a:r>
-          </a:p>
-          <a:p>
-            <a:r>
-              <a:rPr lang="en-US" altLang="ko-KR" sz="1500" b="1" dirty="0"/>
-              <a:t>}</a:t>
-            </a:r>
-            <a:endParaRPr lang="ko-KR" altLang="en-US" sz="1500" b="1" dirty="0"/>
-          </a:p>
-        </p:txBody>
-      </p:sp>
-      <p:sp>
-        <p:nvSpPr>
-          <p:cNvPr id="23" name="TextBox 22">
-            <a:extLst>
-              <a:ext uri="{FF2B5EF4-FFF2-40B4-BE49-F238E27FC236}">
-                <a16:creationId xmlns:a16="http://schemas.microsoft.com/office/drawing/2014/main" id="{C99C06AF-3CD0-4246-BE52-56C13B66AEEA}"/>
-              </a:ext>
-            </a:extLst>
-          </p:cNvPr>
-          <p:cNvSpPr txBox="1"/>
-          <p:nvPr/>
-        </p:nvSpPr>
-        <p:spPr>
-          <a:xfrm>
-            <a:off x="3912782" y="434714"/>
-            <a:ext cx="7740504" cy="1015663"/>
-          </a:xfrm>
-          <a:prstGeom prst="rect">
-            <a:avLst/>
-          </a:prstGeom>
-          <a:noFill/>
-          <a:ln w="28575">
-            <a:solidFill>
-              <a:srgbClr val="FF0000"/>
-            </a:solidFill>
-          </a:ln>
-        </p:spPr>
-        <p:txBody>
-          <a:bodyPr wrap="square" rtlCol="0">
-            <a:spAutoFit/>
-          </a:bodyPr>
-          <a:lstStyle/>
-          <a:p>
-            <a:r>
-              <a:rPr lang="ko-KR" altLang="en-US" sz="1500" dirty="0"/>
-              <a:t>▶ </a:t>
-            </a:r>
-            <a:r>
-              <a:rPr lang="en-US" altLang="ko-KR" sz="1500" b="1" dirty="0" err="1"/>
-              <a:t>InputPatch</a:t>
-            </a:r>
-            <a:r>
-              <a:rPr lang="en-US" altLang="ko-KR" sz="1500" dirty="0"/>
-              <a:t> </a:t>
-            </a:r>
-            <a:r>
-              <a:rPr lang="ko-KR" altLang="en-US" sz="1500" dirty="0"/>
-              <a:t>매개변수를 통해 패치의 모든 제어점을 입력 받음</a:t>
-            </a:r>
-            <a:r>
-              <a:rPr lang="en-US" altLang="ko-KR" sz="1500" dirty="0"/>
-              <a:t>.</a:t>
-            </a:r>
-          </a:p>
-          <a:p>
-            <a:r>
-              <a:rPr lang="ko-KR" altLang="en-US" sz="1500" dirty="0"/>
-              <a:t>▶ </a:t>
-            </a:r>
-            <a:r>
-              <a:rPr lang="en-US" altLang="ko-KR" sz="1500" b="1" dirty="0" err="1"/>
-              <a:t>SV_OutputControlPointID</a:t>
-            </a:r>
-            <a:r>
-              <a:rPr lang="ko-KR" altLang="en-US" sz="1500" dirty="0"/>
-              <a:t>는 현재 출력할 제어점의 색인</a:t>
-            </a:r>
-            <a:r>
-              <a:rPr lang="en-US" altLang="ko-KR" sz="1500" dirty="0"/>
-              <a:t>.</a:t>
-            </a:r>
-          </a:p>
-          <a:p>
-            <a:endParaRPr lang="en-US" altLang="ko-KR" sz="1500" dirty="0"/>
-          </a:p>
-          <a:p>
-            <a:r>
-              <a:rPr lang="en-US" altLang="ko-KR" sz="1500" dirty="0"/>
-              <a:t>※ </a:t>
-            </a:r>
-            <a:r>
-              <a:rPr lang="ko-KR" altLang="en-US" sz="1500" b="1" dirty="0"/>
-              <a:t>입력 패치의 </a:t>
-            </a:r>
-            <a:r>
-              <a:rPr lang="ko-KR" altLang="en-US" sz="1500" b="1" dirty="0" err="1"/>
-              <a:t>제어점</a:t>
-            </a:r>
-            <a:r>
-              <a:rPr lang="ko-KR" altLang="en-US" sz="1500" b="1" dirty="0"/>
-              <a:t> 개수</a:t>
-            </a:r>
-            <a:r>
-              <a:rPr lang="ko-KR" altLang="en-US" sz="1500" dirty="0"/>
-              <a:t>와 </a:t>
-            </a:r>
-            <a:r>
-              <a:rPr lang="ko-KR" altLang="en-US" sz="1500" b="1" dirty="0"/>
-              <a:t>출력 </a:t>
-            </a:r>
-            <a:r>
-              <a:rPr lang="ko-KR" altLang="en-US" sz="1500" b="1" dirty="0" err="1"/>
-              <a:t>제어점</a:t>
-            </a:r>
-            <a:r>
-              <a:rPr lang="ko-KR" altLang="en-US" sz="1500" b="1" dirty="0"/>
-              <a:t> 개수</a:t>
-            </a:r>
-            <a:r>
-              <a:rPr lang="ko-KR" altLang="en-US" sz="1500" dirty="0"/>
-              <a:t>가 반드시 일치해야 하는 것은 아님을 주의</a:t>
-            </a:r>
-            <a:r>
-              <a:rPr lang="en-US" altLang="ko-KR" sz="1500" dirty="0"/>
-              <a:t>.</a:t>
-            </a:r>
-          </a:p>
-        </p:txBody>
-      </p:sp>
-      <p:sp>
-        <p:nvSpPr>
-          <p:cNvPr id="29" name="TextBox 28">
-            <a:extLst>
-              <a:ext uri="{FF2B5EF4-FFF2-40B4-BE49-F238E27FC236}">
-                <a16:creationId xmlns:a16="http://schemas.microsoft.com/office/drawing/2014/main" id="{21E7EBDE-9380-4DB7-A246-599BC7697C02}"/>
-              </a:ext>
-            </a:extLst>
-          </p:cNvPr>
-          <p:cNvSpPr txBox="1"/>
-          <p:nvPr/>
-        </p:nvSpPr>
-        <p:spPr>
-          <a:xfrm>
-            <a:off x="6347637" y="2640187"/>
-            <a:ext cx="5612218" cy="3323987"/>
-          </a:xfrm>
-          <a:prstGeom prst="rect">
-            <a:avLst/>
-          </a:prstGeom>
-          <a:noFill/>
-          <a:ln w="28575">
-            <a:solidFill>
-              <a:srgbClr val="FF0000"/>
-            </a:solidFill>
-          </a:ln>
-        </p:spPr>
-        <p:txBody>
-          <a:bodyPr wrap="square" rtlCol="0">
-            <a:spAutoFit/>
-          </a:bodyPr>
-          <a:lstStyle/>
-          <a:p>
-            <a:r>
-              <a:rPr lang="ko-KR" altLang="en-US" sz="1500" dirty="0"/>
-              <a:t>▶</a:t>
-            </a:r>
-            <a:r>
-              <a:rPr lang="en-US" altLang="ko-KR" sz="1500" b="1" dirty="0"/>
-              <a:t>domain</a:t>
-            </a:r>
-            <a:r>
-              <a:rPr lang="en-US" altLang="ko-KR" sz="1500" dirty="0"/>
-              <a:t> : </a:t>
-            </a:r>
-            <a:r>
-              <a:rPr lang="ko-KR" altLang="en-US" sz="1500" dirty="0"/>
-              <a:t>패치 종류</a:t>
-            </a:r>
-            <a:endParaRPr lang="en-US" altLang="ko-KR" sz="1500" dirty="0"/>
-          </a:p>
-          <a:p>
-            <a:endParaRPr lang="en-US" altLang="ko-KR" sz="1500" dirty="0"/>
-          </a:p>
-          <a:p>
-            <a:r>
-              <a:rPr lang="ko-KR" altLang="en-US" sz="1500" dirty="0"/>
-              <a:t>▶</a:t>
-            </a:r>
-            <a:r>
-              <a:rPr lang="en-US" altLang="ko-KR" sz="1500" b="1" dirty="0"/>
-              <a:t>partitioning</a:t>
-            </a:r>
-            <a:r>
-              <a:rPr lang="en-US" altLang="ko-KR" sz="1500" dirty="0"/>
-              <a:t> : tessellation </a:t>
-            </a:r>
-            <a:r>
-              <a:rPr lang="ko-KR" altLang="en-US" sz="1500" dirty="0"/>
-              <a:t>세분 모드를 결정</a:t>
-            </a:r>
-            <a:endParaRPr lang="en-US" altLang="ko-KR" sz="1500" dirty="0"/>
-          </a:p>
-          <a:p>
-            <a:endParaRPr lang="en-US" altLang="ko-KR" sz="1500" dirty="0"/>
-          </a:p>
-          <a:p>
-            <a:r>
-              <a:rPr lang="ko-KR" altLang="en-US" sz="1500" dirty="0"/>
-              <a:t>▶</a:t>
-            </a:r>
-            <a:r>
-              <a:rPr lang="en-US" altLang="ko-KR" sz="1500" b="1" dirty="0" err="1"/>
-              <a:t>ouputtopology</a:t>
-            </a:r>
-            <a:r>
-              <a:rPr lang="en-US" altLang="ko-KR" sz="1500" dirty="0"/>
-              <a:t> : </a:t>
-            </a:r>
-            <a:r>
-              <a:rPr lang="ko-KR" altLang="en-US" sz="1500" dirty="0"/>
-              <a:t>세분으로</a:t>
-            </a:r>
-            <a:r>
-              <a:rPr lang="en-US" altLang="ko-KR" sz="1500" dirty="0"/>
-              <a:t> </a:t>
-            </a:r>
-            <a:r>
-              <a:rPr lang="ko-KR" altLang="en-US" sz="1500" dirty="0"/>
-              <a:t>만들어지는 삼각형들의 정점 잠김 순서를 결정</a:t>
-            </a:r>
-            <a:endParaRPr lang="en-US" altLang="ko-KR" sz="1500" dirty="0"/>
-          </a:p>
-          <a:p>
-            <a:endParaRPr lang="en-US" altLang="ko-KR" sz="1500" dirty="0"/>
-          </a:p>
-          <a:p>
-            <a:r>
-              <a:rPr lang="ko-KR" altLang="en-US" sz="1500" dirty="0"/>
-              <a:t>▶</a:t>
-            </a:r>
-            <a:r>
-              <a:rPr lang="en-US" altLang="ko-KR" sz="1500" b="1" dirty="0" err="1"/>
-              <a:t>outputcontrolpoints</a:t>
-            </a:r>
-            <a:r>
-              <a:rPr lang="en-US" altLang="ko-KR" sz="1500" dirty="0"/>
-              <a:t> : </a:t>
-            </a:r>
-            <a:r>
-              <a:rPr lang="ko-KR" altLang="en-US" sz="1500" dirty="0"/>
-              <a:t>하나의 입력 패치에 대해 덮개 </a:t>
-            </a:r>
-            <a:r>
-              <a:rPr lang="ko-KR" altLang="en-US" sz="1500" dirty="0" err="1"/>
-              <a:t>셰이더가</a:t>
-            </a:r>
-            <a:r>
-              <a:rPr lang="ko-KR" altLang="en-US" sz="1500" dirty="0"/>
-              <a:t> 출력할 </a:t>
-            </a:r>
-            <a:r>
-              <a:rPr lang="ko-KR" altLang="en-US" sz="1500" dirty="0" err="1"/>
-              <a:t>제어점</a:t>
-            </a:r>
-            <a:r>
-              <a:rPr lang="ko-KR" altLang="en-US" sz="1500" dirty="0"/>
-              <a:t> 개수</a:t>
-            </a:r>
-            <a:endParaRPr lang="en-US" altLang="ko-KR" sz="1500" dirty="0"/>
-          </a:p>
-          <a:p>
-            <a:endParaRPr lang="en-US" altLang="ko-KR" sz="1500" dirty="0"/>
-          </a:p>
-          <a:p>
-            <a:r>
-              <a:rPr lang="ko-KR" altLang="en-US" sz="1500" dirty="0"/>
-              <a:t>▶</a:t>
-            </a:r>
-            <a:r>
-              <a:rPr lang="en-US" altLang="ko-KR" sz="1500" b="1" dirty="0" err="1"/>
-              <a:t>patchconstantfunc</a:t>
-            </a:r>
-            <a:r>
-              <a:rPr lang="en-US" altLang="ko-KR" sz="1500" dirty="0"/>
-              <a:t> : </a:t>
-            </a:r>
-            <a:r>
-              <a:rPr lang="ko-KR" altLang="en-US" sz="1500" dirty="0"/>
-              <a:t>상수 덮개 </a:t>
-            </a:r>
-            <a:r>
-              <a:rPr lang="ko-KR" altLang="en-US" sz="1500" dirty="0" err="1"/>
-              <a:t>셰이더</a:t>
-            </a:r>
-            <a:r>
-              <a:rPr lang="ko-KR" altLang="en-US" sz="1500" dirty="0"/>
-              <a:t> 함수의 이름</a:t>
-            </a:r>
-            <a:endParaRPr lang="en-US" altLang="ko-KR" sz="1500" dirty="0"/>
-          </a:p>
-          <a:p>
-            <a:endParaRPr lang="en-US" altLang="ko-KR" sz="1500" dirty="0"/>
-          </a:p>
-          <a:p>
-            <a:r>
-              <a:rPr lang="ko-KR" altLang="en-US" sz="1500" dirty="0"/>
-              <a:t>▶</a:t>
-            </a:r>
-            <a:r>
-              <a:rPr lang="en-US" altLang="ko-KR" sz="1500" b="1" dirty="0" err="1"/>
-              <a:t>maxtessfactor</a:t>
-            </a:r>
-            <a:r>
-              <a:rPr lang="en-US" altLang="ko-KR" sz="1500" dirty="0"/>
-              <a:t> : </a:t>
-            </a:r>
-            <a:r>
-              <a:rPr lang="ko-KR" altLang="en-US" sz="1500" dirty="0" err="1"/>
-              <a:t>셰이더가</a:t>
-            </a:r>
-            <a:r>
-              <a:rPr lang="ko-KR" altLang="en-US" sz="1500" dirty="0"/>
-              <a:t> 사용할 </a:t>
-            </a:r>
-            <a:r>
-              <a:rPr lang="en-US" altLang="ko-KR" sz="1500" dirty="0"/>
-              <a:t>tessellation factor</a:t>
-            </a:r>
-            <a:r>
-              <a:rPr lang="ko-KR" altLang="en-US" sz="1500" dirty="0"/>
-              <a:t>들의 최대값을 드라이버에게 </a:t>
-            </a:r>
-            <a:r>
-              <a:rPr lang="ko-KR" altLang="en-US" sz="1500" dirty="0" err="1"/>
-              <a:t>귀뜸해</a:t>
-            </a:r>
-            <a:r>
-              <a:rPr lang="ko-KR" altLang="en-US" sz="1500" dirty="0"/>
-              <a:t> 주는 역할</a:t>
-            </a:r>
-            <a:endParaRPr lang="en-US" altLang="ko-KR" sz="1500" dirty="0"/>
-          </a:p>
-        </p:txBody>
-      </p:sp>
-    </p:spTree>
-    <p:extLst>
-      <p:ext uri="{BB962C8B-B14F-4D97-AF65-F5344CB8AC3E}">
-        <p14:creationId xmlns:p14="http://schemas.microsoft.com/office/powerpoint/2010/main" val="3229171051"/>
-      </p:ext>
-    </p:extLst>
-  </p:cSld>
-  <p:clrMapOvr>
-    <a:masterClrMapping/>
-  </p:clrMapOvr>
-  <mc:AlternateContent xmlns:mc="http://schemas.openxmlformats.org/markup-compatibility/2006" xmlns:p14="http://schemas.microsoft.com/office/powerpoint/2010/main">
-    <mc:Choice Requires="p14">
-      <p:transition spd="med" p14:dur="700">
-        <p:fade/>
-      </p:transition>
-    </mc:Choice>
-    <mc:Fallback xmlns="">
-      <p:transition spd="med">
-        <p:fade/>
-      </p:transition>
-    </mc:Fallback>
-  </mc:AlternateContent>
-</p:sld>
-</file>
-
-<file path=ppt/slides/slide11.xml><?xml version="1.0" encoding="utf-8"?>
-<p:sld xmlns:a="http://schemas.openxmlformats.org/drawingml/2006/main" xmlns:r="http://schemas.openxmlformats.org/officeDocument/2006/relationships" xmlns:p="http://schemas.openxmlformats.org/presentationml/2006/main">
-  <p:cSld>
-    <p:spTree>
-      <p:nvGrpSpPr>
-        <p:cNvPr id="1" name=""/>
-        <p:cNvGrpSpPr/>
-        <p:nvPr/>
-      </p:nvGrpSpPr>
-      <p:grpSpPr>
-        <a:xfrm>
-          <a:off x="0" y="0"/>
-          <a:ext cx="0" cy="0"/>
-          <a:chOff x="0" y="0"/>
-          <a:chExt cx="0" cy="0"/>
-        </a:xfrm>
-      </p:grpSpPr>
-      <p:sp>
-        <p:nvSpPr>
-          <p:cNvPr id="13" name="TextBox 12">
-            <a:extLst>
-              <a:ext uri="{FF2B5EF4-FFF2-40B4-BE49-F238E27FC236}">
-                <a16:creationId xmlns:a16="http://schemas.microsoft.com/office/drawing/2014/main" id="{E3BD4E8B-3D9E-436C-897B-A5797C1E1B1E}"/>
-              </a:ext>
-            </a:extLst>
-          </p:cNvPr>
-          <p:cNvSpPr txBox="1"/>
-          <p:nvPr/>
-        </p:nvSpPr>
-        <p:spPr>
-          <a:xfrm>
-            <a:off x="883388" y="991705"/>
-            <a:ext cx="8244663" cy="1246495"/>
-          </a:xfrm>
-          <a:prstGeom prst="rect">
-            <a:avLst/>
-          </a:prstGeom>
-          <a:noFill/>
-          <a:ln>
-            <a:noFill/>
-          </a:ln>
-        </p:spPr>
-        <p:txBody>
-          <a:bodyPr wrap="square" rtlCol="0">
-            <a:spAutoFit/>
-          </a:bodyPr>
-          <a:lstStyle/>
-          <a:p>
-            <a:r>
-              <a:rPr lang="ko-KR" altLang="en-US" sz="1500" dirty="0"/>
-              <a:t>▶ 응용 프로그램이 관여할 여지가 없음</a:t>
-            </a:r>
-            <a:r>
-              <a:rPr lang="en-US" altLang="ko-KR" sz="1500" dirty="0"/>
-              <a:t>.</a:t>
-            </a:r>
-          </a:p>
-          <a:p>
-            <a:endParaRPr lang="en-US" altLang="ko-KR" sz="1500" dirty="0"/>
-          </a:p>
-          <a:p>
-            <a:r>
-              <a:rPr lang="ko-KR" altLang="en-US" sz="1500" dirty="0"/>
-              <a:t>▶ </a:t>
-            </a:r>
-            <a:r>
-              <a:rPr lang="en-US" altLang="ko-KR" sz="1500" dirty="0"/>
-              <a:t>CHS</a:t>
-            </a:r>
-            <a:r>
-              <a:rPr lang="ko-KR" altLang="en-US" sz="1500" dirty="0"/>
-              <a:t>가 출력한 </a:t>
-            </a:r>
-            <a:r>
-              <a:rPr lang="en-US" altLang="ko-KR" sz="1500" dirty="0"/>
-              <a:t>Tessellation Factor</a:t>
-            </a:r>
-            <a:r>
-              <a:rPr lang="ko-KR" altLang="en-US" sz="1500" dirty="0"/>
-              <a:t>들에 기초해 패치들을 실제로 </a:t>
-            </a:r>
-            <a:r>
-              <a:rPr lang="en-US" altLang="ko-KR" sz="1500" dirty="0"/>
-              <a:t>Tessellation </a:t>
-            </a:r>
-            <a:r>
-              <a:rPr lang="ko-KR" altLang="en-US" sz="1500" dirty="0"/>
-              <a:t>한다</a:t>
-            </a:r>
-            <a:r>
-              <a:rPr lang="en-US" altLang="ko-KR" sz="1500" dirty="0"/>
-              <a:t>.</a:t>
-            </a:r>
-          </a:p>
-          <a:p>
-            <a:endParaRPr lang="en-US" altLang="ko-KR" sz="1500" dirty="0"/>
-          </a:p>
-          <a:p>
-            <a:r>
-              <a:rPr lang="ko-KR" altLang="en-US" sz="1500" dirty="0"/>
-              <a:t>▶ 구체적인 작업은 전적으로 하드웨어가 제어</a:t>
-            </a:r>
-            <a:r>
-              <a:rPr lang="en-US" altLang="ko-KR" sz="1500" dirty="0"/>
-              <a:t>.</a:t>
-            </a:r>
-          </a:p>
-        </p:txBody>
-      </p:sp>
-      <p:sp>
-        <p:nvSpPr>
-          <p:cNvPr id="5" name="제목 1">
-            <a:extLst>
-              <a:ext uri="{FF2B5EF4-FFF2-40B4-BE49-F238E27FC236}">
-                <a16:creationId xmlns:a16="http://schemas.microsoft.com/office/drawing/2014/main" id="{7FFB8550-2798-45B5-AB24-D2108B252C73}"/>
-              </a:ext>
-            </a:extLst>
-          </p:cNvPr>
-          <p:cNvSpPr txBox="1">
-            <a:spLocks/>
-          </p:cNvSpPr>
-          <p:nvPr/>
-        </p:nvSpPr>
-        <p:spPr>
-          <a:xfrm>
-            <a:off x="883388" y="518922"/>
-            <a:ext cx="9601200" cy="450711"/>
-          </a:xfrm>
-          <a:prstGeom prst="rect">
-            <a:avLst/>
-          </a:prstGeom>
-        </p:spPr>
-        <p:txBody>
-          <a:bodyPr vert="horz" lIns="91440" tIns="45720" rIns="91440" bIns="45720" rtlCol="0" anchor="b">
-            <a:noAutofit/>
-          </a:bodyPr>
-          <a:lstStyle>
-            <a:lvl1pPr algn="l" defTabSz="914400" rtl="0" eaLnBrk="1" latinLnBrk="1" hangingPunct="1">
-              <a:lnSpc>
-                <a:spcPct val="90000"/>
-              </a:lnSpc>
-              <a:spcBef>
-                <a:spcPct val="0"/>
-              </a:spcBef>
-              <a:buNone/>
-              <a:defRPr sz="3200" b="1" kern="1200">
-                <a:solidFill>
-                  <a:schemeClr val="accent1">
-                    <a:lumMod val="75000"/>
-                  </a:schemeClr>
-                </a:solidFill>
-                <a:latin typeface="맑은 고딕" panose="020B0503020000020004" pitchFamily="50" charset="-127"/>
-                <a:ea typeface="맑은 고딕" panose="020B0503020000020004" pitchFamily="50" charset="-127"/>
-                <a:cs typeface="+mj-cs"/>
-              </a:defRPr>
-            </a:lvl1pPr>
-          </a:lstStyle>
-          <a:p>
-            <a:r>
-              <a:rPr lang="en-US" altLang="ko-KR" dirty="0"/>
-              <a:t>3. Tessellation</a:t>
-            </a:r>
-            <a:r>
-              <a:rPr lang="ko-KR" altLang="en-US" dirty="0"/>
-              <a:t> </a:t>
-            </a:r>
-            <a:r>
-              <a:rPr lang="en-US" altLang="ko-KR" dirty="0"/>
-              <a:t>Stage</a:t>
-            </a:r>
-          </a:p>
-        </p:txBody>
-      </p:sp>
-      <p:pic>
-        <p:nvPicPr>
-          <p:cNvPr id="3" name="그림 2">
-            <a:extLst>
-              <a:ext uri="{FF2B5EF4-FFF2-40B4-BE49-F238E27FC236}">
-                <a16:creationId xmlns:a16="http://schemas.microsoft.com/office/drawing/2014/main" id="{CF0068B2-FE23-4BD5-ACD6-F38C6F7FB0DC}"/>
-              </a:ext>
-            </a:extLst>
-          </p:cNvPr>
-          <p:cNvPicPr>
-            <a:picLocks noChangeAspect="1"/>
-          </p:cNvPicPr>
-          <p:nvPr/>
-        </p:nvPicPr>
-        <p:blipFill>
-          <a:blip r:embed="rId3"/>
-          <a:stretch>
-            <a:fillRect/>
-          </a:stretch>
-        </p:blipFill>
-        <p:spPr>
-          <a:xfrm>
-            <a:off x="109626" y="2357407"/>
-            <a:ext cx="5153491" cy="3447970"/>
-          </a:xfrm>
-          <a:prstGeom prst="rect">
-            <a:avLst/>
-          </a:prstGeom>
-        </p:spPr>
-      </p:pic>
-      <p:pic>
-        <p:nvPicPr>
-          <p:cNvPr id="6" name="그림 5">
-            <a:extLst>
-              <a:ext uri="{FF2B5EF4-FFF2-40B4-BE49-F238E27FC236}">
-                <a16:creationId xmlns:a16="http://schemas.microsoft.com/office/drawing/2014/main" id="{DA276CA1-68EB-412F-80BA-F4DB0E990EDC}"/>
-              </a:ext>
-            </a:extLst>
-          </p:cNvPr>
-          <p:cNvPicPr>
-            <a:picLocks noChangeAspect="1"/>
-          </p:cNvPicPr>
-          <p:nvPr/>
-        </p:nvPicPr>
-        <p:blipFill>
-          <a:blip r:embed="rId4"/>
-          <a:stretch>
-            <a:fillRect/>
-          </a:stretch>
-        </p:blipFill>
-        <p:spPr>
-          <a:xfrm>
-            <a:off x="6915998" y="1925355"/>
-            <a:ext cx="4392614" cy="3940940"/>
-          </a:xfrm>
-          <a:prstGeom prst="rect">
-            <a:avLst/>
-          </a:prstGeom>
-        </p:spPr>
-      </p:pic>
-      <p:sp>
-        <p:nvSpPr>
-          <p:cNvPr id="8" name="TextBox 7">
-            <a:extLst>
-              <a:ext uri="{FF2B5EF4-FFF2-40B4-BE49-F238E27FC236}">
-                <a16:creationId xmlns:a16="http://schemas.microsoft.com/office/drawing/2014/main" id="{CC697030-A5DE-4F6A-A4C6-77D0AB033B00}"/>
-              </a:ext>
-            </a:extLst>
-          </p:cNvPr>
-          <p:cNvSpPr txBox="1"/>
-          <p:nvPr/>
-        </p:nvSpPr>
-        <p:spPr>
-          <a:xfrm>
-            <a:off x="0" y="5866295"/>
-            <a:ext cx="5922335" cy="276999"/>
-          </a:xfrm>
-          <a:prstGeom prst="rect">
-            <a:avLst/>
-          </a:prstGeom>
-          <a:noFill/>
-          <a:ln>
-            <a:noFill/>
-          </a:ln>
-        </p:spPr>
-        <p:txBody>
-          <a:bodyPr wrap="square" rtlCol="0">
-            <a:spAutoFit/>
-          </a:bodyPr>
-          <a:lstStyle/>
-          <a:p>
-            <a:r>
-              <a:rPr lang="ko-KR" altLang="en-US" sz="1200" b="1" dirty="0"/>
-              <a:t>변 </a:t>
-            </a:r>
-            <a:r>
-              <a:rPr lang="ko-KR" altLang="en-US" sz="1200" b="1" dirty="0" err="1"/>
-              <a:t>테셀레이션</a:t>
-            </a:r>
-            <a:r>
-              <a:rPr lang="ko-KR" altLang="en-US" sz="1200" b="1" dirty="0"/>
-              <a:t> 계수와 내부 </a:t>
-            </a:r>
-            <a:r>
-              <a:rPr lang="ko-KR" altLang="en-US" sz="1200" b="1" dirty="0" err="1"/>
-              <a:t>테셀레이션</a:t>
-            </a:r>
-            <a:r>
-              <a:rPr lang="ko-KR" altLang="en-US" sz="1200" b="1" dirty="0"/>
-              <a:t> 계수의 여러 조합에 따른 사각형 패치 세분 예</a:t>
-            </a:r>
-            <a:r>
-              <a:rPr lang="en-US" altLang="ko-KR" sz="1200" b="1" dirty="0"/>
-              <a:t>.</a:t>
-            </a:r>
-          </a:p>
-        </p:txBody>
-      </p:sp>
-      <p:sp>
-        <p:nvSpPr>
-          <p:cNvPr id="9" name="TextBox 8">
-            <a:extLst>
-              <a:ext uri="{FF2B5EF4-FFF2-40B4-BE49-F238E27FC236}">
-                <a16:creationId xmlns:a16="http://schemas.microsoft.com/office/drawing/2014/main" id="{CC460663-6691-4876-8743-8E7C28A53289}"/>
-              </a:ext>
-            </a:extLst>
-          </p:cNvPr>
-          <p:cNvSpPr txBox="1"/>
-          <p:nvPr/>
-        </p:nvSpPr>
-        <p:spPr>
-          <a:xfrm>
-            <a:off x="6269667" y="5866294"/>
-            <a:ext cx="5922335" cy="276999"/>
-          </a:xfrm>
-          <a:prstGeom prst="rect">
-            <a:avLst/>
-          </a:prstGeom>
-          <a:noFill/>
-          <a:ln>
-            <a:noFill/>
-          </a:ln>
-        </p:spPr>
-        <p:txBody>
-          <a:bodyPr wrap="square" rtlCol="0">
-            <a:spAutoFit/>
-          </a:bodyPr>
-          <a:lstStyle/>
-          <a:p>
-            <a:r>
-              <a:rPr lang="ko-KR" altLang="en-US" sz="1200" b="1" dirty="0"/>
-              <a:t>변 </a:t>
-            </a:r>
-            <a:r>
-              <a:rPr lang="ko-KR" altLang="en-US" sz="1200" b="1" dirty="0" err="1"/>
-              <a:t>테셀레이션</a:t>
-            </a:r>
-            <a:r>
-              <a:rPr lang="ko-KR" altLang="en-US" sz="1200" b="1" dirty="0"/>
-              <a:t> 계수와 내부 </a:t>
-            </a:r>
-            <a:r>
-              <a:rPr lang="ko-KR" altLang="en-US" sz="1200" b="1" dirty="0" err="1"/>
-              <a:t>테셀레이션</a:t>
-            </a:r>
-            <a:r>
-              <a:rPr lang="ko-KR" altLang="en-US" sz="1200" b="1" dirty="0"/>
-              <a:t> 계수의 여러 조합에 따른 삼각형 패치 세분 예</a:t>
-            </a:r>
-            <a:r>
-              <a:rPr lang="en-US" altLang="ko-KR" sz="1200" b="1" dirty="0"/>
-              <a:t>.</a:t>
-            </a:r>
-          </a:p>
-        </p:txBody>
-      </p:sp>
-    </p:spTree>
-    <p:extLst>
-      <p:ext uri="{BB962C8B-B14F-4D97-AF65-F5344CB8AC3E}">
-        <p14:creationId xmlns:p14="http://schemas.microsoft.com/office/powerpoint/2010/main" val="2003129128"/>
-      </p:ext>
-    </p:extLst>
-  </p:cSld>
-  <p:clrMapOvr>
-    <a:masterClrMapping/>
-  </p:clrMapOvr>
-  <mc:AlternateContent xmlns:mc="http://schemas.openxmlformats.org/markup-compatibility/2006" xmlns:p14="http://schemas.microsoft.com/office/powerpoint/2010/main">
-    <mc:Choice Requires="p14">
-      <p:transition spd="med" p14:dur="700">
-        <p:fade/>
-      </p:transition>
-    </mc:Choice>
-    <mc:Fallback xmlns="">
-      <p:transition spd="med">
-        <p:fade/>
-      </p:transition>
-    </mc:Fallback>
-  </mc:AlternateContent>
-</p:sld>
-</file>
-
-<file path=ppt/slides/slide12.xml><?xml version="1.0" encoding="utf-8"?>
-<p:sld xmlns:a="http://schemas.openxmlformats.org/drawingml/2006/main" xmlns:r="http://schemas.openxmlformats.org/officeDocument/2006/relationships" xmlns:p="http://schemas.openxmlformats.org/presentationml/2006/main">
-  <p:cSld>
-    <p:spTree>
-      <p:nvGrpSpPr>
-        <p:cNvPr id="1" name=""/>
-        <p:cNvGrpSpPr/>
-        <p:nvPr/>
-      </p:nvGrpSpPr>
-      <p:grpSpPr>
-        <a:xfrm>
-          <a:off x="0" y="0"/>
-          <a:ext cx="0" cy="0"/>
-          <a:chOff x="0" y="0"/>
-          <a:chExt cx="0" cy="0"/>
-        </a:xfrm>
-      </p:grpSpPr>
-      <p:sp>
-        <p:nvSpPr>
-          <p:cNvPr id="13" name="TextBox 12">
-            <a:extLst>
-              <a:ext uri="{FF2B5EF4-FFF2-40B4-BE49-F238E27FC236}">
-                <a16:creationId xmlns:a16="http://schemas.microsoft.com/office/drawing/2014/main" id="{E3BD4E8B-3D9E-436C-897B-A5797C1E1B1E}"/>
-              </a:ext>
-            </a:extLst>
-          </p:cNvPr>
-          <p:cNvSpPr txBox="1"/>
-          <p:nvPr/>
-        </p:nvSpPr>
-        <p:spPr>
-          <a:xfrm>
-            <a:off x="777062" y="2267612"/>
-            <a:ext cx="10493449" cy="1938992"/>
-          </a:xfrm>
-          <a:prstGeom prst="rect">
-            <a:avLst/>
-          </a:prstGeom>
-          <a:noFill/>
-          <a:ln>
-            <a:noFill/>
-          </a:ln>
-        </p:spPr>
-        <p:txBody>
-          <a:bodyPr wrap="square" rtlCol="0">
-            <a:spAutoFit/>
-          </a:bodyPr>
-          <a:lstStyle/>
-          <a:p>
-            <a:r>
-              <a:rPr lang="ko-KR" altLang="en-US" sz="1500" dirty="0"/>
-              <a:t>▶ </a:t>
-            </a:r>
-            <a:r>
-              <a:rPr lang="ko-KR" altLang="en-US" sz="1500" dirty="0" err="1"/>
-              <a:t>테셀레이터가</a:t>
-            </a:r>
-            <a:r>
-              <a:rPr lang="ko-KR" altLang="en-US" sz="1500" dirty="0"/>
-              <a:t> 출력한 정점마다 한 번씩 호출</a:t>
-            </a:r>
-            <a:endParaRPr lang="en-US" altLang="ko-KR" sz="1500" dirty="0"/>
-          </a:p>
-          <a:p>
-            <a:endParaRPr lang="en-US" altLang="ko-KR" sz="1500" dirty="0"/>
-          </a:p>
-          <a:p>
-            <a:r>
-              <a:rPr lang="ko-KR" altLang="en-US" sz="1500" dirty="0"/>
-              <a:t>▶ 본질적으로 </a:t>
-            </a:r>
-            <a:r>
-              <a:rPr lang="ko-KR" altLang="en-US" sz="1500" dirty="0" err="1"/>
-              <a:t>테셀레이션된</a:t>
-            </a:r>
-            <a:r>
-              <a:rPr lang="ko-KR" altLang="en-US" sz="1500" dirty="0"/>
-              <a:t> 패치에 대한 정점 </a:t>
-            </a:r>
-            <a:r>
-              <a:rPr lang="ko-KR" altLang="en-US" sz="1500" dirty="0" err="1"/>
-              <a:t>셰이더로</a:t>
-            </a:r>
-            <a:r>
-              <a:rPr lang="ko-KR" altLang="en-US" sz="1500" dirty="0"/>
-              <a:t> 작용</a:t>
-            </a:r>
-            <a:r>
-              <a:rPr lang="en-US" altLang="ko-KR" sz="1500" dirty="0"/>
-              <a:t>.</a:t>
-            </a:r>
-          </a:p>
-          <a:p>
-            <a:endParaRPr lang="en-US" altLang="ko-KR" sz="1500" dirty="0"/>
-          </a:p>
-          <a:p>
-            <a:r>
-              <a:rPr lang="ko-KR" altLang="en-US" sz="1500" dirty="0"/>
-              <a:t>▶</a:t>
-            </a:r>
-            <a:r>
-              <a:rPr lang="en-US" altLang="ko-KR" sz="1500" dirty="0"/>
-              <a:t> CHS</a:t>
-            </a:r>
-            <a:r>
-              <a:rPr lang="ko-KR" altLang="en-US" sz="1500" dirty="0"/>
-              <a:t>가 출력한 </a:t>
-            </a:r>
-            <a:r>
-              <a:rPr lang="en-US" altLang="ko-KR" sz="1500" dirty="0"/>
-              <a:t>Tessellation factor</a:t>
-            </a:r>
-            <a:r>
-              <a:rPr lang="ko-KR" altLang="en-US" sz="1500" dirty="0"/>
-              <a:t>와 </a:t>
-            </a:r>
-            <a:r>
-              <a:rPr lang="ko-KR" altLang="en-US" sz="1500" dirty="0" err="1"/>
-              <a:t>테셀레이션된</a:t>
-            </a:r>
-            <a:r>
-              <a:rPr lang="ko-KR" altLang="en-US" sz="1500" dirty="0"/>
-              <a:t> 정점 위치의 </a:t>
-            </a:r>
-            <a:r>
-              <a:rPr lang="ko-KR" altLang="en-US" sz="1500" dirty="0" err="1"/>
-              <a:t>매개변수화된</a:t>
-            </a:r>
-            <a:r>
-              <a:rPr lang="ko-KR" altLang="en-US" sz="1500" dirty="0"/>
-              <a:t> 좌표 </a:t>
-            </a:r>
-            <a:r>
-              <a:rPr lang="en-US" altLang="ko-KR" sz="1500" dirty="0"/>
-              <a:t>(u, v), CPHS</a:t>
-            </a:r>
-            <a:r>
-              <a:rPr lang="ko-KR" altLang="en-US" sz="1500" dirty="0"/>
-              <a:t>가 출력한 모든 출력 패치 제어점을 입력 받음</a:t>
-            </a:r>
-            <a:r>
-              <a:rPr lang="en-US" altLang="ko-KR" sz="1500" dirty="0"/>
-              <a:t>.</a:t>
-            </a:r>
-          </a:p>
-          <a:p>
-            <a:endParaRPr lang="en-US" altLang="ko-KR" sz="1500" dirty="0"/>
-          </a:p>
-          <a:p>
-            <a:r>
-              <a:rPr lang="ko-KR" altLang="en-US" sz="1500" dirty="0"/>
-              <a:t>▶ 매개변수 좌표</a:t>
-            </a:r>
-            <a:r>
-              <a:rPr lang="en-US" altLang="ko-KR" sz="1500" dirty="0"/>
-              <a:t>, </a:t>
-            </a:r>
-            <a:r>
-              <a:rPr lang="ko-KR" altLang="en-US" sz="1500" dirty="0" err="1"/>
-              <a:t>제어점들로부터</a:t>
-            </a:r>
-            <a:r>
-              <a:rPr lang="ko-KR" altLang="en-US" sz="1500" dirty="0"/>
-              <a:t> 정점의 실제 </a:t>
-            </a:r>
-            <a:r>
-              <a:rPr lang="en-US" altLang="ko-KR" sz="1500" dirty="0"/>
-              <a:t>3</a:t>
-            </a:r>
-            <a:r>
-              <a:rPr lang="ko-KR" altLang="en-US" sz="1500" dirty="0"/>
-              <a:t>차원 위치를 유도하는 것은 </a:t>
-            </a:r>
-            <a:r>
-              <a:rPr lang="en-US" altLang="ko-KR" sz="1500" dirty="0"/>
-              <a:t>DS </a:t>
-            </a:r>
-            <a:r>
-              <a:rPr lang="ko-KR" altLang="en-US" sz="1500" dirty="0"/>
-              <a:t>프로그램의 몫</a:t>
-            </a:r>
-            <a:r>
-              <a:rPr lang="en-US" altLang="ko-KR" sz="1500" dirty="0"/>
-              <a:t>.</a:t>
-            </a:r>
-          </a:p>
-        </p:txBody>
-      </p:sp>
-      <p:sp>
-        <p:nvSpPr>
-          <p:cNvPr id="5" name="제목 1">
-            <a:extLst>
-              <a:ext uri="{FF2B5EF4-FFF2-40B4-BE49-F238E27FC236}">
-                <a16:creationId xmlns:a16="http://schemas.microsoft.com/office/drawing/2014/main" id="{7FFB8550-2798-45B5-AB24-D2108B252C73}"/>
-              </a:ext>
-            </a:extLst>
-          </p:cNvPr>
-          <p:cNvSpPr txBox="1">
-            <a:spLocks/>
-          </p:cNvSpPr>
-          <p:nvPr/>
-        </p:nvSpPr>
-        <p:spPr>
-          <a:xfrm>
-            <a:off x="777062" y="1794829"/>
-            <a:ext cx="9601200" cy="450711"/>
-          </a:xfrm>
-          <a:prstGeom prst="rect">
-            <a:avLst/>
-          </a:prstGeom>
-        </p:spPr>
-        <p:txBody>
-          <a:bodyPr vert="horz" lIns="91440" tIns="45720" rIns="91440" bIns="45720" rtlCol="0" anchor="b">
-            <a:noAutofit/>
-          </a:bodyPr>
-          <a:lstStyle>
-            <a:lvl1pPr algn="l" defTabSz="914400" rtl="0" eaLnBrk="1" latinLnBrk="1" hangingPunct="1">
-              <a:lnSpc>
-                <a:spcPct val="90000"/>
-              </a:lnSpc>
-              <a:spcBef>
-                <a:spcPct val="0"/>
-              </a:spcBef>
-              <a:buNone/>
-              <a:defRPr sz="3200" b="1" kern="1200">
-                <a:solidFill>
-                  <a:schemeClr val="accent1">
-                    <a:lumMod val="75000"/>
-                  </a:schemeClr>
-                </a:solidFill>
-                <a:latin typeface="맑은 고딕" panose="020B0503020000020004" pitchFamily="50" charset="-127"/>
-                <a:ea typeface="맑은 고딕" panose="020B0503020000020004" pitchFamily="50" charset="-127"/>
-                <a:cs typeface="+mj-cs"/>
-              </a:defRPr>
-            </a:lvl1pPr>
-          </a:lstStyle>
-          <a:p>
-            <a:r>
-              <a:rPr lang="en-US" altLang="ko-KR" dirty="0"/>
-              <a:t>3. Domain</a:t>
-            </a:r>
-            <a:r>
-              <a:rPr lang="ko-KR" altLang="en-US" dirty="0"/>
-              <a:t> </a:t>
-            </a:r>
-            <a:r>
-              <a:rPr lang="en-US" altLang="ko-KR" dirty="0"/>
-              <a:t>Shader</a:t>
-            </a:r>
-          </a:p>
-        </p:txBody>
-      </p:sp>
-    </p:spTree>
-    <p:extLst>
-      <p:ext uri="{BB962C8B-B14F-4D97-AF65-F5344CB8AC3E}">
-        <p14:creationId xmlns:p14="http://schemas.microsoft.com/office/powerpoint/2010/main" val="1617356624"/>
-      </p:ext>
-    </p:extLst>
-  </p:cSld>
-  <p:clrMapOvr>
-    <a:masterClrMapping/>
-  </p:clrMapOvr>
-  <mc:AlternateContent xmlns:mc="http://schemas.openxmlformats.org/markup-compatibility/2006" xmlns:p14="http://schemas.microsoft.com/office/powerpoint/2010/main">
-    <mc:Choice Requires="p14">
-      <p:transition spd="med" p14:dur="700">
-        <p:fade/>
-      </p:transition>
-    </mc:Choice>
-    <mc:Fallback xmlns="">
-      <p:transition spd="med">
-        <p:fade/>
-      </p:transition>
-    </mc:Fallback>
-  </mc:AlternateContent>
-</p:sld>
-</file>
-
-<file path=ppt/slides/slide13.xml><?xml version="1.0" encoding="utf-8"?>
-<p:sld xmlns:a="http://schemas.openxmlformats.org/drawingml/2006/main" xmlns:r="http://schemas.openxmlformats.org/officeDocument/2006/relationships" xmlns:p="http://schemas.openxmlformats.org/presentationml/2006/main">
-  <p:cSld>
-    <p:spTree>
-      <p:nvGrpSpPr>
-        <p:cNvPr id="1" name=""/>
-        <p:cNvGrpSpPr/>
-        <p:nvPr/>
-      </p:nvGrpSpPr>
-      <p:grpSpPr>
-        <a:xfrm>
-          <a:off x="0" y="0"/>
-          <a:ext cx="0" cy="0"/>
-          <a:chOff x="0" y="0"/>
-          <a:chExt cx="0" cy="0"/>
-        </a:xfrm>
-      </p:grpSpPr>
-      <p:sp>
-        <p:nvSpPr>
-          <p:cNvPr id="23" name="TextBox 22">
-            <a:extLst>
-              <a:ext uri="{FF2B5EF4-FFF2-40B4-BE49-F238E27FC236}">
-                <a16:creationId xmlns:a16="http://schemas.microsoft.com/office/drawing/2014/main" id="{C99C06AF-3CD0-4246-BE52-56C13B66AEEA}"/>
-              </a:ext>
-            </a:extLst>
-          </p:cNvPr>
-          <p:cNvSpPr txBox="1"/>
-          <p:nvPr/>
-        </p:nvSpPr>
-        <p:spPr>
-          <a:xfrm>
-            <a:off x="6826102" y="434714"/>
-            <a:ext cx="4827184" cy="553998"/>
-          </a:xfrm>
-          <a:prstGeom prst="rect">
-            <a:avLst/>
-          </a:prstGeom>
-          <a:noFill/>
-          <a:ln w="28575">
-            <a:solidFill>
-              <a:srgbClr val="FF0000"/>
-            </a:solidFill>
-          </a:ln>
-        </p:spPr>
-        <p:txBody>
-          <a:bodyPr wrap="square" rtlCol="0">
-            <a:spAutoFit/>
-          </a:bodyPr>
-          <a:lstStyle/>
-          <a:p>
-            <a:r>
-              <a:rPr lang="ko-KR" altLang="en-US" sz="1500" dirty="0"/>
-              <a:t>▶ </a:t>
-            </a:r>
-            <a:r>
-              <a:rPr lang="en-US" altLang="ko-KR" sz="1500" dirty="0"/>
-              <a:t>DS</a:t>
-            </a:r>
-            <a:r>
-              <a:rPr lang="ko-KR" altLang="en-US" sz="1500" dirty="0"/>
-              <a:t>는 </a:t>
-            </a:r>
-            <a:r>
-              <a:rPr lang="ko-KR" altLang="en-US" sz="1500" dirty="0" err="1"/>
-              <a:t>테셀레이터가</a:t>
-            </a:r>
-            <a:r>
-              <a:rPr lang="ko-KR" altLang="en-US" sz="1500" dirty="0"/>
-              <a:t> 생성한 정점마다 호출</a:t>
-            </a:r>
-            <a:endParaRPr lang="en-US" altLang="ko-KR" sz="1500" dirty="0"/>
-          </a:p>
-          <a:p>
-            <a:r>
-              <a:rPr lang="ko-KR" altLang="en-US" sz="1500" dirty="0"/>
-              <a:t>▶ </a:t>
-            </a:r>
-            <a:r>
-              <a:rPr lang="en-US" altLang="ko-KR" sz="1500" dirty="0"/>
-              <a:t>Tessellation </a:t>
-            </a:r>
-            <a:r>
-              <a:rPr lang="ko-KR" altLang="en-US" sz="1500" dirty="0"/>
-              <a:t>이후에 실행되는 </a:t>
-            </a:r>
-            <a:r>
-              <a:rPr lang="en-US" altLang="ko-KR" sz="1500" dirty="0"/>
-              <a:t>VS</a:t>
-            </a:r>
-            <a:r>
-              <a:rPr lang="ko-KR" altLang="en-US" sz="1500" dirty="0"/>
-              <a:t>라 생각하면 편함</a:t>
-            </a:r>
-            <a:endParaRPr lang="en-US" altLang="ko-KR" sz="1500" dirty="0"/>
-          </a:p>
-        </p:txBody>
-      </p:sp>
-      <p:sp>
-        <p:nvSpPr>
-          <p:cNvPr id="3" name="직사각형 2">
-            <a:extLst>
-              <a:ext uri="{FF2B5EF4-FFF2-40B4-BE49-F238E27FC236}">
-                <a16:creationId xmlns:a16="http://schemas.microsoft.com/office/drawing/2014/main" id="{3658172D-04BC-4AB5-88EF-1D8DC2ADF5F1}"/>
-              </a:ext>
-            </a:extLst>
-          </p:cNvPr>
-          <p:cNvSpPr/>
-          <p:nvPr/>
-        </p:nvSpPr>
-        <p:spPr>
-          <a:xfrm>
-            <a:off x="232145" y="260312"/>
-            <a:ext cx="6443331" cy="4939814"/>
-          </a:xfrm>
-          <a:prstGeom prst="rect">
-            <a:avLst/>
-          </a:prstGeom>
-        </p:spPr>
-        <p:txBody>
-          <a:bodyPr wrap="square">
-            <a:spAutoFit/>
-          </a:bodyPr>
-          <a:lstStyle/>
-          <a:p>
-            <a:r>
-              <a:rPr lang="en-US" altLang="ko-KR" sz="1500" dirty="0"/>
-              <a:t>struct </a:t>
-            </a:r>
-            <a:r>
-              <a:rPr lang="en-US" altLang="ko-KR" sz="1500" dirty="0" err="1"/>
-              <a:t>DomainOut</a:t>
-            </a:r>
-            <a:r>
-              <a:rPr lang="en-US" altLang="ko-KR" sz="1500" dirty="0"/>
-              <a:t>{</a:t>
-            </a:r>
-          </a:p>
-          <a:p>
-            <a:r>
-              <a:rPr lang="en-US" altLang="ko-KR" sz="1500" dirty="0"/>
-              <a:t>	float4 </a:t>
-            </a:r>
-            <a:r>
-              <a:rPr lang="en-US" altLang="ko-KR" sz="1500" dirty="0" err="1"/>
-              <a:t>PosH</a:t>
-            </a:r>
-            <a:r>
-              <a:rPr lang="en-US" altLang="ko-KR" sz="1500" dirty="0"/>
-              <a:t> : SV_POSITION;</a:t>
-            </a:r>
-          </a:p>
-          <a:p>
-            <a:r>
-              <a:rPr lang="en-US" altLang="ko-KR" sz="1500" dirty="0"/>
-              <a:t>};</a:t>
-            </a:r>
-          </a:p>
-          <a:p>
-            <a:endParaRPr lang="en-US" altLang="ko-KR" sz="1500" dirty="0"/>
-          </a:p>
-          <a:p>
-            <a:r>
-              <a:rPr lang="en-US" altLang="ko-KR" sz="1500" dirty="0"/>
-              <a:t>[domain("quad")]</a:t>
-            </a:r>
-          </a:p>
-          <a:p>
-            <a:r>
-              <a:rPr lang="en-US" altLang="ko-KR" sz="1500" dirty="0" err="1"/>
-              <a:t>DomainOut</a:t>
-            </a:r>
-            <a:r>
-              <a:rPr lang="en-US" altLang="ko-KR" sz="1500" dirty="0"/>
-              <a:t> DS(</a:t>
-            </a:r>
-            <a:r>
-              <a:rPr lang="en-US" altLang="ko-KR" sz="1500" dirty="0" err="1"/>
-              <a:t>PatchTess</a:t>
-            </a:r>
-            <a:r>
-              <a:rPr lang="en-US" altLang="ko-KR" sz="1500" dirty="0"/>
-              <a:t> </a:t>
-            </a:r>
-            <a:r>
-              <a:rPr lang="en-US" altLang="ko-KR" sz="1500" dirty="0" err="1"/>
-              <a:t>patchTess</a:t>
-            </a:r>
-            <a:r>
-              <a:rPr lang="en-US" altLang="ko-KR" sz="1500" dirty="0"/>
-              <a:t>,</a:t>
-            </a:r>
-          </a:p>
-          <a:p>
-            <a:r>
-              <a:rPr lang="en-US" altLang="ko-KR" sz="1500" dirty="0"/>
-              <a:t>			float2 </a:t>
-            </a:r>
-            <a:r>
-              <a:rPr lang="en-US" altLang="ko-KR" sz="1500" dirty="0" err="1"/>
-              <a:t>uv</a:t>
-            </a:r>
-            <a:r>
-              <a:rPr lang="en-US" altLang="ko-KR" sz="1500" dirty="0"/>
-              <a:t> : </a:t>
-            </a:r>
-            <a:r>
-              <a:rPr lang="en-US" altLang="ko-KR" sz="1500" dirty="0" err="1"/>
-              <a:t>SV_DomainLocation</a:t>
-            </a:r>
-            <a:r>
-              <a:rPr lang="en-US" altLang="ko-KR" sz="1500" dirty="0"/>
-              <a:t>,</a:t>
-            </a:r>
-          </a:p>
-          <a:p>
-            <a:r>
-              <a:rPr lang="en-US" altLang="ko-KR" sz="1500" dirty="0"/>
-              <a:t>			const </a:t>
-            </a:r>
-            <a:r>
-              <a:rPr lang="en-US" altLang="ko-KR" sz="1500" dirty="0" err="1"/>
-              <a:t>OutputPatch</a:t>
-            </a:r>
-            <a:r>
-              <a:rPr lang="en-US" altLang="ko-KR" sz="1500" dirty="0"/>
-              <a:t>&lt;</a:t>
-            </a:r>
-            <a:r>
-              <a:rPr lang="en-US" altLang="ko-KR" sz="1500" dirty="0" err="1"/>
-              <a:t>HullOut</a:t>
-            </a:r>
-            <a:r>
-              <a:rPr lang="en-US" altLang="ko-KR" sz="1500" dirty="0"/>
-              <a:t>, 4&gt; quad){</a:t>
-            </a:r>
-          </a:p>
-          <a:p>
-            <a:r>
-              <a:rPr lang="en-US" altLang="ko-KR" sz="1500" dirty="0"/>
-              <a:t>	</a:t>
-            </a:r>
-            <a:r>
-              <a:rPr lang="en-US" altLang="ko-KR" sz="1500" dirty="0" err="1"/>
-              <a:t>DomainOut</a:t>
-            </a:r>
-            <a:r>
-              <a:rPr lang="en-US" altLang="ko-KR" sz="1500" dirty="0"/>
-              <a:t> </a:t>
-            </a:r>
-            <a:r>
-              <a:rPr lang="en-US" altLang="ko-KR" sz="1500" dirty="0" err="1"/>
-              <a:t>dout</a:t>
-            </a:r>
-            <a:r>
-              <a:rPr lang="en-US" altLang="ko-KR" sz="1500" dirty="0"/>
-              <a:t>;</a:t>
-            </a:r>
-          </a:p>
-          <a:p>
-            <a:endParaRPr lang="en-US" altLang="ko-KR" sz="1500" dirty="0"/>
-          </a:p>
-          <a:p>
-            <a:r>
-              <a:rPr lang="en-US" altLang="ko-KR" sz="1500" dirty="0"/>
-              <a:t>	float3 v1 = lerp(quad[0].</a:t>
-            </a:r>
-            <a:r>
-              <a:rPr lang="en-US" altLang="ko-KR" sz="1500" dirty="0" err="1"/>
-              <a:t>PosL</a:t>
-            </a:r>
-            <a:r>
-              <a:rPr lang="en-US" altLang="ko-KR" sz="1500" dirty="0"/>
-              <a:t>, quad[1].</a:t>
-            </a:r>
-            <a:r>
-              <a:rPr lang="en-US" altLang="ko-KR" sz="1500" dirty="0" err="1"/>
-              <a:t>PosL</a:t>
-            </a:r>
-            <a:r>
-              <a:rPr lang="en-US" altLang="ko-KR" sz="1500" dirty="0"/>
-              <a:t>, </a:t>
-            </a:r>
-            <a:r>
-              <a:rPr lang="en-US" altLang="ko-KR" sz="1500" dirty="0" err="1"/>
-              <a:t>uv.x</a:t>
-            </a:r>
-            <a:r>
-              <a:rPr lang="en-US" altLang="ko-KR" sz="1500" dirty="0"/>
-              <a:t>);</a:t>
-            </a:r>
-          </a:p>
-          <a:p>
-            <a:r>
-              <a:rPr lang="en-US" altLang="ko-KR" sz="1500" dirty="0"/>
-              <a:t>	float3 v2 = lerp(quad[2].</a:t>
-            </a:r>
-            <a:r>
-              <a:rPr lang="en-US" altLang="ko-KR" sz="1500" dirty="0" err="1"/>
-              <a:t>PosL</a:t>
-            </a:r>
-            <a:r>
-              <a:rPr lang="en-US" altLang="ko-KR" sz="1500" dirty="0"/>
-              <a:t>, quad[3].</a:t>
-            </a:r>
-            <a:r>
-              <a:rPr lang="en-US" altLang="ko-KR" sz="1500" dirty="0" err="1"/>
-              <a:t>PosL</a:t>
-            </a:r>
-            <a:r>
-              <a:rPr lang="en-US" altLang="ko-KR" sz="1500" dirty="0"/>
-              <a:t>, </a:t>
-            </a:r>
-            <a:r>
-              <a:rPr lang="en-US" altLang="ko-KR" sz="1500" dirty="0" err="1"/>
-              <a:t>uv.x</a:t>
-            </a:r>
-            <a:r>
-              <a:rPr lang="en-US" altLang="ko-KR" sz="1500" dirty="0"/>
-              <a:t>);</a:t>
-            </a:r>
-          </a:p>
-          <a:p>
-            <a:r>
-              <a:rPr lang="en-US" altLang="ko-KR" sz="1500" dirty="0"/>
-              <a:t>	float3 p = lerp(v1, v2, </a:t>
-            </a:r>
-            <a:r>
-              <a:rPr lang="en-US" altLang="ko-KR" sz="1500" dirty="0" err="1"/>
-              <a:t>uv.y</a:t>
-            </a:r>
-            <a:r>
-              <a:rPr lang="en-US" altLang="ko-KR" sz="1500" dirty="0"/>
-              <a:t>);</a:t>
-            </a:r>
-          </a:p>
-          <a:p>
-            <a:endParaRPr lang="en-US" altLang="ko-KR" sz="1500" dirty="0"/>
-          </a:p>
-          <a:p>
-            <a:r>
-              <a:rPr lang="en-US" altLang="ko-KR" sz="1500" dirty="0"/>
-              <a:t>	</a:t>
-            </a:r>
-            <a:r>
-              <a:rPr lang="en-US" altLang="ko-KR" sz="1500" dirty="0" err="1"/>
-              <a:t>p.y</a:t>
-            </a:r>
-            <a:r>
-              <a:rPr lang="en-US" altLang="ko-KR" sz="1500" dirty="0"/>
-              <a:t> = 0.3f * (</a:t>
-            </a:r>
-            <a:r>
-              <a:rPr lang="en-US" altLang="ko-KR" sz="1500" dirty="0" err="1"/>
-              <a:t>p.z</a:t>
-            </a:r>
-            <a:r>
-              <a:rPr lang="en-US" altLang="ko-KR" sz="1500" dirty="0"/>
-              <a:t> * sin(</a:t>
-            </a:r>
-            <a:r>
-              <a:rPr lang="en-US" altLang="ko-KR" sz="1500" dirty="0" err="1"/>
-              <a:t>p.x</a:t>
-            </a:r>
-            <a:r>
-              <a:rPr lang="en-US" altLang="ko-KR" sz="1500" dirty="0"/>
-              <a:t>) + </a:t>
-            </a:r>
-            <a:r>
-              <a:rPr lang="en-US" altLang="ko-KR" sz="1500" dirty="0" err="1"/>
-              <a:t>p.x</a:t>
-            </a:r>
-            <a:r>
-              <a:rPr lang="en-US" altLang="ko-KR" sz="1500" dirty="0"/>
-              <a:t> * cos(</a:t>
-            </a:r>
-            <a:r>
-              <a:rPr lang="en-US" altLang="ko-KR" sz="1500" dirty="0" err="1"/>
-              <a:t>p.z</a:t>
-            </a:r>
-            <a:r>
-              <a:rPr lang="en-US" altLang="ko-KR" sz="1500" dirty="0"/>
-              <a:t>));</a:t>
-            </a:r>
-          </a:p>
-          <a:p>
-            <a:endParaRPr lang="en-US" altLang="ko-KR" sz="1500" dirty="0"/>
-          </a:p>
-          <a:p>
-            <a:r>
-              <a:rPr lang="en-US" altLang="ko-KR" sz="1500" dirty="0"/>
-              <a:t>	float4 </a:t>
-            </a:r>
-            <a:r>
-              <a:rPr lang="en-US" altLang="ko-KR" sz="1500" dirty="0" err="1"/>
-              <a:t>posW</a:t>
-            </a:r>
-            <a:r>
-              <a:rPr lang="en-US" altLang="ko-KR" sz="1500" dirty="0"/>
-              <a:t> = </a:t>
-            </a:r>
-            <a:r>
-              <a:rPr lang="en-US" altLang="ko-KR" sz="1500" dirty="0" err="1"/>
-              <a:t>mul</a:t>
-            </a:r>
-            <a:r>
-              <a:rPr lang="en-US" altLang="ko-KR" sz="1500" dirty="0"/>
-              <a:t>(float4(p, 1.0f), </a:t>
-            </a:r>
-            <a:r>
-              <a:rPr lang="en-US" altLang="ko-KR" sz="1500" dirty="0" err="1"/>
-              <a:t>gWorld</a:t>
-            </a:r>
-            <a:r>
-              <a:rPr lang="en-US" altLang="ko-KR" sz="1500" dirty="0"/>
-              <a:t>);</a:t>
-            </a:r>
-          </a:p>
-          <a:p>
-            <a:r>
-              <a:rPr lang="en-US" altLang="ko-KR" sz="1500" dirty="0"/>
-              <a:t>	</a:t>
-            </a:r>
-            <a:r>
-              <a:rPr lang="en-US" altLang="ko-KR" sz="1500" dirty="0" err="1"/>
-              <a:t>dout.PosH</a:t>
-            </a:r>
-            <a:r>
-              <a:rPr lang="en-US" altLang="ko-KR" sz="1500" dirty="0"/>
-              <a:t> = </a:t>
-            </a:r>
-            <a:r>
-              <a:rPr lang="en-US" altLang="ko-KR" sz="1500" dirty="0" err="1"/>
-              <a:t>mul</a:t>
-            </a:r>
-            <a:r>
-              <a:rPr lang="en-US" altLang="ko-KR" sz="1500" dirty="0"/>
-              <a:t>(</a:t>
-            </a:r>
-            <a:r>
-              <a:rPr lang="en-US" altLang="ko-KR" sz="1500" dirty="0" err="1"/>
-              <a:t>posW</a:t>
-            </a:r>
-            <a:r>
-              <a:rPr lang="en-US" altLang="ko-KR" sz="1500" dirty="0"/>
-              <a:t>, </a:t>
-            </a:r>
-            <a:r>
-              <a:rPr lang="en-US" altLang="ko-KR" sz="1500" dirty="0" err="1"/>
-              <a:t>gViewProj</a:t>
-            </a:r>
-            <a:r>
-              <a:rPr lang="en-US" altLang="ko-KR" sz="1500" dirty="0"/>
-              <a:t>);</a:t>
-            </a:r>
-          </a:p>
-          <a:p>
-            <a:endParaRPr lang="en-US" altLang="ko-KR" sz="1500" dirty="0"/>
-          </a:p>
-          <a:p>
-            <a:r>
-              <a:rPr lang="en-US" altLang="ko-KR" sz="1500" dirty="0"/>
-              <a:t>	return </a:t>
-            </a:r>
-            <a:r>
-              <a:rPr lang="en-US" altLang="ko-KR" sz="1500" dirty="0" err="1"/>
-              <a:t>dout</a:t>
-            </a:r>
-            <a:r>
-              <a:rPr lang="en-US" altLang="ko-KR" sz="1500" dirty="0"/>
-              <a:t>;</a:t>
-            </a:r>
-          </a:p>
-          <a:p>
-            <a:r>
-              <a:rPr lang="en-US" altLang="ko-KR" sz="1500" dirty="0"/>
-              <a:t>}</a:t>
-            </a:r>
-            <a:endParaRPr lang="ko-KR" altLang="en-US" sz="1500" dirty="0"/>
-          </a:p>
-        </p:txBody>
-      </p:sp>
-      <p:pic>
-        <p:nvPicPr>
-          <p:cNvPr id="6" name="그림 5">
-            <a:extLst>
-              <a:ext uri="{FF2B5EF4-FFF2-40B4-BE49-F238E27FC236}">
-                <a16:creationId xmlns:a16="http://schemas.microsoft.com/office/drawing/2014/main" id="{092AE3B8-D7E4-4C26-988A-9DA4411B49D4}"/>
-              </a:ext>
-            </a:extLst>
-          </p:cNvPr>
-          <p:cNvPicPr>
-            <a:picLocks noChangeAspect="1"/>
-          </p:cNvPicPr>
-          <p:nvPr/>
-        </p:nvPicPr>
-        <p:blipFill>
-          <a:blip r:embed="rId3"/>
-          <a:stretch>
-            <a:fillRect/>
-          </a:stretch>
-        </p:blipFill>
-        <p:spPr>
-          <a:xfrm>
-            <a:off x="5912365" y="2280684"/>
-            <a:ext cx="6047490" cy="3867070"/>
-          </a:xfrm>
-          <a:prstGeom prst="rect">
-            <a:avLst/>
-          </a:prstGeom>
-        </p:spPr>
-      </p:pic>
-    </p:spTree>
-    <p:extLst>
-      <p:ext uri="{BB962C8B-B14F-4D97-AF65-F5344CB8AC3E}">
-        <p14:creationId xmlns:p14="http://schemas.microsoft.com/office/powerpoint/2010/main" val="2459622081"/>
-      </p:ext>
-    </p:extLst>
-  </p:cSld>
-  <p:clrMapOvr>
-    <a:masterClrMapping/>
-  </p:clrMapOvr>
-  <mc:AlternateContent xmlns:mc="http://schemas.openxmlformats.org/markup-compatibility/2006" xmlns:p14="http://schemas.microsoft.com/office/powerpoint/2010/main">
-    <mc:Choice Requires="p14">
-      <p:transition spd="med" p14:dur="700">
-        <p:fade/>
-      </p:transition>
-    </mc:Choice>
-    <mc:Fallback xmlns="">
-      <p:transition spd="med">
-        <p:fade/>
-      </p:transition>
-    </mc:Fallback>
-  </mc:AlternateContent>
-</p:sld>
-</file>
-
 <file path=ppt/slides/slide2.xml><?xml version="1.0" encoding="utf-8"?>
 <p:sld xmlns:a="http://schemas.openxmlformats.org/drawingml/2006/main" xmlns:r="http://schemas.openxmlformats.org/officeDocument/2006/relationships" xmlns:p="http://schemas.openxmlformats.org/presentationml/2006/main">
   <p:cSld>
@@ -21568,19 +18818,32 @@
           <a:p>
             <a:pPr rtl="0"/>
             <a:r>
-              <a:rPr lang="en-US" altLang="ko-KR" dirty="0"/>
-              <a:t>2</a:t>
-            </a:r>
-            <a:r>
               <a:rPr lang="en-US" altLang="ko-KR" dirty="0">
                 <a:latin typeface="맑은 고딕" panose="020B0503020000020004" pitchFamily="50" charset="-127"/>
                 <a:ea typeface="맑은 고딕" panose="020B0503020000020004" pitchFamily="50" charset="-127"/>
               </a:rPr>
-              <a:t>. </a:t>
-            </a:r>
-            <a:r>
-              <a:rPr lang="en-US" altLang="ko-KR" dirty="0"/>
-              <a:t>Hull Shader</a:t>
+              <a:t>2. </a:t>
+            </a:r>
+            <a:r>
+              <a:rPr lang="ko-KR" altLang="en-US" dirty="0" err="1">
+                <a:latin typeface="맑은 고딕" panose="020B0503020000020004" pitchFamily="50" charset="-127"/>
+                <a:ea typeface="맑은 고딕" panose="020B0503020000020004" pitchFamily="50" charset="-127"/>
+              </a:rPr>
+              <a:t>경계입체와</a:t>
+            </a:r>
+            <a:r>
+              <a:rPr lang="ko-KR" altLang="en-US" dirty="0">
+                <a:latin typeface="맑은 고딕" panose="020B0503020000020004" pitchFamily="50" charset="-127"/>
+                <a:ea typeface="맑은 고딕" panose="020B0503020000020004" pitchFamily="50" charset="-127"/>
+              </a:rPr>
+              <a:t> </a:t>
+            </a:r>
+            <a:r>
+              <a:rPr lang="ko-KR" altLang="en-US" dirty="0" err="1">
+                <a:latin typeface="맑은 고딕" panose="020B0503020000020004" pitchFamily="50" charset="-127"/>
+                <a:ea typeface="맑은 고딕" panose="020B0503020000020004" pitchFamily="50" charset="-127"/>
+              </a:rPr>
+              <a:t>절두체</a:t>
             </a:r>
             <a:endParaRPr lang="en-US" altLang="ko-KR" dirty="0">
               <a:latin typeface="맑은 고딕" panose="020B0503020000020004" pitchFamily="50" charset="-127"/>
@@ -21603,8 +18866,8 @@
         </p:nvSpPr>
         <p:spPr>
           <a:xfrm>
-            <a:off x="713267" y="1068018"/>
-            <a:ext cx="10765466" cy="784830"/>
+            <a:off x="670736" y="1227506"/>
+            <a:ext cx="10765466" cy="323165"/>
           </a:xfrm>
           <a:prstGeom prst="rect">
             <a:avLst/>
@@ -21625,74 +18888,28 @@
               <a:t>▶ </a:t>
             </a:r>
             <a:r>
+              <a:rPr lang="ko-KR" altLang="en-US" sz="1500" b="1" dirty="0" err="1"/>
+              <a:t>경계입체</a:t>
+            </a:r>
+            <a:r>
               <a:rPr lang="en-US" altLang="ko-KR" sz="1500" b="1" dirty="0"/>
-              <a:t>Tessellation</a:t>
-            </a:r>
-            <a:r>
-              <a:rPr lang="ko-KR" altLang="en-US" sz="1500" b="1" dirty="0"/>
-              <a:t>의 가장 첫 단계</a:t>
-            </a:r>
-            <a:endParaRPr lang="en-US" altLang="ko-KR" sz="1500" b="1" dirty="0"/>
-          </a:p>
-          <a:p>
-            <a:endParaRPr lang="en-US" altLang="ko-KR" sz="1500" dirty="0"/>
-          </a:p>
-          <a:p>
-            <a:r>
-              <a:rPr lang="ko-KR" altLang="en-US" sz="1500" b="1" dirty="0">
-                <a:solidFill>
-                  <a:srgbClr val="FF0000"/>
-                </a:solidFill>
-              </a:rPr>
-              <a:t>상수 덮개 </a:t>
-            </a:r>
-            <a:r>
-              <a:rPr lang="ko-KR" altLang="en-US" sz="1500" b="1" dirty="0" err="1">
-                <a:solidFill>
-                  <a:srgbClr val="FF0000"/>
-                </a:solidFill>
-              </a:rPr>
-              <a:t>셰이더</a:t>
+              <a:t>(bounding volume)</a:t>
+            </a:r>
+            <a:r>
+              <a:rPr lang="ko-KR" altLang="en-US" sz="1500" dirty="0"/>
+              <a:t>는</a:t>
+            </a:r>
+            <a:r>
+              <a:rPr lang="en-US" altLang="ko-KR" sz="1500" dirty="0"/>
+              <a:t> </a:t>
             </a:r>
             <a:r>
               <a:rPr lang="ko-KR" altLang="en-US" sz="1500" dirty="0" err="1"/>
-              <a:t>와</a:t>
+              <a:t>어떤물체가</a:t>
             </a:r>
             <a:r>
               <a:rPr lang="ko-KR" altLang="en-US" sz="1500" dirty="0"/>
-              <a:t> </a:t>
-            </a:r>
-            <a:r>
-              <a:rPr lang="ko-KR" altLang="en-US" sz="1500" b="1" dirty="0" err="1">
-                <a:solidFill>
-                  <a:srgbClr val="FF0000"/>
-                </a:solidFill>
-              </a:rPr>
-              <a:t>제어점</a:t>
-            </a:r>
-            <a:r>
-              <a:rPr lang="ko-KR" altLang="en-US" sz="1500" b="1" dirty="0">
-                <a:solidFill>
-                  <a:srgbClr val="FF0000"/>
-                </a:solidFill>
-              </a:rPr>
-              <a:t> 덮개 </a:t>
-            </a:r>
-            <a:r>
-              <a:rPr lang="ko-KR" altLang="en-US" sz="1500" b="1" dirty="0" err="1">
-                <a:solidFill>
-                  <a:srgbClr val="FF0000"/>
-                </a:solidFill>
-              </a:rPr>
-              <a:t>셰이더</a:t>
-            </a:r>
-            <a:r>
-              <a:rPr lang="ko-KR" altLang="en-US" sz="1500" dirty="0" err="1"/>
-              <a:t>로</a:t>
-            </a:r>
-            <a:r>
-              <a:rPr lang="ko-KR" altLang="en-US" sz="1500" dirty="0"/>
-              <a:t> 구성</a:t>
+              <a:t> 차지하는 입체적 공간을 근사하는 입체적 기본도형</a:t>
             </a:r>
             <a:r>
               <a:rPr lang="en-US" altLang="ko-KR" sz="1500" dirty="0"/>
@@ -21701,207 +18918,40 @@
           </a:p>
         </p:txBody>
       </p:sp>
-      <p:sp>
-        <p:nvSpPr>
-          <p:cNvPr id="13" name="TextBox 12">
+      <p:pic>
+        <p:nvPicPr>
+          <p:cNvPr id="7" name="그림 6">
             <a:extLst>
               <a:ext uri="{FF2B5EF4-FFF2-40B4-BE49-F238E27FC236}">
-                <a16:creationId xmlns:a16="http://schemas.microsoft.com/office/drawing/2014/main" id="{E3BD4E8B-3D9E-436C-897B-A5797C1E1B1E}"/>
+                <a16:creationId xmlns:a16="http://schemas.microsoft.com/office/drawing/2014/main" id="{719B61FC-3054-426A-B3DB-E2BC48E207CA}"/>
               </a:ext>
             </a:extLst>
           </p:cNvPr>
-          <p:cNvSpPr txBox="1"/>
+          <p:cNvPicPr>
+            <a:picLocks noChangeAspect="1"/>
+          </p:cNvPicPr>
           <p:nvPr/>
-        </p:nvSpPr>
+        </p:nvPicPr>
+        <p:blipFill>
+          <a:blip r:embed="rId3"/>
+          <a:stretch>
+            <a:fillRect/>
+          </a:stretch>
+        </p:blipFill>
         <p:spPr>
           <a:xfrm>
-            <a:off x="713267" y="3763902"/>
-            <a:ext cx="10765466" cy="1477328"/>
-          </a:xfrm>
-          <a:prstGeom prst="rect">
-            <a:avLst/>
-          </a:prstGeom>
-          <a:noFill/>
-          <a:ln>
-            <a:noFill/>
-          </a:ln>
-        </p:spPr>
-        <p:txBody>
-          <a:bodyPr wrap="square" rtlCol="0">
-            <a:spAutoFit/>
-          </a:bodyPr>
-          <a:lstStyle/>
-          <a:p>
-            <a:r>
-              <a:rPr lang="ko-KR" altLang="en-US" sz="1500" dirty="0"/>
-              <a:t>▶ 패치마다 실행되는 </a:t>
-            </a:r>
-            <a:r>
-              <a:rPr lang="ko-KR" altLang="en-US" sz="1500" dirty="0" err="1"/>
-              <a:t>셰이더</a:t>
-            </a:r>
-            <a:r>
-              <a:rPr lang="ko-KR" altLang="en-US" sz="1500" dirty="0"/>
-              <a:t> 함수</a:t>
-            </a:r>
-            <a:r>
-              <a:rPr lang="en-US" altLang="ko-KR" sz="1500" dirty="0"/>
-              <a:t>.</a:t>
-            </a:r>
-          </a:p>
-          <a:p>
-            <a:endParaRPr lang="en-US" altLang="ko-KR" sz="1500" dirty="0"/>
-          </a:p>
-          <a:p>
-            <a:r>
-              <a:rPr lang="ko-KR" altLang="en-US" sz="1500" dirty="0"/>
-              <a:t>▶ 패치 제어점들을 받고 메시의 소위 </a:t>
-            </a:r>
-            <a:r>
-              <a:rPr lang="ko-KR" altLang="en-US" sz="1500" b="1" dirty="0" err="1"/>
-              <a:t>테셀레이션</a:t>
-            </a:r>
-            <a:r>
-              <a:rPr lang="ko-KR" altLang="en-US" sz="1500" b="1" dirty="0"/>
-              <a:t> 계수</a:t>
-            </a:r>
-            <a:r>
-              <a:rPr lang="en-US" altLang="ko-KR" sz="1500" b="1" dirty="0"/>
-              <a:t>(tessellation factor)</a:t>
-            </a:r>
-            <a:r>
-              <a:rPr lang="ko-KR" altLang="en-US" sz="1500" dirty="0"/>
-              <a:t>들을 출력</a:t>
-            </a:r>
-            <a:endParaRPr lang="en-US" altLang="ko-KR" sz="1500" dirty="0"/>
-          </a:p>
-          <a:p>
-            <a:endParaRPr lang="en-US" altLang="ko-KR" sz="1500" dirty="0"/>
-          </a:p>
-          <a:p>
-            <a:r>
-              <a:rPr lang="en-US" altLang="ko-KR" sz="1500" dirty="0"/>
-              <a:t>※ </a:t>
-            </a:r>
-            <a:r>
-              <a:rPr lang="ko-KR" altLang="en-US" sz="1500" b="1" dirty="0" err="1"/>
-              <a:t>테셀레이션</a:t>
-            </a:r>
-            <a:r>
-              <a:rPr lang="ko-KR" altLang="en-US" sz="1500" b="1" dirty="0"/>
-              <a:t> 계수 </a:t>
-            </a:r>
-            <a:r>
-              <a:rPr lang="en-US" altLang="ko-KR" sz="1500" b="1" dirty="0"/>
-              <a:t>(tessellation factor)</a:t>
-            </a:r>
-            <a:r>
-              <a:rPr lang="en-US" altLang="ko-KR" sz="1500" dirty="0"/>
-              <a:t>  -  </a:t>
-            </a:r>
-            <a:r>
-              <a:rPr lang="ko-KR" altLang="en-US" sz="1500" dirty="0"/>
-              <a:t>덮개 </a:t>
-            </a:r>
-            <a:r>
-              <a:rPr lang="ko-KR" altLang="en-US" sz="1500" dirty="0" err="1"/>
-              <a:t>셰이더</a:t>
-            </a:r>
-            <a:r>
-              <a:rPr lang="ko-KR" altLang="en-US" sz="1500" dirty="0"/>
-              <a:t> 단계 다음에 있는 </a:t>
-            </a:r>
-            <a:r>
-              <a:rPr lang="ko-KR" altLang="en-US" sz="1500" dirty="0" err="1"/>
-              <a:t>테셀레이션</a:t>
-            </a:r>
-            <a:r>
-              <a:rPr lang="ko-KR" altLang="en-US" sz="1500" dirty="0"/>
-              <a:t> 단계가 주어진 패치를 얼마나 세분할 것인지 결정</a:t>
-            </a:r>
-            <a:r>
-              <a:rPr lang="en-US" altLang="ko-KR" sz="1500" dirty="0"/>
-              <a:t>.</a:t>
-            </a:r>
-          </a:p>
-        </p:txBody>
-      </p:sp>
-      <p:sp>
-        <p:nvSpPr>
-          <p:cNvPr id="5" name="제목 1">
-            <a:extLst>
-              <a:ext uri="{FF2B5EF4-FFF2-40B4-BE49-F238E27FC236}">
-                <a16:creationId xmlns:a16="http://schemas.microsoft.com/office/drawing/2014/main" id="{7FFB8550-2798-45B5-AB24-D2108B252C73}"/>
-              </a:ext>
-            </a:extLst>
-          </p:cNvPr>
-          <p:cNvSpPr txBox="1">
-            <a:spLocks/>
-          </p:cNvSpPr>
-          <p:nvPr/>
-        </p:nvSpPr>
-        <p:spPr>
-          <a:xfrm>
-            <a:off x="713267" y="3203644"/>
-            <a:ext cx="9601200" cy="450711"/>
+            <a:off x="2753833" y="2034362"/>
+            <a:ext cx="6208944" cy="3104472"/>
           </a:xfrm>
           <a:prstGeom prst="rect">
             <a:avLst/>
           </a:prstGeom>
         </p:spPr>
-        <p:txBody>
-          <a:bodyPr vert="horz" lIns="91440" tIns="45720" rIns="91440" bIns="45720" rtlCol="0" anchor="b">
-            <a:normAutofit/>
-          </a:bodyPr>
-          <a:lstStyle>
-            <a:lvl1pPr algn="l" defTabSz="914400" rtl="0" eaLnBrk="1" latinLnBrk="1" hangingPunct="1">
-              <a:lnSpc>
-                <a:spcPct val="90000"/>
-              </a:lnSpc>
-              <a:spcBef>
-                <a:spcPct val="0"/>
-              </a:spcBef>
-              <a:buNone/>
-              <a:defRPr sz="3200" b="1" kern="1200">
-                <a:solidFill>
-                  <a:schemeClr val="accent1">
-                    <a:lumMod val="75000"/>
-                  </a:schemeClr>
-                </a:solidFill>
-                <a:latin typeface="맑은 고딕" panose="020B0503020000020004" pitchFamily="50" charset="-127"/>
-                <a:ea typeface="맑은 고딕" panose="020B0503020000020004" pitchFamily="50" charset="-127"/>
-                <a:cs typeface="+mj-cs"/>
-              </a:defRPr>
-            </a:lvl1pPr>
-          </a:lstStyle>
-          <a:p>
-            <a:r>
-              <a:rPr lang="en-US" altLang="ko-KR" sz="2400" dirty="0"/>
-              <a:t>1) </a:t>
-            </a:r>
-            <a:r>
-              <a:rPr lang="ko-KR" altLang="en-US" sz="2400" dirty="0"/>
-              <a:t>상수 덮개 </a:t>
-            </a:r>
-            <a:r>
-              <a:rPr lang="ko-KR" altLang="en-US" sz="2400" dirty="0" err="1"/>
-              <a:t>셰이더</a:t>
-            </a:r>
-            <a:r>
-              <a:rPr lang="ko-KR" altLang="en-US" sz="2400" dirty="0"/>
-              <a:t> </a:t>
-            </a:r>
-            <a:r>
-              <a:rPr lang="en-US" altLang="ko-KR" sz="2400" dirty="0"/>
-              <a:t>(Constant hull shader)</a:t>
-            </a:r>
-          </a:p>
-        </p:txBody>
-      </p:sp>
+      </p:pic>
     </p:spTree>
     <p:extLst>
       <p:ext uri="{BB962C8B-B14F-4D97-AF65-F5344CB8AC3E}">
-        <p14:creationId xmlns:p14="http://schemas.microsoft.com/office/powerpoint/2010/main" val="3857476527"/>
+        <p14:creationId xmlns:p14="http://schemas.microsoft.com/office/powerpoint/2010/main" val="1229699803"/>
       </p:ext>
     </p:extLst>
   </p:cSld>
@@ -21942,6 +18992,44 @@
       </p:grpSpPr>
       <p:sp>
         <p:nvSpPr>
+          <p:cNvPr id="2" name="제목 1"/>
+          <p:cNvSpPr>
+            <a:spLocks noGrp="1"/>
+          </p:cNvSpPr>
+          <p:nvPr>
+            <p:ph type="title"/>
+          </p:nvPr>
+        </p:nvSpPr>
+        <p:spPr>
+          <a:xfrm>
+            <a:off x="540489" y="237319"/>
+            <a:ext cx="9601200" cy="400635"/>
+          </a:xfrm>
+        </p:spPr>
+        <p:txBody>
+          <a:bodyPr rtlCol="0">
+            <a:normAutofit/>
+          </a:bodyPr>
+          <a:lstStyle/>
+          <a:p>
+            <a:pPr rtl="0"/>
+            <a:r>
+              <a:rPr lang="ko-KR" altLang="en-US" sz="2000" dirty="0"/>
+              <a:t>경계상자 </a:t>
+            </a:r>
+            <a:r>
+              <a:rPr lang="en-US" altLang="ko-KR" sz="2000" dirty="0"/>
+              <a:t>(bounding box)</a:t>
+            </a:r>
+            <a:endParaRPr lang="en-US" altLang="ko-KR" sz="2000" dirty="0">
+              <a:latin typeface="맑은 고딕" panose="020B0503020000020004" pitchFamily="50" charset="-127"/>
+              <a:ea typeface="맑은 고딕" panose="020B0503020000020004" pitchFamily="50" charset="-127"/>
+            </a:endParaRPr>
+          </a:p>
+        </p:txBody>
+      </p:sp>
+      <p:sp>
+        <p:nvSpPr>
           <p:cNvPr id="14" name="TextBox 13">
             <a:extLst>
               <a:ext uri="{FF2B5EF4-FFF2-40B4-BE49-F238E27FC236}">
@@ -21954,8 +19042,8 @@
         </p:nvSpPr>
         <p:spPr>
           <a:xfrm>
-            <a:off x="508589" y="1501145"/>
-            <a:ext cx="8049733" cy="4708981"/>
+            <a:off x="713267" y="749042"/>
+            <a:ext cx="4129863" cy="323165"/>
           </a:xfrm>
           <a:prstGeom prst="rect">
             <a:avLst/>
@@ -21972,286 +19060,117 @@
           <a:lstStyle/>
           <a:p>
             <a:r>
-              <a:rPr lang="en-US" altLang="ko-KR" sz="1500" b="1" dirty="0"/>
-              <a:t>struct </a:t>
-            </a:r>
-            <a:r>
-              <a:rPr lang="en-US" altLang="ko-KR" sz="1500" b="1" dirty="0" err="1"/>
-              <a:t>PatchTess</a:t>
-            </a:r>
-            <a:r>
-              <a:rPr lang="en-US" altLang="ko-KR" sz="1500" b="1" dirty="0"/>
-              <a:t>{</a:t>
-            </a:r>
-          </a:p>
-          <a:p>
-            <a:r>
-              <a:rPr lang="en-US" altLang="ko-KR" sz="1500" b="1" dirty="0"/>
-              <a:t>	float </a:t>
-            </a:r>
-            <a:r>
-              <a:rPr lang="en-US" altLang="ko-KR" sz="1500" b="1" dirty="0" err="1"/>
-              <a:t>EdgeTess</a:t>
-            </a:r>
-            <a:r>
-              <a:rPr lang="en-US" altLang="ko-KR" sz="1500" b="1" dirty="0"/>
-              <a:t>[4]	:	</a:t>
-            </a:r>
-            <a:r>
-              <a:rPr lang="en-US" altLang="ko-KR" sz="1500" b="1" dirty="0" err="1"/>
-              <a:t>SV_TessFactor</a:t>
-            </a:r>
-            <a:r>
-              <a:rPr lang="en-US" altLang="ko-KR" sz="1500" b="1" dirty="0"/>
-              <a:t>;</a:t>
-            </a:r>
-          </a:p>
-          <a:p>
-            <a:r>
-              <a:rPr lang="en-US" altLang="ko-KR" sz="1500" b="1" dirty="0"/>
-              <a:t>	float </a:t>
-            </a:r>
-            <a:r>
-              <a:rPr lang="en-US" altLang="ko-KR" sz="1500" b="1" dirty="0" err="1"/>
-              <a:t>InsideTess</a:t>
-            </a:r>
-            <a:r>
-              <a:rPr lang="en-US" altLang="ko-KR" sz="1500" b="1" dirty="0"/>
-              <a:t>[2]	:	</a:t>
-            </a:r>
-            <a:r>
-              <a:rPr lang="en-US" altLang="ko-KR" sz="1500" b="1" dirty="0" err="1"/>
-              <a:t>SV_InsideTessFactor</a:t>
-            </a:r>
-            <a:r>
-              <a:rPr lang="en-US" altLang="ko-KR" sz="1500" b="1" dirty="0"/>
-              <a:t>;</a:t>
-            </a:r>
-          </a:p>
-          <a:p>
-            <a:r>
-              <a:rPr lang="en-US" altLang="ko-KR" sz="1500" b="1" dirty="0"/>
-              <a:t>//</a:t>
-            </a:r>
-            <a:r>
-              <a:rPr lang="ko-KR" altLang="en-US" sz="1500" b="1" dirty="0"/>
-              <a:t>패치에 따라서는 추가적 필드를 둘 수도 있음</a:t>
-            </a:r>
-            <a:endParaRPr lang="en-US" altLang="ko-KR" sz="1500" b="1" dirty="0"/>
-          </a:p>
-          <a:p>
-            <a:r>
-              <a:rPr lang="en-US" altLang="ko-KR" sz="1500" b="1" dirty="0"/>
-              <a:t>};</a:t>
-            </a:r>
-          </a:p>
-          <a:p>
-            <a:endParaRPr lang="en-US" altLang="ko-KR" sz="1500" b="1" dirty="0"/>
-          </a:p>
-          <a:p>
-            <a:r>
-              <a:rPr lang="en-US" altLang="ko-KR" sz="1500" b="1" dirty="0" err="1"/>
-              <a:t>PatchTess</a:t>
-            </a:r>
-            <a:r>
-              <a:rPr lang="en-US" altLang="ko-KR" sz="1500" b="1" dirty="0"/>
-              <a:t> </a:t>
-            </a:r>
-            <a:r>
-              <a:rPr lang="en-US" altLang="ko-KR" sz="1500" b="1" dirty="0" err="1"/>
-              <a:t>ConstantHS</a:t>
-            </a:r>
-            <a:r>
-              <a:rPr lang="en-US" altLang="ko-KR" sz="1500" b="1" dirty="0"/>
-              <a:t>(</a:t>
-            </a:r>
-            <a:r>
-              <a:rPr lang="en-US" altLang="ko-KR" sz="1500" b="1" dirty="0" err="1"/>
-              <a:t>InputPatch</a:t>
-            </a:r>
-            <a:r>
-              <a:rPr lang="en-US" altLang="ko-KR" sz="1500" b="1" dirty="0"/>
-              <a:t>&lt;</a:t>
-            </a:r>
-            <a:r>
-              <a:rPr lang="en-US" altLang="ko-KR" sz="1500" b="1" dirty="0" err="1"/>
-              <a:t>VertexOut</a:t>
-            </a:r>
-            <a:r>
-              <a:rPr lang="en-US" altLang="ko-KR" sz="1500" b="1" dirty="0"/>
-              <a:t>, 4&gt; patch, </a:t>
-            </a:r>
-            <a:r>
-              <a:rPr lang="en-US" altLang="ko-KR" sz="1500" b="1" dirty="0" err="1"/>
-              <a:t>uint</a:t>
-            </a:r>
-            <a:r>
-              <a:rPr lang="en-US" altLang="ko-KR" sz="1500" b="1" dirty="0"/>
-              <a:t> </a:t>
-            </a:r>
-            <a:r>
-              <a:rPr lang="en-US" altLang="ko-KR" sz="1500" b="1" dirty="0" err="1"/>
-              <a:t>patchID</a:t>
-            </a:r>
-            <a:r>
-              <a:rPr lang="en-US" altLang="ko-KR" sz="1500" b="1" dirty="0"/>
-              <a:t> : </a:t>
-            </a:r>
-            <a:r>
-              <a:rPr lang="en-US" altLang="ko-KR" sz="1500" b="1" dirty="0" err="1"/>
-              <a:t>SV_PrimitiveID</a:t>
-            </a:r>
-            <a:r>
-              <a:rPr lang="en-US" altLang="ko-KR" sz="1500" b="1" dirty="0"/>
-              <a:t>){</a:t>
-            </a:r>
-          </a:p>
-          <a:p>
-            <a:r>
-              <a:rPr lang="en-US" altLang="ko-KR" sz="1500" b="1" dirty="0"/>
-              <a:t>	</a:t>
-            </a:r>
-            <a:r>
-              <a:rPr lang="en-US" altLang="ko-KR" sz="1500" b="1" dirty="0" err="1"/>
-              <a:t>PatchTess</a:t>
-            </a:r>
-            <a:r>
-              <a:rPr lang="en-US" altLang="ko-KR" sz="1500" b="1" dirty="0"/>
-              <a:t> </a:t>
-            </a:r>
-            <a:r>
-              <a:rPr lang="en-US" altLang="ko-KR" sz="1500" b="1" dirty="0" err="1"/>
-              <a:t>pt</a:t>
-            </a:r>
-            <a:r>
-              <a:rPr lang="en-US" altLang="ko-KR" sz="1500" b="1" dirty="0"/>
-              <a:t>;</a:t>
-            </a:r>
-          </a:p>
-          <a:p>
-            <a:r>
-              <a:rPr lang="en-US" altLang="ko-KR" sz="1500" b="1" dirty="0"/>
-              <a:t>	</a:t>
-            </a:r>
-          </a:p>
-          <a:p>
-            <a:r>
-              <a:rPr lang="en-US" altLang="ko-KR" sz="1500" b="1" dirty="0"/>
-              <a:t>	</a:t>
-            </a:r>
-            <a:r>
-              <a:rPr lang="en-US" altLang="ko-KR" sz="1500" b="1" dirty="0" err="1"/>
-              <a:t>pt.EdgeTess</a:t>
-            </a:r>
-            <a:r>
-              <a:rPr lang="en-US" altLang="ko-KR" sz="1500" b="1" dirty="0"/>
-              <a:t>[0] = 3;</a:t>
-            </a:r>
-          </a:p>
-          <a:p>
-            <a:r>
-              <a:rPr lang="en-US" altLang="ko-KR" sz="1500" b="1" dirty="0"/>
-              <a:t>	</a:t>
-            </a:r>
-            <a:r>
-              <a:rPr lang="en-US" altLang="ko-KR" sz="1500" b="1" dirty="0" err="1"/>
-              <a:t>pt.EdgeTess</a:t>
-            </a:r>
-            <a:r>
-              <a:rPr lang="en-US" altLang="ko-KR" sz="1500" b="1" dirty="0"/>
-              <a:t>[1] = 3;</a:t>
-            </a:r>
-          </a:p>
-          <a:p>
-            <a:r>
-              <a:rPr lang="en-US" altLang="ko-KR" sz="1500" b="1" dirty="0"/>
-              <a:t>	</a:t>
-            </a:r>
-            <a:r>
-              <a:rPr lang="en-US" altLang="ko-KR" sz="1500" b="1" dirty="0" err="1"/>
-              <a:t>pt.EdgeTess</a:t>
-            </a:r>
-            <a:r>
-              <a:rPr lang="en-US" altLang="ko-KR" sz="1500" b="1" dirty="0"/>
-              <a:t>[2] = 3;</a:t>
-            </a:r>
-          </a:p>
-          <a:p>
-            <a:r>
-              <a:rPr lang="en-US" altLang="ko-KR" sz="1500" b="1" dirty="0"/>
-              <a:t>	</a:t>
-            </a:r>
-            <a:r>
-              <a:rPr lang="en-US" altLang="ko-KR" sz="1500" b="1" dirty="0" err="1"/>
-              <a:t>pt.EdgeTess</a:t>
-            </a:r>
-            <a:r>
-              <a:rPr lang="en-US" altLang="ko-KR" sz="1500" b="1" dirty="0"/>
-              <a:t>[3] = 3;</a:t>
-            </a:r>
-          </a:p>
-          <a:p>
-            <a:endParaRPr lang="en-US" altLang="ko-KR" sz="1500" b="1" dirty="0"/>
-          </a:p>
-          <a:p>
-            <a:r>
-              <a:rPr lang="en-US" altLang="ko-KR" sz="1500" b="1" dirty="0"/>
-              <a:t>	</a:t>
-            </a:r>
-            <a:r>
-              <a:rPr lang="en-US" altLang="ko-KR" sz="1500" b="1" dirty="0" err="1"/>
-              <a:t>pt.InsideTess</a:t>
-            </a:r>
-            <a:r>
-              <a:rPr lang="en-US" altLang="ko-KR" sz="1500" b="1" dirty="0"/>
-              <a:t>[0] = 3;</a:t>
-            </a:r>
-          </a:p>
-          <a:p>
-            <a:r>
-              <a:rPr lang="en-US" altLang="ko-KR" sz="1500" b="1" dirty="0"/>
-              <a:t>	</a:t>
-            </a:r>
-            <a:r>
-              <a:rPr lang="en-US" altLang="ko-KR" sz="1500" b="1" dirty="0" err="1"/>
-              <a:t>pt.InsideTess</a:t>
-            </a:r>
-            <a:r>
-              <a:rPr lang="en-US" altLang="ko-KR" sz="1500" b="1" dirty="0"/>
-              <a:t>[1] = 3;</a:t>
-            </a:r>
-          </a:p>
-          <a:p>
-            <a:endParaRPr lang="en-US" altLang="ko-KR" sz="1500" b="1" dirty="0"/>
-          </a:p>
-          <a:p>
-            <a:r>
-              <a:rPr lang="en-US" altLang="ko-KR" sz="1500" b="1" dirty="0"/>
-              <a:t>	return </a:t>
-            </a:r>
-            <a:r>
-              <a:rPr lang="en-US" altLang="ko-KR" sz="1500" b="1" dirty="0" err="1"/>
-              <a:t>pt</a:t>
-            </a:r>
-            <a:r>
-              <a:rPr lang="en-US" altLang="ko-KR" sz="1500" b="1" dirty="0"/>
-              <a:t>;</a:t>
-            </a:r>
-          </a:p>
-          <a:p>
-            <a:r>
-              <a:rPr lang="en-US" altLang="ko-KR" sz="1500" b="1" dirty="0"/>
-              <a:t>}</a:t>
-            </a:r>
+              <a:rPr lang="ko-KR" altLang="en-US" sz="1500" dirty="0"/>
+              <a:t>▶ </a:t>
+            </a:r>
+            <a:r>
+              <a:rPr lang="en-US" altLang="ko-KR" sz="1500" dirty="0"/>
+              <a:t>AABB</a:t>
+            </a:r>
+            <a:r>
+              <a:rPr lang="ko-KR" altLang="en-US" sz="1500" dirty="0"/>
+              <a:t>의 특징은 상자의 좌표축들에 평행</a:t>
+            </a:r>
+            <a:endParaRPr lang="en-US" altLang="ko-KR" sz="1500" dirty="0"/>
           </a:p>
         </p:txBody>
       </p:sp>
+      <p:pic>
+        <p:nvPicPr>
+          <p:cNvPr id="4" name="그림 3">
+            <a:extLst>
+              <a:ext uri="{FF2B5EF4-FFF2-40B4-BE49-F238E27FC236}">
+                <a16:creationId xmlns:a16="http://schemas.microsoft.com/office/drawing/2014/main" id="{3EEBB95F-DD22-4DD7-A24D-B0954571D1D5}"/>
+              </a:ext>
+            </a:extLst>
+          </p:cNvPr>
+          <p:cNvPicPr>
+            <a:picLocks noChangeAspect="1"/>
+          </p:cNvPicPr>
+          <p:nvPr/>
+        </p:nvPicPr>
+        <p:blipFill>
+          <a:blip r:embed="rId3"/>
+          <a:stretch>
+            <a:fillRect/>
+          </a:stretch>
+        </p:blipFill>
+        <p:spPr>
+          <a:xfrm>
+            <a:off x="838159" y="2679118"/>
+            <a:ext cx="2483339" cy="2733740"/>
+          </a:xfrm>
+          <a:prstGeom prst="rect">
+            <a:avLst/>
+          </a:prstGeom>
+        </p:spPr>
+      </p:pic>
+      <p:pic>
+        <p:nvPicPr>
+          <p:cNvPr id="6" name="그림 5">
+            <a:extLst>
+              <a:ext uri="{FF2B5EF4-FFF2-40B4-BE49-F238E27FC236}">
+                <a16:creationId xmlns:a16="http://schemas.microsoft.com/office/drawing/2014/main" id="{BACDB38D-DB7A-4371-9124-14D92642DD55}"/>
+              </a:ext>
+            </a:extLst>
+          </p:cNvPr>
+          <p:cNvPicPr>
+            <a:picLocks noChangeAspect="1"/>
+          </p:cNvPicPr>
+          <p:nvPr/>
+        </p:nvPicPr>
+        <p:blipFill>
+          <a:blip r:embed="rId4"/>
+          <a:stretch>
+            <a:fillRect/>
+          </a:stretch>
+        </p:blipFill>
+        <p:spPr>
+          <a:xfrm>
+            <a:off x="6662547" y="2575737"/>
+            <a:ext cx="2607901" cy="2698148"/>
+          </a:xfrm>
+          <a:prstGeom prst="rect">
+            <a:avLst/>
+          </a:prstGeom>
+        </p:spPr>
+      </p:pic>
+      <p:pic>
+        <p:nvPicPr>
+          <p:cNvPr id="7" name="그림 6">
+            <a:extLst>
+              <a:ext uri="{FF2B5EF4-FFF2-40B4-BE49-F238E27FC236}">
+                <a16:creationId xmlns:a16="http://schemas.microsoft.com/office/drawing/2014/main" id="{D44723A7-9B76-4A33-9660-DF133A8B0C26}"/>
+              </a:ext>
+            </a:extLst>
+          </p:cNvPr>
+          <p:cNvPicPr>
+            <a:picLocks noChangeAspect="1"/>
+          </p:cNvPicPr>
+          <p:nvPr/>
+        </p:nvPicPr>
+        <p:blipFill>
+          <a:blip r:embed="rId5"/>
+          <a:stretch>
+            <a:fillRect/>
+          </a:stretch>
+        </p:blipFill>
+        <p:spPr>
+          <a:xfrm>
+            <a:off x="713267" y="1363276"/>
+            <a:ext cx="7219950" cy="990600"/>
+          </a:xfrm>
+          <a:prstGeom prst="rect">
+            <a:avLst/>
+          </a:prstGeom>
+        </p:spPr>
+      </p:pic>
       <p:sp>
         <p:nvSpPr>
-          <p:cNvPr id="13" name="TextBox 12">
+          <p:cNvPr id="9" name="TextBox 8">
             <a:extLst>
               <a:ext uri="{FF2B5EF4-FFF2-40B4-BE49-F238E27FC236}">
-                <a16:creationId xmlns:a16="http://schemas.microsoft.com/office/drawing/2014/main" id="{E3BD4E8B-3D9E-436C-897B-A5797C1E1B1E}"/>
+                <a16:creationId xmlns:a16="http://schemas.microsoft.com/office/drawing/2014/main" id="{8AAAF212-BE67-4E41-9F35-7E043275F7E9}"/>
               </a:ext>
             </a:extLst>
           </p:cNvPr>
@@ -22260,17 +19179,15 @@
         </p:nvSpPr>
         <p:spPr>
           <a:xfrm>
-            <a:off x="6453963" y="3456959"/>
-            <a:ext cx="5087679" cy="2631490"/>
+            <a:off x="713268" y="5494651"/>
+            <a:ext cx="3491910" cy="323165"/>
           </a:xfrm>
           <a:prstGeom prst="rect">
             <a:avLst/>
           </a:prstGeom>
           <a:noFill/>
-          <a:ln w="28575">
-            <a:solidFill>
-              <a:srgbClr val="FF0000"/>
-            </a:solidFill>
+          <a:ln>
+            <a:noFill/>
           </a:ln>
         </p:spPr>
         <p:txBody>
@@ -22281,169 +19198,42 @@
           <a:p>
             <a:r>
               <a:rPr lang="ko-KR" altLang="en-US" sz="1500" dirty="0"/>
-              <a:t>▶ 한 패치의 모든 제어점을 받음</a:t>
+              <a:t>▶ </a:t>
             </a:r>
             <a:r>
               <a:rPr lang="en-US" altLang="ko-KR" sz="1500" dirty="0"/>
-              <a:t>.</a:t>
-            </a:r>
-          </a:p>
-          <a:p>
+              <a:t>AABB</a:t>
+            </a:r>
+            <a:r>
+              <a:rPr lang="ko-KR" altLang="en-US" sz="1500" dirty="0"/>
+              <a:t>를 </a:t>
+            </a:r>
+            <a:r>
+              <a:rPr lang="ko-KR" altLang="en-US" sz="1500" dirty="0" err="1"/>
+              <a:t>최댓점과</a:t>
+            </a:r>
+            <a:r>
+              <a:rPr lang="ko-KR" altLang="en-US" sz="1500" dirty="0"/>
+              <a:t> </a:t>
+            </a:r>
+            <a:r>
+              <a:rPr lang="ko-KR" altLang="en-US" sz="1500" dirty="0" err="1"/>
+              <a:t>최솟점으로</a:t>
+            </a:r>
+            <a:r>
+              <a:rPr lang="ko-KR" altLang="en-US" sz="1500" dirty="0"/>
+              <a:t> 표현</a:t>
+            </a:r>
             <a:endParaRPr lang="en-US" altLang="ko-KR" sz="1500" dirty="0"/>
-          </a:p>
-          <a:p>
-            <a:r>
-              <a:rPr lang="ko-KR" altLang="en-US" sz="1500" dirty="0"/>
-              <a:t>▶ 제어점들이</a:t>
-            </a:r>
-            <a:r>
-              <a:rPr lang="en-US" altLang="ko-KR" sz="1500" dirty="0"/>
-              <a:t> VS</a:t>
-            </a:r>
-            <a:r>
-              <a:rPr lang="ko-KR" altLang="en-US" sz="1500" dirty="0"/>
-              <a:t>를 거쳐 </a:t>
-            </a:r>
-            <a:r>
-              <a:rPr lang="en-US" altLang="ko-KR" sz="1500" dirty="0"/>
-              <a:t>CHS</a:t>
-            </a:r>
-            <a:r>
-              <a:rPr lang="ko-KR" altLang="en-US" sz="1500" dirty="0"/>
-              <a:t>에 공급</a:t>
-            </a:r>
-            <a:r>
-              <a:rPr lang="en-US" altLang="ko-KR" sz="1500" dirty="0"/>
-              <a:t>.</a:t>
-            </a:r>
-          </a:p>
-          <a:p>
-            <a:endParaRPr lang="en-US" altLang="ko-KR" sz="1500" dirty="0"/>
-          </a:p>
-          <a:p>
-            <a:r>
-              <a:rPr lang="ko-KR" altLang="en-US" sz="1500" dirty="0"/>
-              <a:t>▶ </a:t>
-            </a:r>
-            <a:r>
-              <a:rPr lang="ko-KR" altLang="en-US" sz="1500" dirty="0" err="1"/>
-              <a:t>제어점</a:t>
-            </a:r>
-            <a:r>
-              <a:rPr lang="ko-KR" altLang="en-US" sz="1500" dirty="0"/>
-              <a:t> 형식은 </a:t>
-            </a:r>
-            <a:r>
-              <a:rPr lang="en-US" altLang="ko-KR" sz="1500" dirty="0"/>
-              <a:t>VS</a:t>
-            </a:r>
-            <a:r>
-              <a:rPr lang="ko-KR" altLang="en-US" sz="1500" dirty="0"/>
-              <a:t>의 출력 형식 </a:t>
-            </a:r>
-            <a:r>
-              <a:rPr lang="en-US" altLang="ko-KR" sz="1500" dirty="0" err="1"/>
-              <a:t>VertexOut</a:t>
-            </a:r>
-            <a:r>
-              <a:rPr lang="ko-KR" altLang="en-US" sz="1500" dirty="0"/>
-              <a:t>으로 결정됨</a:t>
-            </a:r>
-            <a:endParaRPr lang="en-US" altLang="ko-KR" sz="1500" dirty="0"/>
-          </a:p>
-          <a:p>
-            <a:endParaRPr lang="en-US" altLang="ko-KR" sz="1500" dirty="0"/>
-          </a:p>
-          <a:p>
-            <a:r>
-              <a:rPr lang="ko-KR" altLang="en-US" sz="1500" dirty="0"/>
-              <a:t>▶ 패치의</a:t>
-            </a:r>
-            <a:r>
-              <a:rPr lang="en-US" altLang="ko-KR" sz="1500" dirty="0"/>
-              <a:t> </a:t>
-            </a:r>
-            <a:r>
-              <a:rPr lang="ko-KR" altLang="en-US" sz="1500" dirty="0"/>
-              <a:t>제어점이 </a:t>
-            </a:r>
-            <a:r>
-              <a:rPr lang="en-US" altLang="ko-KR" sz="1500" dirty="0"/>
-              <a:t>4</a:t>
-            </a:r>
-            <a:r>
-              <a:rPr lang="ko-KR" altLang="en-US" sz="1500" dirty="0"/>
-              <a:t>개</a:t>
-            </a:r>
-            <a:endParaRPr lang="en-US" altLang="ko-KR" sz="1500" dirty="0"/>
-          </a:p>
-          <a:p>
-            <a:endParaRPr lang="en-US" altLang="ko-KR" sz="1500" dirty="0"/>
-          </a:p>
-          <a:p>
-            <a:r>
-              <a:rPr lang="ko-KR" altLang="en-US" sz="1500" dirty="0"/>
-              <a:t>▶ </a:t>
-            </a:r>
-            <a:r>
-              <a:rPr lang="en-US" altLang="ko-KR" sz="1500" dirty="0" err="1"/>
-              <a:t>SV_PrimitiveID</a:t>
-            </a:r>
-            <a:r>
-              <a:rPr lang="en-US" altLang="ko-KR" sz="1500" dirty="0"/>
-              <a:t> </a:t>
-            </a:r>
-            <a:r>
-              <a:rPr lang="ko-KR" altLang="en-US" sz="1500" dirty="0"/>
-              <a:t>의미소를 통해 패치 </a:t>
-            </a:r>
-            <a:r>
-              <a:rPr lang="en-US" altLang="ko-KR" sz="1500" dirty="0"/>
-              <a:t>ID</a:t>
-            </a:r>
-            <a:r>
-              <a:rPr lang="ko-KR" altLang="en-US" sz="1500" dirty="0"/>
-              <a:t>도 넘김</a:t>
-            </a:r>
-            <a:endParaRPr lang="en-US" altLang="ko-KR" sz="1500" dirty="0"/>
-          </a:p>
-          <a:p>
-            <a:endParaRPr lang="en-US" altLang="ko-KR" sz="1500" dirty="0"/>
-          </a:p>
-          <a:p>
-            <a:r>
-              <a:rPr lang="ko-KR" altLang="en-US" sz="1500" dirty="0"/>
-              <a:t>▶ </a:t>
-            </a:r>
-            <a:r>
-              <a:rPr lang="en-US" altLang="ko-KR" sz="1500" dirty="0"/>
-              <a:t>CHS</a:t>
-            </a:r>
-            <a:r>
-              <a:rPr lang="ko-KR" altLang="en-US" sz="1500" dirty="0"/>
-              <a:t>는 반드시 </a:t>
-            </a:r>
-            <a:r>
-              <a:rPr lang="en-US" altLang="ko-KR" sz="1500" dirty="0"/>
-              <a:t>Tessellation factor</a:t>
-            </a:r>
-            <a:r>
-              <a:rPr lang="ko-KR" altLang="en-US" sz="1500" dirty="0"/>
-              <a:t>들을 출력해야 함</a:t>
-            </a:r>
-            <a:r>
-              <a:rPr lang="en-US" altLang="ko-KR" sz="1500" dirty="0"/>
-              <a:t>.</a:t>
-            </a:r>
           </a:p>
         </p:txBody>
       </p:sp>
       <p:sp>
         <p:nvSpPr>
-          <p:cNvPr id="8" name="TextBox 7">
+          <p:cNvPr id="10" name="TextBox 9">
             <a:extLst>
               <a:ext uri="{FF2B5EF4-FFF2-40B4-BE49-F238E27FC236}">
-                <a16:creationId xmlns:a16="http://schemas.microsoft.com/office/drawing/2014/main" id="{E74B17AD-4505-4752-9291-8DA9DF32AC12}"/>
+                <a16:creationId xmlns:a16="http://schemas.microsoft.com/office/drawing/2014/main" id="{3CDC9F9D-FC6B-42F3-9E13-1B9DD2162890}"/>
               </a:ext>
             </a:extLst>
           </p:cNvPr>
@@ -22452,17 +19242,15 @@
         </p:nvSpPr>
         <p:spPr>
           <a:xfrm>
-            <a:off x="2632887" y="77053"/>
-            <a:ext cx="6926225" cy="1384995"/>
+            <a:off x="6570035" y="5412858"/>
+            <a:ext cx="3491910" cy="323165"/>
           </a:xfrm>
           <a:prstGeom prst="rect">
             <a:avLst/>
           </a:prstGeom>
           <a:noFill/>
-          <a:ln w="28575">
-            <a:solidFill>
-              <a:srgbClr val="FF0000"/>
-            </a:solidFill>
+          <a:ln>
+            <a:noFill/>
           </a:ln>
         </p:spPr>
         <p:txBody>
@@ -22472,110 +19260,25 @@
           <a:lstStyle/>
           <a:p>
             <a:r>
-              <a:rPr lang="ko-KR" altLang="en-US" sz="1400" dirty="0"/>
+              <a:rPr lang="ko-KR" altLang="en-US" sz="1500" dirty="0"/>
               <a:t>▶ </a:t>
             </a:r>
             <a:r>
-              <a:rPr lang="en-US" altLang="ko-KR" sz="1400" b="1" dirty="0"/>
-              <a:t>Tessellation factor</a:t>
-            </a:r>
-          </a:p>
-          <a:p>
-            <a:r>
-              <a:rPr lang="en-US" altLang="ko-KR" sz="1400" b="1" dirty="0" err="1"/>
-              <a:t>SV_tessFactor</a:t>
-            </a:r>
-            <a:r>
-              <a:rPr lang="en-US" altLang="ko-KR" sz="1400" b="1" dirty="0"/>
-              <a:t> </a:t>
-            </a:r>
-            <a:r>
-              <a:rPr lang="ko-KR" altLang="en-US" sz="1400" dirty="0"/>
-              <a:t>는 각 변에 대한 </a:t>
-            </a:r>
-            <a:r>
-              <a:rPr lang="en-US" altLang="ko-KR" sz="1400" dirty="0"/>
-              <a:t>tessellation </a:t>
-            </a:r>
-            <a:r>
-              <a:rPr lang="ko-KR" altLang="en-US" sz="1400" dirty="0"/>
-              <a:t>정도를 제어하는 변 </a:t>
-            </a:r>
-            <a:r>
-              <a:rPr lang="ko-KR" altLang="en-US" sz="1400" dirty="0" err="1"/>
-              <a:t>테셀레이션</a:t>
-            </a:r>
-            <a:r>
-              <a:rPr lang="ko-KR" altLang="en-US" sz="1400" dirty="0"/>
-              <a:t> 계수</a:t>
-            </a:r>
-            <a:endParaRPr lang="en-US" altLang="ko-KR" sz="1400" dirty="0"/>
-          </a:p>
-          <a:p>
-            <a:endParaRPr lang="en-US" altLang="ko-KR" sz="1400" dirty="0"/>
-          </a:p>
-          <a:p>
-            <a:r>
-              <a:rPr lang="en-US" altLang="ko-KR" sz="1400" b="1" dirty="0" err="1"/>
-              <a:t>SV_InsideTessFactor</a:t>
-            </a:r>
-            <a:r>
-              <a:rPr lang="ko-KR" altLang="en-US" sz="1400" b="1" dirty="0"/>
-              <a:t> </a:t>
-            </a:r>
-            <a:r>
-              <a:rPr lang="ko-KR" altLang="en-US" sz="1400" dirty="0"/>
-              <a:t>는 내부의 </a:t>
-            </a:r>
-            <a:r>
-              <a:rPr lang="en-US" altLang="ko-KR" sz="1400" dirty="0"/>
-              <a:t>tessellation </a:t>
-            </a:r>
-            <a:r>
-              <a:rPr lang="ko-KR" altLang="en-US" sz="1400" dirty="0"/>
-              <a:t>정도를 제어하는 내부 </a:t>
-            </a:r>
-            <a:r>
-              <a:rPr lang="ko-KR" altLang="en-US" sz="1400" dirty="0" err="1"/>
-              <a:t>테셀레이션</a:t>
-            </a:r>
-            <a:r>
-              <a:rPr lang="ko-KR" altLang="en-US" sz="1400" dirty="0"/>
-              <a:t> 계수</a:t>
-            </a:r>
-            <a:endParaRPr lang="en-US" altLang="ko-KR" sz="1400" dirty="0"/>
-          </a:p>
-          <a:p>
-            <a:endParaRPr lang="en-US" altLang="ko-KR" sz="1400" dirty="0"/>
-          </a:p>
-          <a:p>
-            <a:r>
-              <a:rPr lang="en-US" altLang="ko-KR" sz="1400" dirty="0"/>
-              <a:t>※ DirectX 11</a:t>
-            </a:r>
-            <a:r>
-              <a:rPr lang="ko-KR" altLang="en-US" sz="1400" dirty="0"/>
-              <a:t>급 하드웨어에서 임의의 </a:t>
-            </a:r>
-            <a:r>
-              <a:rPr lang="ko-KR" altLang="en-US" sz="1400" dirty="0" err="1"/>
-              <a:t>테셀레이션</a:t>
-            </a:r>
-            <a:r>
-              <a:rPr lang="ko-KR" altLang="en-US" sz="1400" dirty="0"/>
-              <a:t> 계수에 설정할 수 있는 최대값은 </a:t>
-            </a:r>
-            <a:r>
-              <a:rPr lang="en-US" altLang="ko-KR" sz="1400" dirty="0"/>
-              <a:t>64</a:t>
-            </a:r>
+              <a:rPr lang="en-US" altLang="ko-KR" sz="1500" dirty="0"/>
+              <a:t>AABB</a:t>
+            </a:r>
+            <a:r>
+              <a:rPr lang="ko-KR" altLang="en-US" sz="1500" dirty="0"/>
+              <a:t>를 중심과 한계 벡터로 표현</a:t>
+            </a:r>
+            <a:endParaRPr lang="en-US" altLang="ko-KR" sz="1500" dirty="0"/>
           </a:p>
         </p:txBody>
       </p:sp>
     </p:spTree>
     <p:extLst>
       <p:ext uri="{BB962C8B-B14F-4D97-AF65-F5344CB8AC3E}">
-        <p14:creationId xmlns:p14="http://schemas.microsoft.com/office/powerpoint/2010/main" val="2336602683"/>
+        <p14:creationId xmlns:p14="http://schemas.microsoft.com/office/powerpoint/2010/main" val="2926360238"/>
       </p:ext>
     </p:extLst>
   </p:cSld>
@@ -22626,8 +19329,8 @@
         </p:nvSpPr>
         <p:spPr>
           <a:xfrm>
-            <a:off x="652131" y="1444114"/>
-            <a:ext cx="9601200" cy="608270"/>
+            <a:off x="540489" y="237319"/>
+            <a:ext cx="9601200" cy="400635"/>
           </a:xfrm>
         </p:spPr>
         <p:txBody>
@@ -22638,18 +19341,16 @@
           <a:p>
             <a:pPr rtl="0"/>
             <a:r>
-              <a:rPr lang="en-US" altLang="ko-KR" sz="2000" dirty="0">
-                <a:latin typeface="맑은 고딕" panose="020B0503020000020004" pitchFamily="50" charset="-127"/>
-                <a:ea typeface="맑은 고딕" panose="020B0503020000020004" pitchFamily="50" charset="-127"/>
-              </a:rPr>
-              <a:t>Tessellation </a:t>
-            </a:r>
-            <a:r>
-              <a:rPr lang="ko-KR" altLang="en-US" sz="2000" dirty="0">
-                <a:latin typeface="맑은 고딕" panose="020B0503020000020004" pitchFamily="50" charset="-127"/>
-                <a:ea typeface="맑은 고딕" panose="020B0503020000020004" pitchFamily="50" charset="-127"/>
-              </a:rPr>
-              <a:t>정도를 결정하는 측정치</a:t>
+              <a:rPr lang="ko-KR" altLang="en-US" sz="2000" dirty="0" err="1"/>
+              <a:t>절두체</a:t>
+            </a:r>
+            <a:r>
+              <a:rPr lang="ko-KR" altLang="en-US" sz="2000" dirty="0"/>
+              <a:t> </a:t>
+            </a:r>
+            <a:r>
+              <a:rPr lang="en-US" altLang="ko-KR" sz="2000" dirty="0"/>
+              <a:t>(Frustum)</a:t>
             </a:r>
             <a:endParaRPr lang="en-US" altLang="ko-KR" sz="2000" dirty="0">
               <a:latin typeface="맑은 고딕" panose="020B0503020000020004" pitchFamily="50" charset="-127"/>
@@ -22672,8 +19373,8 @@
         </p:nvSpPr>
         <p:spPr>
           <a:xfrm>
-            <a:off x="692002" y="2296079"/>
-            <a:ext cx="10765466" cy="2631490"/>
+            <a:off x="713267" y="749042"/>
+            <a:ext cx="10030933" cy="784830"/>
           </a:xfrm>
           <a:prstGeom prst="rect">
             <a:avLst/>
@@ -22689,152 +19390,59 @@
           </a:bodyPr>
           <a:lstStyle/>
           <a:p>
-            <a:pPr marL="342900" indent="-342900">
-              <a:buAutoNum type="arabicPeriod"/>
-            </a:pPr>
-            <a:r>
-              <a:rPr lang="ko-KR" altLang="en-US" sz="1500" b="1" dirty="0"/>
-              <a:t>카메라와의</a:t>
-            </a:r>
-            <a:r>
-              <a:rPr lang="en-US" altLang="ko-KR" sz="1500" b="1" dirty="0"/>
-              <a:t> </a:t>
-            </a:r>
-            <a:r>
-              <a:rPr lang="ko-KR" altLang="en-US" sz="1500" b="1" dirty="0"/>
-              <a:t>거리</a:t>
-            </a:r>
-            <a:endParaRPr lang="en-US" altLang="ko-KR" sz="1500" b="1" dirty="0"/>
-          </a:p>
-          <a:p>
-            <a:pPr marL="342900" indent="-342900">
-              <a:buAutoNum type="arabicPeriod"/>
-            </a:pPr>
+            <a:r>
+              <a:rPr lang="ko-KR" altLang="en-US" sz="1500" dirty="0"/>
+              <a:t>▶ 좌</a:t>
+            </a:r>
+            <a:r>
+              <a:rPr lang="en-US" altLang="ko-KR" sz="1500" dirty="0"/>
+              <a:t>, </a:t>
+            </a:r>
+            <a:r>
+              <a:rPr lang="ko-KR" altLang="en-US" sz="1500" dirty="0"/>
+              <a:t>우 위</a:t>
+            </a:r>
+            <a:r>
+              <a:rPr lang="en-US" altLang="ko-KR" sz="1500" dirty="0"/>
+              <a:t>, </a:t>
+            </a:r>
+            <a:r>
+              <a:rPr lang="ko-KR" altLang="en-US" sz="1500" dirty="0"/>
+              <a:t>아래</a:t>
+            </a:r>
+            <a:r>
+              <a:rPr lang="en-US" altLang="ko-KR" sz="1500" dirty="0"/>
+              <a:t>, </a:t>
+            </a:r>
+            <a:r>
+              <a:rPr lang="ko-KR" altLang="en-US" sz="1500" dirty="0"/>
+              <a:t>가까운</a:t>
+            </a:r>
+            <a:r>
+              <a:rPr lang="en-US" altLang="ko-KR" sz="1500" dirty="0"/>
+              <a:t>, </a:t>
+            </a:r>
+            <a:r>
+              <a:rPr lang="ko-KR" altLang="en-US" sz="1500" dirty="0"/>
+              <a:t>먼 평면 교차에 만들어지는 영역</a:t>
+            </a:r>
             <a:endParaRPr lang="en-US" altLang="ko-KR" sz="1500" dirty="0"/>
           </a:p>
           <a:p>
-            <a:pPr marL="342900" indent="-342900">
-              <a:buAutoNum type="arabicPeriod"/>
-            </a:pPr>
-            <a:r>
-              <a:rPr lang="ko-KR" altLang="en-US" sz="1500" b="1" dirty="0"/>
-              <a:t>화면 영역 포괄도</a:t>
-            </a:r>
-            <a:endParaRPr lang="en-US" altLang="ko-KR" sz="1500" b="1" dirty="0"/>
-          </a:p>
-          <a:p>
-            <a:r>
-              <a:rPr lang="ko-KR" altLang="en-US" sz="1500" dirty="0"/>
-              <a:t>물체가 화면의 픽셀들을 몇 개나 덮을 것인지 추정하여</a:t>
-            </a:r>
-            <a:r>
-              <a:rPr lang="en-US" altLang="ko-KR" sz="1500" dirty="0"/>
-              <a:t>, </a:t>
-            </a:r>
-            <a:r>
-              <a:rPr lang="ko-KR" altLang="en-US" sz="1500" dirty="0"/>
-              <a:t>그 개수가 작으면 </a:t>
-            </a:r>
-            <a:r>
-              <a:rPr lang="ko-KR" altLang="en-US" sz="1500" dirty="0" err="1"/>
-              <a:t>저다각형</a:t>
-            </a:r>
-            <a:r>
-              <a:rPr lang="ko-KR" altLang="en-US" sz="1500" dirty="0"/>
-              <a:t> 버전을 렌더링하고</a:t>
-            </a:r>
-            <a:r>
-              <a:rPr lang="en-US" altLang="ko-KR" sz="1500" dirty="0"/>
-              <a:t>, </a:t>
-            </a:r>
-            <a:r>
-              <a:rPr lang="ko-KR" altLang="en-US" sz="1500" dirty="0"/>
-              <a:t>물체의 화면           </a:t>
-            </a:r>
-            <a:r>
-              <a:rPr lang="en-US" altLang="ko-KR" sz="1500" dirty="0"/>
-              <a:t>                                    </a:t>
-            </a:r>
-            <a:r>
-              <a:rPr lang="ko-KR" altLang="en-US" sz="1500" dirty="0"/>
-              <a:t>영역 포괄도</a:t>
-            </a:r>
-            <a:r>
-              <a:rPr lang="en-US" altLang="ko-KR" sz="1500" dirty="0"/>
-              <a:t>(screen area coverage)</a:t>
-            </a:r>
-            <a:r>
-              <a:rPr lang="ko-KR" altLang="en-US" sz="1500" dirty="0"/>
-              <a:t>가 커짐에 </a:t>
-            </a:r>
-            <a:r>
-              <a:rPr lang="ko-KR" altLang="en-US" sz="1500" dirty="0" err="1"/>
-              <a:t>테셀레이션</a:t>
-            </a:r>
-            <a:r>
-              <a:rPr lang="ko-KR" altLang="en-US" sz="1500" dirty="0"/>
-              <a:t> 정도도 높여 렌더링한다</a:t>
-            </a:r>
-            <a:r>
-              <a:rPr lang="en-US" altLang="ko-KR" sz="1500" dirty="0"/>
-              <a:t>.</a:t>
-            </a:r>
-          </a:p>
-          <a:p>
-            <a:pPr marL="342900" indent="-342900">
-              <a:buAutoNum type="arabicPeriod"/>
-            </a:pPr>
             <a:endParaRPr lang="en-US" altLang="ko-KR" sz="1500" dirty="0"/>
           </a:p>
           <a:p>
             <a:r>
-              <a:rPr lang="en-US" altLang="ko-KR" sz="1500" b="1" dirty="0"/>
-              <a:t>3.    </a:t>
-            </a:r>
-            <a:r>
-              <a:rPr lang="ko-KR" altLang="en-US" sz="1500" b="1" dirty="0"/>
-              <a:t>방향</a:t>
-            </a:r>
-            <a:endParaRPr lang="en-US" altLang="ko-KR" sz="1500" b="1" dirty="0"/>
-          </a:p>
-          <a:p>
-            <a:r>
               <a:rPr lang="ko-KR" altLang="en-US" sz="1500" dirty="0"/>
-              <a:t>물체의 윤곽선을 이루는 삼각형들을 다른 삼각형들보다 더 세분한다</a:t>
-            </a:r>
-            <a:r>
-              <a:rPr lang="en-US" altLang="ko-KR" sz="1500" dirty="0"/>
-              <a:t>.</a:t>
-            </a:r>
-          </a:p>
-          <a:p>
-            <a:pPr marL="342900" indent="-342900">
-              <a:buAutoNum type="arabicPeriod"/>
-            </a:pPr>
-            <a:endParaRPr lang="en-US" altLang="ko-KR" sz="1500" dirty="0"/>
-          </a:p>
-          <a:p>
-            <a:pPr marL="342900" indent="-342900">
-              <a:buAutoNum type="arabicPeriod" startAt="4"/>
-            </a:pPr>
-            <a:r>
-              <a:rPr lang="ko-KR" altLang="en-US" sz="1500" b="1" dirty="0"/>
-              <a:t>표면 거칠기</a:t>
-            </a:r>
-            <a:endParaRPr lang="en-US" altLang="ko-KR" sz="1500" b="1" dirty="0"/>
-          </a:p>
-          <a:p>
+              <a:t>▶ 여섯 </a:t>
+            </a:r>
+            <a:r>
+              <a:rPr lang="ko-KR" altLang="en-US" sz="1500" dirty="0" err="1"/>
+              <a:t>절두체</a:t>
+            </a:r>
             <a:r>
               <a:rPr lang="ko-KR" altLang="en-US" sz="1500" dirty="0"/>
-              <a:t>거칠수록 세부사항이 많아서 </a:t>
-            </a:r>
-            <a:r>
-              <a:rPr lang="ko-KR" altLang="en-US" sz="1500" dirty="0" err="1"/>
-              <a:t>테셀레이션</a:t>
-            </a:r>
-            <a:r>
-              <a:rPr lang="ko-KR" altLang="en-US" sz="1500" dirty="0"/>
-              <a:t> 정도를 높일 필요가 있다</a:t>
+              <a:t> 평면이 모두 안쪽을 향한다고 가정하여 연산</a:t>
             </a:r>
             <a:r>
               <a:rPr lang="en-US" altLang="ko-KR" sz="1500" dirty="0"/>
@@ -22843,10 +19451,70 @@
           </a:p>
         </p:txBody>
       </p:sp>
+      <p:pic>
+        <p:nvPicPr>
+          <p:cNvPr id="5" name="그림 4">
+            <a:extLst>
+              <a:ext uri="{FF2B5EF4-FFF2-40B4-BE49-F238E27FC236}">
+                <a16:creationId xmlns:a16="http://schemas.microsoft.com/office/drawing/2014/main" id="{7CBE92CF-F9E7-40F3-BEDF-74B4FF185BAC}"/>
+              </a:ext>
+            </a:extLst>
+          </p:cNvPr>
+          <p:cNvPicPr>
+            <a:picLocks noChangeAspect="1"/>
+          </p:cNvPicPr>
+          <p:nvPr/>
+        </p:nvPicPr>
+        <p:blipFill>
+          <a:blip r:embed="rId3"/>
+          <a:stretch>
+            <a:fillRect/>
+          </a:stretch>
+        </p:blipFill>
+        <p:spPr>
+          <a:xfrm>
+            <a:off x="916542" y="1972784"/>
+            <a:ext cx="3756098" cy="3996951"/>
+          </a:xfrm>
+          <a:prstGeom prst="rect">
+            <a:avLst/>
+          </a:prstGeom>
+        </p:spPr>
+      </p:pic>
+      <p:pic>
+        <p:nvPicPr>
+          <p:cNvPr id="8" name="그림 7">
+            <a:extLst>
+              <a:ext uri="{FF2B5EF4-FFF2-40B4-BE49-F238E27FC236}">
+                <a16:creationId xmlns:a16="http://schemas.microsoft.com/office/drawing/2014/main" id="{9F6AC6F8-732C-4188-8AFC-B9EDDA3197D4}"/>
+              </a:ext>
+            </a:extLst>
+          </p:cNvPr>
+          <p:cNvPicPr>
+            <a:picLocks noChangeAspect="1"/>
+          </p:cNvPicPr>
+          <p:nvPr/>
+        </p:nvPicPr>
+        <p:blipFill>
+          <a:blip r:embed="rId4"/>
+          <a:stretch>
+            <a:fillRect/>
+          </a:stretch>
+        </p:blipFill>
+        <p:spPr>
+          <a:xfrm>
+            <a:off x="5013250" y="1765005"/>
+            <a:ext cx="6698513" cy="3996951"/>
+          </a:xfrm>
+          <a:prstGeom prst="rect">
+            <a:avLst/>
+          </a:prstGeom>
+        </p:spPr>
+      </p:pic>
     </p:spTree>
     <p:extLst>
       <p:ext uri="{BB962C8B-B14F-4D97-AF65-F5344CB8AC3E}">
-        <p14:creationId xmlns:p14="http://schemas.microsoft.com/office/powerpoint/2010/main" val="2891416855"/>
+        <p14:creationId xmlns:p14="http://schemas.microsoft.com/office/powerpoint/2010/main" val="3820702447"/>
       </p:ext>
     </p:extLst>
   </p:cSld>
@@ -22887,10 +19555,59 @@
       </p:grpSpPr>
       <p:sp>
         <p:nvSpPr>
-          <p:cNvPr id="13" name="TextBox 12">
+          <p:cNvPr id="2" name="제목 1"/>
+          <p:cNvSpPr>
+            <a:spLocks noGrp="1"/>
+          </p:cNvSpPr>
+          <p:nvPr>
+            <p:ph type="title"/>
+          </p:nvPr>
+        </p:nvSpPr>
+        <p:spPr>
+          <a:xfrm>
+            <a:off x="1295400" y="189471"/>
+            <a:ext cx="9601200" cy="608270"/>
+          </a:xfrm>
+        </p:spPr>
+        <p:txBody>
+          <a:bodyPr rtlCol="0"/>
+          <a:lstStyle/>
+          <a:p>
+            <a:pPr rtl="0"/>
+            <a:r>
+              <a:rPr lang="en-US" altLang="ko-KR" dirty="0">
+                <a:latin typeface="맑은 고딕" panose="020B0503020000020004" pitchFamily="50" charset="-127"/>
+                <a:ea typeface="맑은 고딕" panose="020B0503020000020004" pitchFamily="50" charset="-127"/>
+              </a:rPr>
+              <a:t>3. </a:t>
+            </a:r>
+            <a:r>
+              <a:rPr lang="ko-KR" altLang="en-US" dirty="0" err="1">
+                <a:latin typeface="맑은 고딕" panose="020B0503020000020004" pitchFamily="50" charset="-127"/>
+                <a:ea typeface="맑은 고딕" panose="020B0503020000020004" pitchFamily="50" charset="-127"/>
+              </a:rPr>
+              <a:t>절두체</a:t>
+            </a:r>
+            <a:r>
+              <a:rPr lang="ko-KR" altLang="en-US" dirty="0">
+                <a:latin typeface="맑은 고딕" panose="020B0503020000020004" pitchFamily="50" charset="-127"/>
+                <a:ea typeface="맑은 고딕" panose="020B0503020000020004" pitchFamily="50" charset="-127"/>
+              </a:rPr>
+              <a:t> 선별</a:t>
+            </a:r>
+            <a:endParaRPr lang="en-US" altLang="ko-KR" dirty="0">
+              <a:latin typeface="맑은 고딕" panose="020B0503020000020004" pitchFamily="50" charset="-127"/>
+              <a:ea typeface="맑은 고딕" panose="020B0503020000020004" pitchFamily="50" charset="-127"/>
+            </a:endParaRPr>
+          </a:p>
+        </p:txBody>
+      </p:sp>
+      <p:sp>
+        <p:nvSpPr>
+          <p:cNvPr id="14" name="TextBox 13">
             <a:extLst>
               <a:ext uri="{FF2B5EF4-FFF2-40B4-BE49-F238E27FC236}">
-                <a16:creationId xmlns:a16="http://schemas.microsoft.com/office/drawing/2014/main" id="{E3BD4E8B-3D9E-436C-897B-A5797C1E1B1E}"/>
+                <a16:creationId xmlns:a16="http://schemas.microsoft.com/office/drawing/2014/main" id="{29A2A7E7-15C1-48BF-B600-2FC75100C3CA}"/>
               </a:ext>
             </a:extLst>
           </p:cNvPr>
@@ -22899,8 +19616,8 @@
         </p:nvSpPr>
         <p:spPr>
           <a:xfrm>
-            <a:off x="883388" y="2674065"/>
-            <a:ext cx="10765466" cy="2169825"/>
+            <a:off x="660104" y="908529"/>
+            <a:ext cx="10765466" cy="553998"/>
           </a:xfrm>
           <a:prstGeom prst="rect">
             <a:avLst/>
@@ -22918,213 +19635,103 @@
           <a:p>
             <a:r>
               <a:rPr lang="ko-KR" altLang="en-US" sz="1500" dirty="0"/>
-              <a:t>▶ 일단의 제어점들을 받아서 일단 제어점들을 출력</a:t>
+              <a:t>▶ </a:t>
+            </a:r>
+            <a:r>
+              <a:rPr lang="ko-KR" altLang="en-US" sz="1500" dirty="0" err="1"/>
+              <a:t>절두체</a:t>
+            </a:r>
+            <a:r>
+              <a:rPr lang="ko-KR" altLang="en-US" sz="1500" dirty="0"/>
+              <a:t> 선별에 깔린 의도는 응용 프로그램이 미리 삼각형들을 걸러 낸다는 것</a:t>
+            </a:r>
+            <a:r>
+              <a:rPr lang="en-US" altLang="ko-KR" sz="1500" dirty="0"/>
+              <a:t>. </a:t>
+            </a:r>
+            <a:r>
+              <a:rPr lang="ko-KR" altLang="en-US" sz="1500" dirty="0"/>
+              <a:t>단</a:t>
+            </a:r>
+            <a:r>
+              <a:rPr lang="en-US" altLang="ko-KR" sz="1500" dirty="0"/>
+              <a:t>, </a:t>
+            </a:r>
+            <a:r>
+              <a:rPr lang="ko-KR" altLang="en-US" sz="1500" dirty="0"/>
+              <a:t>개 별 삼각형 수준이 아닌 그보다 좀 더 높은 수준에서 일단의 삼각형들을 한꺼번에 선별</a:t>
             </a:r>
             <a:r>
               <a:rPr lang="en-US" altLang="ko-KR" sz="1500" dirty="0"/>
               <a:t>.</a:t>
             </a:r>
-          </a:p>
-          <a:p>
-            <a:endParaRPr lang="en-US" altLang="ko-KR" sz="1500" dirty="0"/>
-          </a:p>
-          <a:p>
-            <a:r>
-              <a:rPr lang="ko-KR" altLang="en-US" sz="1500" dirty="0"/>
-              <a:t>▶ </a:t>
-            </a:r>
-            <a:r>
-              <a:rPr lang="en-US" altLang="ko-KR" sz="1500" dirty="0"/>
-              <a:t>CPHS </a:t>
-            </a:r>
-            <a:r>
-              <a:rPr lang="ko-KR" altLang="en-US" sz="1500" dirty="0"/>
-              <a:t>함수는 출력할 제어점마다 한 번씩 호출</a:t>
-            </a:r>
-            <a:r>
-              <a:rPr lang="en-US" altLang="ko-KR" sz="1500" dirty="0"/>
-              <a:t>.</a:t>
-            </a:r>
-          </a:p>
-          <a:p>
-            <a:endParaRPr lang="en-US" altLang="ko-KR" sz="1500" dirty="0"/>
-          </a:p>
-          <a:p>
-            <a:r>
-              <a:rPr lang="en-US" altLang="ko-KR" sz="1500" dirty="0"/>
-              <a:t>※ HS</a:t>
-            </a:r>
-            <a:r>
-              <a:rPr lang="ko-KR" altLang="en-US" sz="1500" dirty="0"/>
-              <a:t> 의 용도 중 하나는 </a:t>
-            </a:r>
-            <a:r>
-              <a:rPr lang="ko-KR" altLang="en-US" sz="1500" b="1" dirty="0"/>
-              <a:t>표면의 표현을 변경하는 것</a:t>
-            </a:r>
-            <a:r>
-              <a:rPr lang="en-US" altLang="ko-KR" sz="1500" b="1" dirty="0"/>
-              <a:t>.</a:t>
-            </a:r>
-          </a:p>
-          <a:p>
-            <a:endParaRPr lang="en-US" altLang="ko-KR" sz="1500" dirty="0"/>
-          </a:p>
-          <a:p>
-            <a:r>
-              <a:rPr lang="ko-KR" altLang="en-US" sz="1500" dirty="0"/>
-              <a:t>▶ </a:t>
-            </a:r>
-            <a:r>
-              <a:rPr lang="en-US" altLang="ko-KR" sz="1500" b="1" dirty="0"/>
-              <a:t>N-patches scheme(N-</a:t>
-            </a:r>
-            <a:r>
-              <a:rPr lang="ko-KR" altLang="en-US" sz="1500" b="1" dirty="0"/>
-              <a:t>패치 방안</a:t>
-            </a:r>
-            <a:r>
-              <a:rPr lang="en-US" altLang="ko-KR" sz="1500" b="1" dirty="0"/>
-              <a:t>) </a:t>
-            </a:r>
-            <a:r>
-              <a:rPr lang="en-US" altLang="ko-KR" sz="1500" dirty="0"/>
-              <a:t>or</a:t>
-            </a:r>
-            <a:r>
-              <a:rPr lang="ko-KR" altLang="en-US" sz="1500" dirty="0"/>
-              <a:t> </a:t>
-            </a:r>
-            <a:r>
-              <a:rPr lang="en-US" altLang="ko-KR" sz="1500" b="1" dirty="0"/>
-              <a:t>PN</a:t>
-            </a:r>
-            <a:r>
-              <a:rPr lang="ko-KR" altLang="en-US" sz="1500" b="1" dirty="0"/>
-              <a:t> </a:t>
-            </a:r>
-            <a:r>
-              <a:rPr lang="en-US" altLang="ko-KR" sz="1500" b="1" dirty="0"/>
-              <a:t>triangle scheme(PN </a:t>
-            </a:r>
-            <a:r>
-              <a:rPr lang="ko-KR" altLang="en-US" sz="1500" b="1" dirty="0"/>
-              <a:t>삼각형 방안</a:t>
-            </a:r>
-            <a:r>
-              <a:rPr lang="en-US" altLang="ko-KR" sz="1500" b="1" dirty="0"/>
-              <a:t>) </a:t>
-            </a:r>
-            <a:r>
-              <a:rPr lang="ko-KR" altLang="en-US" sz="1500" dirty="0"/>
-              <a:t>전략은 그래픽 자산</a:t>
-            </a:r>
-            <a:r>
-              <a:rPr lang="en-US" altLang="ko-KR" sz="1500" dirty="0"/>
-              <a:t>(asset) </a:t>
-            </a:r>
-            <a:r>
-              <a:rPr lang="ko-KR" altLang="en-US" sz="1500" dirty="0"/>
-              <a:t>파이프라인을 수정하지 않고 기존 삼각형 메시를 그대로 </a:t>
-            </a:r>
-            <a:r>
-              <a:rPr lang="ko-KR" altLang="en-US" sz="1500" dirty="0" err="1"/>
-              <a:t>테셀레이션에</a:t>
-            </a:r>
-            <a:r>
-              <a:rPr lang="ko-KR" altLang="en-US" sz="1500" dirty="0"/>
-              <a:t> 사용할 수 있다는 점에서 편리</a:t>
-            </a:r>
-            <a:r>
-              <a:rPr lang="en-US" altLang="ko-KR" sz="1500" dirty="0"/>
-              <a:t>.</a:t>
-            </a:r>
-          </a:p>
-          <a:p>
-            <a:endParaRPr lang="en-US" altLang="ko-KR" sz="1500" dirty="0"/>
           </a:p>
         </p:txBody>
       </p:sp>
-      <p:sp>
-        <p:nvSpPr>
-          <p:cNvPr id="5" name="제목 1">
+      <p:pic>
+        <p:nvPicPr>
+          <p:cNvPr id="4" name="그림 3">
             <a:extLst>
               <a:ext uri="{FF2B5EF4-FFF2-40B4-BE49-F238E27FC236}">
-                <a16:creationId xmlns:a16="http://schemas.microsoft.com/office/drawing/2014/main" id="{7FFB8550-2798-45B5-AB24-D2108B252C73}"/>
+                <a16:creationId xmlns:a16="http://schemas.microsoft.com/office/drawing/2014/main" id="{BDDF1DF1-453C-433E-AC75-C312B74571EA}"/>
               </a:ext>
             </a:extLst>
           </p:cNvPr>
-          <p:cNvSpPr txBox="1">
-            <a:spLocks/>
-          </p:cNvSpPr>
+          <p:cNvPicPr>
+            <a:picLocks noChangeAspect="1"/>
+          </p:cNvPicPr>
           <p:nvPr/>
-        </p:nvSpPr>
+        </p:nvPicPr>
+        <p:blipFill>
+          <a:blip r:embed="rId3"/>
+          <a:stretch>
+            <a:fillRect/>
+          </a:stretch>
+        </p:blipFill>
         <p:spPr>
           <a:xfrm>
-            <a:off x="883388" y="2002164"/>
-            <a:ext cx="9601200" cy="450711"/>
+            <a:off x="128258" y="2195623"/>
+            <a:ext cx="4403531" cy="3249898"/>
           </a:xfrm>
           <a:prstGeom prst="rect">
             <a:avLst/>
           </a:prstGeom>
         </p:spPr>
-        <p:txBody>
-          <a:bodyPr vert="horz" lIns="91440" tIns="45720" rIns="91440" bIns="45720" rtlCol="0" anchor="b">
-            <a:normAutofit/>
-          </a:bodyPr>
-          <a:lstStyle>
-            <a:lvl1pPr algn="l" defTabSz="914400" rtl="0" eaLnBrk="1" latinLnBrk="1" hangingPunct="1">
-              <a:lnSpc>
-                <a:spcPct val="90000"/>
-              </a:lnSpc>
-              <a:spcBef>
-                <a:spcPct val="0"/>
-              </a:spcBef>
-              <a:buNone/>
-              <a:defRPr sz="3200" b="1" kern="1200">
-                <a:solidFill>
-                  <a:schemeClr val="accent1">
-                    <a:lumMod val="75000"/>
-                  </a:schemeClr>
-                </a:solidFill>
-                <a:latin typeface="맑은 고딕" panose="020B0503020000020004" pitchFamily="50" charset="-127"/>
-                <a:ea typeface="맑은 고딕" panose="020B0503020000020004" pitchFamily="50" charset="-127"/>
-                <a:cs typeface="+mj-cs"/>
-              </a:defRPr>
-            </a:lvl1pPr>
-          </a:lstStyle>
-          <a:p>
-            <a:r>
-              <a:rPr lang="en-US" altLang="ko-KR" sz="2400" dirty="0"/>
-              <a:t>2) </a:t>
-            </a:r>
-            <a:r>
-              <a:rPr lang="ko-KR" altLang="en-US" sz="2400" dirty="0" err="1"/>
-              <a:t>제어점</a:t>
-            </a:r>
-            <a:r>
-              <a:rPr lang="ko-KR" altLang="en-US" sz="2400" dirty="0"/>
-              <a:t> 덮개 </a:t>
-            </a:r>
-            <a:r>
-              <a:rPr lang="ko-KR" altLang="en-US" sz="2400" dirty="0" err="1"/>
-              <a:t>셰이더</a:t>
-            </a:r>
-            <a:r>
-              <a:rPr lang="ko-KR" altLang="en-US" sz="2400" dirty="0"/>
-              <a:t> </a:t>
-            </a:r>
-            <a:r>
-              <a:rPr lang="en-US" altLang="ko-KR" sz="2400" dirty="0"/>
-              <a:t>(Control point hull shader)</a:t>
-            </a:r>
-          </a:p>
-        </p:txBody>
-      </p:sp>
+      </p:pic>
+      <p:pic>
+        <p:nvPicPr>
+          <p:cNvPr id="5" name="그림 4">
+            <a:extLst>
+              <a:ext uri="{FF2B5EF4-FFF2-40B4-BE49-F238E27FC236}">
+                <a16:creationId xmlns:a16="http://schemas.microsoft.com/office/drawing/2014/main" id="{1443BB09-0386-4645-9D2A-00DA2D176BCD}"/>
+              </a:ext>
+            </a:extLst>
+          </p:cNvPr>
+          <p:cNvPicPr>
+            <a:picLocks noChangeAspect="1"/>
+          </p:cNvPicPr>
+          <p:nvPr/>
+        </p:nvPicPr>
+        <p:blipFill>
+          <a:blip r:embed="rId4"/>
+          <a:stretch>
+            <a:fillRect/>
+          </a:stretch>
+        </p:blipFill>
+        <p:spPr>
+          <a:xfrm>
+            <a:off x="4720855" y="2195623"/>
+            <a:ext cx="7342887" cy="2977116"/>
+          </a:xfrm>
+          <a:prstGeom prst="rect">
+            <a:avLst/>
+          </a:prstGeom>
+        </p:spPr>
+      </p:pic>
     </p:spTree>
     <p:extLst>
       <p:ext uri="{BB962C8B-B14F-4D97-AF65-F5344CB8AC3E}">
-        <p14:creationId xmlns:p14="http://schemas.microsoft.com/office/powerpoint/2010/main" val="62491416"/>
+        <p14:creationId xmlns:p14="http://schemas.microsoft.com/office/powerpoint/2010/main" val="198011685"/>
       </p:ext>
     </p:extLst>
   </p:cSld>

</xml_diff>